<commit_message>
initial draft for cloudera presentation
</commit_message>
<xml_diff>
--- a/slides/Cloudera_Sessions_2018(Datayanolja).pptx
+++ b/slides/Cloudera_Sessions_2018(Datayanolja).pptx
@@ -137,10 +137,10 @@
   </p:defaultTextStyle>
   <p:extLst>
     <p:ext uri="{EFAFB233-063F-42B5-8137-9DF3F51BA10A}">
-      <p15:sldGuideLst xmlns:p15="http://schemas.microsoft.com/office/powerpoint/2012/main" xmlns=""/>
+      <p15:sldGuideLst xmlns="" xmlns:p15="http://schemas.microsoft.com/office/powerpoint/2012/main"/>
     </p:ext>
     <p:ext uri="{2D200454-40CA-4A62-9FC3-DE9A4176ACB9}">
-      <p15:notesGuideLst xmlns:p15="http://schemas.microsoft.com/office/powerpoint/2012/main" xmlns=""/>
+      <p15:notesGuideLst xmlns="" xmlns:p15="http://schemas.microsoft.com/office/powerpoint/2012/main"/>
     </p:ext>
   </p:extLst>
 </p:presentation>
@@ -173,7 +173,7 @@
           <p:cNvPr id="2" name="Header Placeholder 1">
             <a:extLst>
               <a:ext uri="{FF2B5EF4-FFF2-40B4-BE49-F238E27FC236}">
-                <a16:creationId xmlns:a16="http://schemas.microsoft.com/office/drawing/2014/main" xmlns="" id="{0BE82528-B3FB-4E47-91E5-C20D4C136251}"/>
+                <a16:creationId xmlns="" xmlns:a16="http://schemas.microsoft.com/office/drawing/2014/main" id="{0BE82528-B3FB-4E47-91E5-C20D4C136251}"/>
               </a:ext>
             </a:extLst>
           </p:cNvPr>
@@ -212,7 +212,7 @@
           <p:cNvPr id="3" name="Date Placeholder 2">
             <a:extLst>
               <a:ext uri="{FF2B5EF4-FFF2-40B4-BE49-F238E27FC236}">
-                <a16:creationId xmlns:a16="http://schemas.microsoft.com/office/drawing/2014/main" xmlns="" id="{E9A3B30F-EA84-5D42-9F45-FD1B8B2894FE}"/>
+                <a16:creationId xmlns="" xmlns:a16="http://schemas.microsoft.com/office/drawing/2014/main" id="{E9A3B30F-EA84-5D42-9F45-FD1B8B2894FE}"/>
               </a:ext>
             </a:extLst>
           </p:cNvPr>
@@ -244,7 +244,7 @@
               <a:rPr lang="en-US" smtClean="0">
                 <a:latin typeface="Roboto Regular" panose="02000000000000000000" pitchFamily="2" charset="0"/>
               </a:rPr>
-              <a:t>11/3/2018</a:t>
+              <a:t>11/4/2018</a:t>
             </a:fld>
             <a:endParaRPr lang="en-US" dirty="0">
               <a:latin typeface="Roboto Regular" panose="02000000000000000000" pitchFamily="2" charset="0"/>
@@ -257,7 +257,7 @@
           <p:cNvPr id="4" name="Footer Placeholder 3">
             <a:extLst>
               <a:ext uri="{FF2B5EF4-FFF2-40B4-BE49-F238E27FC236}">
-                <a16:creationId xmlns:a16="http://schemas.microsoft.com/office/drawing/2014/main" xmlns="" id="{C5C06E69-4518-CE46-A03E-9FCFFFCDCAA8}"/>
+                <a16:creationId xmlns="" xmlns:a16="http://schemas.microsoft.com/office/drawing/2014/main" id="{C5C06E69-4518-CE46-A03E-9FCFFFCDCAA8}"/>
               </a:ext>
             </a:extLst>
           </p:cNvPr>
@@ -296,7 +296,7 @@
           <p:cNvPr id="5" name="Slide Number Placeholder 4">
             <a:extLst>
               <a:ext uri="{FF2B5EF4-FFF2-40B4-BE49-F238E27FC236}">
-                <a16:creationId xmlns:a16="http://schemas.microsoft.com/office/drawing/2014/main" xmlns="" id="{F8F5DD23-AAA9-E348-AEF5-A9B9879675E6}"/>
+                <a16:creationId xmlns="" xmlns:a16="http://schemas.microsoft.com/office/drawing/2014/main" id="{F8F5DD23-AAA9-E348-AEF5-A9B9879675E6}"/>
               </a:ext>
             </a:extLst>
           </p:cNvPr>
@@ -434,7 +434,7 @@
             <a:fld id="{D9877D3A-1FA8-434B-90C9-6FE35E033EAE}" type="datetimeFigureOut">
               <a:rPr lang="en-US" smtClean="0"/>
               <a:pPr/>
-              <a:t>11/3/2018</a:t>
+              <a:t>11/4/2018</a:t>
             </a:fld>
             <a:endParaRPr lang="en-US" dirty="0"/>
           </a:p>
@@ -1148,7 +1148,7 @@
           <p:cNvPr id="18" name="Rectangle 17">
             <a:extLst>
               <a:ext uri="{FF2B5EF4-FFF2-40B4-BE49-F238E27FC236}">
-                <a16:creationId xmlns:a16="http://schemas.microsoft.com/office/drawing/2014/main" xmlns="" id="{5511633E-FEBD-2949-BD79-8D900D07E46D}"/>
+                <a16:creationId xmlns="" xmlns:a16="http://schemas.microsoft.com/office/drawing/2014/main" id="{5511633E-FEBD-2949-BD79-8D900D07E46D}"/>
               </a:ext>
             </a:extLst>
           </p:cNvPr>
@@ -1204,7 +1204,7 @@
           <p:cNvPr id="5" name="Group 4">
             <a:extLst>
               <a:ext uri="{FF2B5EF4-FFF2-40B4-BE49-F238E27FC236}">
-                <a16:creationId xmlns:a16="http://schemas.microsoft.com/office/drawing/2014/main" xmlns="" id="{30E3D7E7-63BB-B34C-9FBB-4FBCAE19C9C4}"/>
+                <a16:creationId xmlns="" xmlns:a16="http://schemas.microsoft.com/office/drawing/2014/main" id="{30E3D7E7-63BB-B34C-9FBB-4FBCAE19C9C4}"/>
               </a:ext>
             </a:extLst>
           </p:cNvPr>
@@ -1229,7 +1229,7 @@
             <p:cNvPr id="6" name="Freeform 15">
               <a:extLst>
                 <a:ext uri="{FF2B5EF4-FFF2-40B4-BE49-F238E27FC236}">
-                  <a16:creationId xmlns:a16="http://schemas.microsoft.com/office/drawing/2014/main" xmlns="" id="{0DB5C354-9B8C-114C-AE00-5E6E2A020722}"/>
+                  <a16:creationId xmlns="" xmlns:a16="http://schemas.microsoft.com/office/drawing/2014/main" id="{0DB5C354-9B8C-114C-AE00-5E6E2A020722}"/>
                 </a:ext>
               </a:extLst>
             </p:cNvPr>
@@ -1420,7 +1420,7 @@
             <p:cNvPr id="7" name="Freeform 16">
               <a:extLst>
                 <a:ext uri="{FF2B5EF4-FFF2-40B4-BE49-F238E27FC236}">
-                  <a16:creationId xmlns:a16="http://schemas.microsoft.com/office/drawing/2014/main" xmlns="" id="{32A1B6AD-B087-604C-9213-AEF790A05AD0}"/>
+                  <a16:creationId xmlns="" xmlns:a16="http://schemas.microsoft.com/office/drawing/2014/main" id="{32A1B6AD-B087-604C-9213-AEF790A05AD0}"/>
                 </a:ext>
               </a:extLst>
             </p:cNvPr>
@@ -1567,7 +1567,7 @@
             <p:cNvPr id="8" name="Freeform 17">
               <a:extLst>
                 <a:ext uri="{FF2B5EF4-FFF2-40B4-BE49-F238E27FC236}">
-                  <a16:creationId xmlns:a16="http://schemas.microsoft.com/office/drawing/2014/main" xmlns="" id="{63C1721D-F51B-4A4F-B916-D1BDB3629FBB}"/>
+                  <a16:creationId xmlns="" xmlns:a16="http://schemas.microsoft.com/office/drawing/2014/main" id="{63C1721D-F51B-4A4F-B916-D1BDB3629FBB}"/>
                 </a:ext>
               </a:extLst>
             </p:cNvPr>
@@ -1739,7 +1739,7 @@
             <p:cNvPr id="9" name="Freeform 18">
               <a:extLst>
                 <a:ext uri="{FF2B5EF4-FFF2-40B4-BE49-F238E27FC236}">
-                  <a16:creationId xmlns:a16="http://schemas.microsoft.com/office/drawing/2014/main" xmlns="" id="{9B633485-9AF1-274D-9E20-5B0E543C36FF}"/>
+                  <a16:creationId xmlns="" xmlns:a16="http://schemas.microsoft.com/office/drawing/2014/main" id="{9B633485-9AF1-274D-9E20-5B0E543C36FF}"/>
                 </a:ext>
               </a:extLst>
             </p:cNvPr>
@@ -1920,7 +1920,7 @@
             <p:cNvPr id="10" name="Freeform 19">
               <a:extLst>
                 <a:ext uri="{FF2B5EF4-FFF2-40B4-BE49-F238E27FC236}">
-                  <a16:creationId xmlns:a16="http://schemas.microsoft.com/office/drawing/2014/main" xmlns="" id="{30E6FB59-4178-DB4A-ADF1-A932B7A4BC62}"/>
+                  <a16:creationId xmlns="" xmlns:a16="http://schemas.microsoft.com/office/drawing/2014/main" id="{30E6FB59-4178-DB4A-ADF1-A932B7A4BC62}"/>
                 </a:ext>
               </a:extLst>
             </p:cNvPr>
@@ -2163,7 +2163,7 @@
             <p:cNvPr id="11" name="Freeform 20">
               <a:extLst>
                 <a:ext uri="{FF2B5EF4-FFF2-40B4-BE49-F238E27FC236}">
-                  <a16:creationId xmlns:a16="http://schemas.microsoft.com/office/drawing/2014/main" xmlns="" id="{F548BCD4-7652-5B44-B9E6-A3FC08BBE666}"/>
+                  <a16:creationId xmlns="" xmlns:a16="http://schemas.microsoft.com/office/drawing/2014/main" id="{F548BCD4-7652-5B44-B9E6-A3FC08BBE666}"/>
                 </a:ext>
               </a:extLst>
             </p:cNvPr>
@@ -2387,7 +2387,7 @@
             <p:cNvPr id="12" name="Freeform 21">
               <a:extLst>
                 <a:ext uri="{FF2B5EF4-FFF2-40B4-BE49-F238E27FC236}">
-                  <a16:creationId xmlns:a16="http://schemas.microsoft.com/office/drawing/2014/main" xmlns="" id="{21121940-27DA-0843-8EC7-DD27664D285F}"/>
+                  <a16:creationId xmlns="" xmlns:a16="http://schemas.microsoft.com/office/drawing/2014/main" id="{21121940-27DA-0843-8EC7-DD27664D285F}"/>
                 </a:ext>
               </a:extLst>
             </p:cNvPr>
@@ -2641,7 +2641,7 @@
             <p:cNvPr id="13" name="Freeform 22">
               <a:extLst>
                 <a:ext uri="{FF2B5EF4-FFF2-40B4-BE49-F238E27FC236}">
-                  <a16:creationId xmlns:a16="http://schemas.microsoft.com/office/drawing/2014/main" xmlns="" id="{89AAC998-EE7A-D442-B36B-3880BE3047AC}"/>
+                  <a16:creationId xmlns="" xmlns:a16="http://schemas.microsoft.com/office/drawing/2014/main" id="{89AAC998-EE7A-D442-B36B-3880BE3047AC}"/>
                 </a:ext>
               </a:extLst>
             </p:cNvPr>
@@ -2978,7 +2978,7 @@
           <p:cNvPr id="14" name="Straight Connector 13">
             <a:extLst>
               <a:ext uri="{FF2B5EF4-FFF2-40B4-BE49-F238E27FC236}">
-                <a16:creationId xmlns:a16="http://schemas.microsoft.com/office/drawing/2014/main" xmlns="" id="{4BAD1C3F-D581-8245-8612-C8E78DB9B25E}"/>
+                <a16:creationId xmlns="" xmlns:a16="http://schemas.microsoft.com/office/drawing/2014/main" id="{4BAD1C3F-D581-8245-8612-C8E78DB9B25E}"/>
               </a:ext>
             </a:extLst>
           </p:cNvPr>
@@ -3025,7 +3025,7 @@
           <p:cNvPr id="15" name="Title 147">
             <a:extLst>
               <a:ext uri="{FF2B5EF4-FFF2-40B4-BE49-F238E27FC236}">
-                <a16:creationId xmlns:a16="http://schemas.microsoft.com/office/drawing/2014/main" xmlns="" id="{07B204BD-86BE-0A46-8494-0C8DC431DD4D}"/>
+                <a16:creationId xmlns="" xmlns:a16="http://schemas.microsoft.com/office/drawing/2014/main" id="{07B204BD-86BE-0A46-8494-0C8DC431DD4D}"/>
               </a:ext>
             </a:extLst>
           </p:cNvPr>
@@ -3073,7 +3073,7 @@
           <p:cNvPr id="27" name="Text Placeholder 150">
             <a:extLst>
               <a:ext uri="{FF2B5EF4-FFF2-40B4-BE49-F238E27FC236}">
-                <a16:creationId xmlns:a16="http://schemas.microsoft.com/office/drawing/2014/main" xmlns="" id="{EA8A2313-0435-6449-B08B-E647E4697DE6}"/>
+                <a16:creationId xmlns="" xmlns:a16="http://schemas.microsoft.com/office/drawing/2014/main" id="{EA8A2313-0435-6449-B08B-E647E4697DE6}"/>
               </a:ext>
             </a:extLst>
           </p:cNvPr>
@@ -3153,7 +3153,7 @@
           <p:cNvPr id="16" name="Rectangle 15">
             <a:extLst>
               <a:ext uri="{FF2B5EF4-FFF2-40B4-BE49-F238E27FC236}">
-                <a16:creationId xmlns:a16="http://schemas.microsoft.com/office/drawing/2014/main" xmlns="" id="{2733C6C2-2D8E-A54F-91CE-BADE3941F58A}"/>
+                <a16:creationId xmlns="" xmlns:a16="http://schemas.microsoft.com/office/drawing/2014/main" id="{2733C6C2-2D8E-A54F-91CE-BADE3941F58A}"/>
               </a:ext>
             </a:extLst>
           </p:cNvPr>
@@ -3206,7 +3206,7 @@
           <p:cNvPr id="33" name="그림 32">
             <a:extLst>
               <a:ext uri="{FF2B5EF4-FFF2-40B4-BE49-F238E27FC236}">
-                <a16:creationId xmlns:a16="http://schemas.microsoft.com/office/drawing/2014/main" xmlns="" id="{D5797A24-1E9D-C84C-9E22-1089985DF797}"/>
+                <a16:creationId xmlns="" xmlns:a16="http://schemas.microsoft.com/office/drawing/2014/main" id="{D5797A24-1E9D-C84C-9E22-1089985DF797}"/>
               </a:ext>
             </a:extLst>
           </p:cNvPr>
@@ -3241,7 +3241,7 @@
           <p:cNvPr id="34" name="그림 33">
             <a:extLst>
               <a:ext uri="{FF2B5EF4-FFF2-40B4-BE49-F238E27FC236}">
-                <a16:creationId xmlns:a16="http://schemas.microsoft.com/office/drawing/2014/main" xmlns="" id="{D363BA16-8EBF-7449-A55C-1C92BB0A011C}"/>
+                <a16:creationId xmlns="" xmlns:a16="http://schemas.microsoft.com/office/drawing/2014/main" id="{D363BA16-8EBF-7449-A55C-1C92BB0A011C}"/>
               </a:ext>
             </a:extLst>
           </p:cNvPr>
@@ -3285,7 +3285,7 @@
           <p:cNvPr id="35" name="직선 연결선[R] 34">
             <a:extLst>
               <a:ext uri="{FF2B5EF4-FFF2-40B4-BE49-F238E27FC236}">
-                <a16:creationId xmlns:a16="http://schemas.microsoft.com/office/drawing/2014/main" xmlns="" id="{E13AE6EA-CD1A-F248-AEDD-2074E8A8A03F}"/>
+                <a16:creationId xmlns="" xmlns:a16="http://schemas.microsoft.com/office/drawing/2014/main" id="{E13AE6EA-CD1A-F248-AEDD-2074E8A8A03F}"/>
               </a:ext>
             </a:extLst>
           </p:cNvPr>
@@ -3330,7 +3330,7 @@
           <p:cNvPr id="3" name="그림 2">
             <a:extLst>
               <a:ext uri="{FF2B5EF4-FFF2-40B4-BE49-F238E27FC236}">
-                <a16:creationId xmlns:a16="http://schemas.microsoft.com/office/drawing/2014/main" xmlns="" id="{913F58DC-C84D-9E42-8895-CCE379F0FCCA}"/>
+                <a16:creationId xmlns="" xmlns:a16="http://schemas.microsoft.com/office/drawing/2014/main" id="{913F58DC-C84D-9E42-8895-CCE379F0FCCA}"/>
               </a:ext>
             </a:extLst>
           </p:cNvPr>
@@ -3360,7 +3360,7 @@
           <p:cNvPr id="17" name="그림 16" descr="텍스트이(가) 표시된 사진&#10;&#10;&#10;&#10;자동 생성된 설명">
             <a:extLst>
               <a:ext uri="{FF2B5EF4-FFF2-40B4-BE49-F238E27FC236}">
-                <a16:creationId xmlns:a16="http://schemas.microsoft.com/office/drawing/2014/main" xmlns="" id="{0D3B5F22-BBF0-824C-BB54-E942EB8D662A}"/>
+                <a16:creationId xmlns="" xmlns:a16="http://schemas.microsoft.com/office/drawing/2014/main" id="{0D3B5F22-BBF0-824C-BB54-E942EB8D662A}"/>
               </a:ext>
             </a:extLst>
           </p:cNvPr>
@@ -3431,7 +3431,7 @@
           <p:cNvPr id="14" name="Straight Connector 13">
             <a:extLst>
               <a:ext uri="{FF2B5EF4-FFF2-40B4-BE49-F238E27FC236}">
-                <a16:creationId xmlns:a16="http://schemas.microsoft.com/office/drawing/2014/main" xmlns="" id="{FBA38CE8-89A9-B94D-B2D8-C9DA2AB27735}"/>
+                <a16:creationId xmlns="" xmlns:a16="http://schemas.microsoft.com/office/drawing/2014/main" id="{FBA38CE8-89A9-B94D-B2D8-C9DA2AB27735}"/>
               </a:ext>
             </a:extLst>
           </p:cNvPr>
@@ -3478,7 +3478,7 @@
           <p:cNvPr id="15" name="Title 147">
             <a:extLst>
               <a:ext uri="{FF2B5EF4-FFF2-40B4-BE49-F238E27FC236}">
-                <a16:creationId xmlns:a16="http://schemas.microsoft.com/office/drawing/2014/main" xmlns="" id="{82EF3B6F-38F5-5A42-B946-5961AD72C94A}"/>
+                <a16:creationId xmlns="" xmlns:a16="http://schemas.microsoft.com/office/drawing/2014/main" id="{82EF3B6F-38F5-5A42-B946-5961AD72C94A}"/>
               </a:ext>
             </a:extLst>
           </p:cNvPr>
@@ -3526,7 +3526,7 @@
           <p:cNvPr id="16" name="Slide Number Placeholder 5">
             <a:extLst>
               <a:ext uri="{FF2B5EF4-FFF2-40B4-BE49-F238E27FC236}">
-                <a16:creationId xmlns:a16="http://schemas.microsoft.com/office/drawing/2014/main" xmlns="" id="{D72C22D2-F039-9947-B55C-9834E53C959E}"/>
+                <a16:creationId xmlns="" xmlns:a16="http://schemas.microsoft.com/office/drawing/2014/main" id="{D72C22D2-F039-9947-B55C-9834E53C959E}"/>
               </a:ext>
             </a:extLst>
           </p:cNvPr>
@@ -3679,7 +3679,7 @@
           <p:cNvPr id="17" name="Footer Placeholder 4">
             <a:extLst>
               <a:ext uri="{FF2B5EF4-FFF2-40B4-BE49-F238E27FC236}">
-                <a16:creationId xmlns:a16="http://schemas.microsoft.com/office/drawing/2014/main" xmlns="" id="{3C99D647-D262-A044-BB8D-2AC8E7815178}"/>
+                <a16:creationId xmlns="" xmlns:a16="http://schemas.microsoft.com/office/drawing/2014/main" id="{3C99D647-D262-A044-BB8D-2AC8E7815178}"/>
               </a:ext>
             </a:extLst>
           </p:cNvPr>
@@ -3839,7 +3839,7 @@
   </mc:AlternateContent>
   <p:extLst mod="1">
     <p:ext uri="{DCECCB84-F9BA-43D5-87BE-67443E8EF086}">
-      <p15:sldGuideLst xmlns:p15="http://schemas.microsoft.com/office/powerpoint/2012/main" xmlns=""/>
+      <p15:sldGuideLst xmlns="" xmlns:p15="http://schemas.microsoft.com/office/powerpoint/2012/main"/>
     </p:ext>
   </p:extLst>
 </p:sldLayout>
@@ -3867,7 +3867,7 @@
           <p:cNvPr id="16" name="Slide Number Placeholder 5">
             <a:extLst>
               <a:ext uri="{FF2B5EF4-FFF2-40B4-BE49-F238E27FC236}">
-                <a16:creationId xmlns:a16="http://schemas.microsoft.com/office/drawing/2014/main" xmlns="" id="{33008F98-996F-B94C-B3A6-2BFA0787F8D6}"/>
+                <a16:creationId xmlns="" xmlns:a16="http://schemas.microsoft.com/office/drawing/2014/main" id="{33008F98-996F-B94C-B3A6-2BFA0787F8D6}"/>
               </a:ext>
             </a:extLst>
           </p:cNvPr>
@@ -4020,7 +4020,7 @@
           <p:cNvPr id="17" name="Footer Placeholder 4">
             <a:extLst>
               <a:ext uri="{FF2B5EF4-FFF2-40B4-BE49-F238E27FC236}">
-                <a16:creationId xmlns:a16="http://schemas.microsoft.com/office/drawing/2014/main" xmlns="" id="{DD003FA8-0861-BE41-A5C3-8AC86372378B}"/>
+                <a16:creationId xmlns="" xmlns:a16="http://schemas.microsoft.com/office/drawing/2014/main" id="{DD003FA8-0861-BE41-A5C3-8AC86372378B}"/>
               </a:ext>
             </a:extLst>
           </p:cNvPr>
@@ -4161,7 +4161,7 @@
           <p:cNvPr id="28" name="Straight Connector 27">
             <a:extLst>
               <a:ext uri="{FF2B5EF4-FFF2-40B4-BE49-F238E27FC236}">
-                <a16:creationId xmlns:a16="http://schemas.microsoft.com/office/drawing/2014/main" xmlns="" id="{2B14C458-0FEA-604A-B28E-74950287D221}"/>
+                <a16:creationId xmlns="" xmlns:a16="http://schemas.microsoft.com/office/drawing/2014/main" id="{2B14C458-0FEA-604A-B28E-74950287D221}"/>
               </a:ext>
             </a:extLst>
           </p:cNvPr>
@@ -4208,7 +4208,7 @@
           <p:cNvPr id="27" name="Title 147">
             <a:extLst>
               <a:ext uri="{FF2B5EF4-FFF2-40B4-BE49-F238E27FC236}">
-                <a16:creationId xmlns:a16="http://schemas.microsoft.com/office/drawing/2014/main" xmlns="" id="{FB0FA1C5-AA37-C54A-84C9-355914BDE46D}"/>
+                <a16:creationId xmlns="" xmlns:a16="http://schemas.microsoft.com/office/drawing/2014/main" id="{FB0FA1C5-AA37-C54A-84C9-355914BDE46D}"/>
               </a:ext>
             </a:extLst>
           </p:cNvPr>
@@ -4256,7 +4256,7 @@
           <p:cNvPr id="31" name="Text Placeholder 150">
             <a:extLst>
               <a:ext uri="{FF2B5EF4-FFF2-40B4-BE49-F238E27FC236}">
-                <a16:creationId xmlns:a16="http://schemas.microsoft.com/office/drawing/2014/main" xmlns="" id="{3407401A-552E-7241-BB57-C2827A76D212}"/>
+                <a16:creationId xmlns="" xmlns:a16="http://schemas.microsoft.com/office/drawing/2014/main" id="{3407401A-552E-7241-BB57-C2827A76D212}"/>
               </a:ext>
             </a:extLst>
           </p:cNvPr>
@@ -4338,7 +4338,7 @@
           <p:cNvPr id="32" name="그림 31">
             <a:extLst>
               <a:ext uri="{FF2B5EF4-FFF2-40B4-BE49-F238E27FC236}">
-                <a16:creationId xmlns:a16="http://schemas.microsoft.com/office/drawing/2014/main" xmlns="" id="{1E8FC5DF-B24F-7843-8BAF-7957BAABB058}"/>
+                <a16:creationId xmlns="" xmlns:a16="http://schemas.microsoft.com/office/drawing/2014/main" id="{1E8FC5DF-B24F-7843-8BAF-7957BAABB058}"/>
               </a:ext>
             </a:extLst>
           </p:cNvPr>
@@ -4382,7 +4382,7 @@
           <p:cNvPr id="33" name="직선 연결선[R] 32">
             <a:extLst>
               <a:ext uri="{FF2B5EF4-FFF2-40B4-BE49-F238E27FC236}">
-                <a16:creationId xmlns:a16="http://schemas.microsoft.com/office/drawing/2014/main" xmlns="" id="{822C91E6-F294-F445-A28E-6573F456BDE7}"/>
+                <a16:creationId xmlns="" xmlns:a16="http://schemas.microsoft.com/office/drawing/2014/main" id="{822C91E6-F294-F445-A28E-6573F456BDE7}"/>
               </a:ext>
             </a:extLst>
           </p:cNvPr>
@@ -4427,7 +4427,7 @@
           <p:cNvPr id="9" name="그림 8">
             <a:extLst>
               <a:ext uri="{FF2B5EF4-FFF2-40B4-BE49-F238E27FC236}">
-                <a16:creationId xmlns:a16="http://schemas.microsoft.com/office/drawing/2014/main" xmlns="" id="{C9D6EBE8-D8B6-D64D-A042-F11C39ACAEEB}"/>
+                <a16:creationId xmlns="" xmlns:a16="http://schemas.microsoft.com/office/drawing/2014/main" id="{C9D6EBE8-D8B6-D64D-A042-F11C39ACAEEB}"/>
               </a:ext>
             </a:extLst>
           </p:cNvPr>
@@ -4462,7 +4462,7 @@
           <p:cNvPr id="12" name="그림 11" descr="텍스트이(가) 표시된 사진&#10;&#10;&#10;&#10;자동 생성된 설명">
             <a:extLst>
               <a:ext uri="{FF2B5EF4-FFF2-40B4-BE49-F238E27FC236}">
-                <a16:creationId xmlns:a16="http://schemas.microsoft.com/office/drawing/2014/main" xmlns="" id="{5F711D8E-D5A6-AB44-82BB-44FF03596652}"/>
+                <a16:creationId xmlns="" xmlns:a16="http://schemas.microsoft.com/office/drawing/2014/main" id="{5F711D8E-D5A6-AB44-82BB-44FF03596652}"/>
               </a:ext>
             </a:extLst>
           </p:cNvPr>
@@ -4533,7 +4533,7 @@
           <p:cNvPr id="2" name="TextBox 1">
             <a:extLst>
               <a:ext uri="{FF2B5EF4-FFF2-40B4-BE49-F238E27FC236}">
-                <a16:creationId xmlns:a16="http://schemas.microsoft.com/office/drawing/2014/main" xmlns="" id="{0251A63B-C4C4-E142-A68F-2F5503F1683A}"/>
+                <a16:creationId xmlns="" xmlns:a16="http://schemas.microsoft.com/office/drawing/2014/main" id="{0251A63B-C4C4-E142-A68F-2F5503F1683A}"/>
               </a:ext>
             </a:extLst>
           </p:cNvPr>
@@ -4582,7 +4582,7 @@
           <p:cNvPr id="21" name="Freeform 3">
             <a:extLst>
               <a:ext uri="{FF2B5EF4-FFF2-40B4-BE49-F238E27FC236}">
-                <a16:creationId xmlns:a16="http://schemas.microsoft.com/office/drawing/2014/main" xmlns="" id="{BC34BC8C-88AD-464F-9B76-58428A43BA4F}"/>
+                <a16:creationId xmlns="" xmlns:a16="http://schemas.microsoft.com/office/drawing/2014/main" id="{BC34BC8C-88AD-464F-9B76-58428A43BA4F}"/>
               </a:ext>
             </a:extLst>
           </p:cNvPr>
@@ -5404,7 +5404,7 @@
           <p:cNvPr id="5" name="Rectangle 4">
             <a:extLst>
               <a:ext uri="{FF2B5EF4-FFF2-40B4-BE49-F238E27FC236}">
-                <a16:creationId xmlns:a16="http://schemas.microsoft.com/office/drawing/2014/main" xmlns="" id="{B21404CE-BD33-CB44-9A47-D25C92A428BA}"/>
+                <a16:creationId xmlns="" xmlns:a16="http://schemas.microsoft.com/office/drawing/2014/main" id="{B21404CE-BD33-CB44-9A47-D25C92A428BA}"/>
               </a:ext>
             </a:extLst>
           </p:cNvPr>
@@ -5460,7 +5460,7 @@
           <p:cNvPr id="6" name="Rectangle 5">
             <a:extLst>
               <a:ext uri="{FF2B5EF4-FFF2-40B4-BE49-F238E27FC236}">
-                <a16:creationId xmlns:a16="http://schemas.microsoft.com/office/drawing/2014/main" xmlns="" id="{CCCDC204-6D63-F244-8764-124382F8D05D}"/>
+                <a16:creationId xmlns="" xmlns:a16="http://schemas.microsoft.com/office/drawing/2014/main" id="{CCCDC204-6D63-F244-8764-124382F8D05D}"/>
               </a:ext>
             </a:extLst>
           </p:cNvPr>
@@ -5574,7 +5574,7 @@
           <p:cNvPr id="2" name="Rectangle 1">
             <a:extLst>
               <a:ext uri="{FF2B5EF4-FFF2-40B4-BE49-F238E27FC236}">
-                <a16:creationId xmlns:a16="http://schemas.microsoft.com/office/drawing/2014/main" xmlns="" id="{30AC7CA5-8974-C849-AB46-04919B22E606}"/>
+                <a16:creationId xmlns="" xmlns:a16="http://schemas.microsoft.com/office/drawing/2014/main" id="{30AC7CA5-8974-C849-AB46-04919B22E606}"/>
               </a:ext>
             </a:extLst>
           </p:cNvPr>
@@ -5635,7 +5635,7 @@
           <p:cNvPr id="3" name="Footer Placeholder 4">
             <a:extLst>
               <a:ext uri="{FF2B5EF4-FFF2-40B4-BE49-F238E27FC236}">
-                <a16:creationId xmlns:a16="http://schemas.microsoft.com/office/drawing/2014/main" xmlns="" id="{1EA06081-5147-8F49-A245-8577FE37501F}"/>
+                <a16:creationId xmlns="" xmlns:a16="http://schemas.microsoft.com/office/drawing/2014/main" id="{1EA06081-5147-8F49-A245-8577FE37501F}"/>
               </a:ext>
             </a:extLst>
           </p:cNvPr>
@@ -5776,7 +5776,7 @@
           <p:cNvPr id="4" name="Text Placeholder 3">
             <a:extLst>
               <a:ext uri="{FF2B5EF4-FFF2-40B4-BE49-F238E27FC236}">
-                <a16:creationId xmlns:a16="http://schemas.microsoft.com/office/drawing/2014/main" xmlns="" id="{6E6D54A1-3EF4-D34B-9AC0-6C761D48A4D7}"/>
+                <a16:creationId xmlns="" xmlns:a16="http://schemas.microsoft.com/office/drawing/2014/main" id="{6E6D54A1-3EF4-D34B-9AC0-6C761D48A4D7}"/>
               </a:ext>
             </a:extLst>
           </p:cNvPr>
@@ -6146,7 +6146,7 @@
   </p:txStyles>
   <p:extLst mod="1">
     <p:ext uri="{27BBF7A9-308A-43DC-89C8-2F10F3537804}">
-      <p15:sldGuideLst xmlns:p15="http://schemas.microsoft.com/office/powerpoint/2012/main" xmlns="">
+      <p15:sldGuideLst xmlns="" xmlns:p15="http://schemas.microsoft.com/office/powerpoint/2012/main">
         <p15:guide id="2" pos="344" userDrawn="1">
           <p15:clr>
             <a:srgbClr val="9FCC3B"/>
@@ -6190,7 +6190,7 @@
           <p:cNvPr id="2" name="Title 1">
             <a:extLst>
               <a:ext uri="{FF2B5EF4-FFF2-40B4-BE49-F238E27FC236}">
-                <a16:creationId xmlns:a16="http://schemas.microsoft.com/office/drawing/2014/main" xmlns="" id="{999D5FE3-CB45-BA4B-AC46-8340832FE065}"/>
+                <a16:creationId xmlns="" xmlns:a16="http://schemas.microsoft.com/office/drawing/2014/main" id="{999D5FE3-CB45-BA4B-AC46-8340832FE065}"/>
               </a:ext>
             </a:extLst>
           </p:cNvPr>
@@ -6251,7 +6251,7 @@
           <p:cNvPr id="3" name="Text Placeholder 2">
             <a:extLst>
               <a:ext uri="{FF2B5EF4-FFF2-40B4-BE49-F238E27FC236}">
-                <a16:creationId xmlns:a16="http://schemas.microsoft.com/office/drawing/2014/main" xmlns="" id="{33022A9B-978B-BE45-9A4B-B638943688B4}"/>
+                <a16:creationId xmlns="" xmlns:a16="http://schemas.microsoft.com/office/drawing/2014/main" id="{33022A9B-978B-BE45-9A4B-B638943688B4}"/>
               </a:ext>
             </a:extLst>
           </p:cNvPr>
@@ -6383,7 +6383,7 @@
           <p:cNvPr id="4" name="Title 3">
             <a:extLst>
               <a:ext uri="{FF2B5EF4-FFF2-40B4-BE49-F238E27FC236}">
-                <a16:creationId xmlns:a16="http://schemas.microsoft.com/office/drawing/2014/main" xmlns="" id="{43665574-774A-2B41-927D-F53A37DF509D}"/>
+                <a16:creationId xmlns="" xmlns:a16="http://schemas.microsoft.com/office/drawing/2014/main" id="{43665574-774A-2B41-927D-F53A37DF509D}"/>
               </a:ext>
             </a:extLst>
           </p:cNvPr>
@@ -6561,7 +6561,7 @@
           <p:cNvPr id="4" name="Title 3">
             <a:extLst>
               <a:ext uri="{FF2B5EF4-FFF2-40B4-BE49-F238E27FC236}">
-                <a16:creationId xmlns:a16="http://schemas.microsoft.com/office/drawing/2014/main" xmlns="" id="{43665574-774A-2B41-927D-F53A37DF509D}"/>
+                <a16:creationId xmlns="" xmlns:a16="http://schemas.microsoft.com/office/drawing/2014/main" id="{43665574-774A-2B41-927D-F53A37DF509D}"/>
               </a:ext>
             </a:extLst>
           </p:cNvPr>
@@ -7582,7 +7582,7 @@
           <p:cNvPr id="4" name="Title 3">
             <a:extLst>
               <a:ext uri="{FF2B5EF4-FFF2-40B4-BE49-F238E27FC236}">
-                <a16:creationId xmlns:a16="http://schemas.microsoft.com/office/drawing/2014/main" xmlns="" id="{43665574-774A-2B41-927D-F53A37DF509D}"/>
+                <a16:creationId xmlns="" xmlns:a16="http://schemas.microsoft.com/office/drawing/2014/main" id="{43665574-774A-2B41-927D-F53A37DF509D}"/>
               </a:ext>
             </a:extLst>
           </p:cNvPr>
@@ -8564,7 +8564,7 @@
           <p:cNvPr id="4" name="Title 3">
             <a:extLst>
               <a:ext uri="{FF2B5EF4-FFF2-40B4-BE49-F238E27FC236}">
-                <a16:creationId xmlns:a16="http://schemas.microsoft.com/office/drawing/2014/main" xmlns="" id="{43665574-774A-2B41-927D-F53A37DF509D}"/>
+                <a16:creationId xmlns="" xmlns:a16="http://schemas.microsoft.com/office/drawing/2014/main" id="{43665574-774A-2B41-927D-F53A37DF509D}"/>
               </a:ext>
             </a:extLst>
           </p:cNvPr>
@@ -9469,7 +9469,7 @@
           <p:cNvPr id="2" name="Title 1">
             <a:extLst>
               <a:ext uri="{FF2B5EF4-FFF2-40B4-BE49-F238E27FC236}">
-                <a16:creationId xmlns:a16="http://schemas.microsoft.com/office/drawing/2014/main" xmlns="" id="{11983990-85B2-7248-92D6-FBAFDC732370}"/>
+                <a16:creationId xmlns="" xmlns:a16="http://schemas.microsoft.com/office/drawing/2014/main" id="{11983990-85B2-7248-92D6-FBAFDC732370}"/>
               </a:ext>
             </a:extLst>
           </p:cNvPr>
@@ -9568,7 +9568,7 @@
           <p:cNvPr id="4" name="Title 3">
             <a:extLst>
               <a:ext uri="{FF2B5EF4-FFF2-40B4-BE49-F238E27FC236}">
-                <a16:creationId xmlns:a16="http://schemas.microsoft.com/office/drawing/2014/main" xmlns="" id="{43665574-774A-2B41-927D-F53A37DF509D}"/>
+                <a16:creationId xmlns="" xmlns:a16="http://schemas.microsoft.com/office/drawing/2014/main" id="{43665574-774A-2B41-927D-F53A37DF509D}"/>
               </a:ext>
             </a:extLst>
           </p:cNvPr>
@@ -9767,7 +9767,7 @@
           <p:cNvPr id="4" name="Title 3">
             <a:extLst>
               <a:ext uri="{FF2B5EF4-FFF2-40B4-BE49-F238E27FC236}">
-                <a16:creationId xmlns:a16="http://schemas.microsoft.com/office/drawing/2014/main" xmlns="" id="{43665574-774A-2B41-927D-F53A37DF509D}"/>
+                <a16:creationId xmlns="" xmlns:a16="http://schemas.microsoft.com/office/drawing/2014/main" id="{43665574-774A-2B41-927D-F53A37DF509D}"/>
               </a:ext>
             </a:extLst>
           </p:cNvPr>
@@ -9953,7 +9953,7 @@
           <p:cNvPr id="2" name="Title 1">
             <a:extLst>
               <a:ext uri="{FF2B5EF4-FFF2-40B4-BE49-F238E27FC236}">
-                <a16:creationId xmlns:a16="http://schemas.microsoft.com/office/drawing/2014/main" xmlns="" id="{11983990-85B2-7248-92D6-FBAFDC732370}"/>
+                <a16:creationId xmlns="" xmlns:a16="http://schemas.microsoft.com/office/drawing/2014/main" id="{11983990-85B2-7248-92D6-FBAFDC732370}"/>
               </a:ext>
             </a:extLst>
           </p:cNvPr>
@@ -10044,7 +10044,7 @@
           <p:cNvPr id="4" name="Title 3">
             <a:extLst>
               <a:ext uri="{FF2B5EF4-FFF2-40B4-BE49-F238E27FC236}">
-                <a16:creationId xmlns:a16="http://schemas.microsoft.com/office/drawing/2014/main" xmlns="" id="{43665574-774A-2B41-927D-F53A37DF509D}"/>
+                <a16:creationId xmlns="" xmlns:a16="http://schemas.microsoft.com/office/drawing/2014/main" id="{43665574-774A-2B41-927D-F53A37DF509D}"/>
               </a:ext>
             </a:extLst>
           </p:cNvPr>
@@ -10289,7 +10289,7 @@
           <p:cNvPr id="4" name="Title 3">
             <a:extLst>
               <a:ext uri="{FF2B5EF4-FFF2-40B4-BE49-F238E27FC236}">
-                <a16:creationId xmlns:a16="http://schemas.microsoft.com/office/drawing/2014/main" xmlns="" id="{43665574-774A-2B41-927D-F53A37DF509D}"/>
+                <a16:creationId xmlns="" xmlns:a16="http://schemas.microsoft.com/office/drawing/2014/main" id="{43665574-774A-2B41-927D-F53A37DF509D}"/>
               </a:ext>
             </a:extLst>
           </p:cNvPr>
@@ -10729,7 +10729,7 @@
           <p:cNvPr id="2" name="Title 1">
             <a:extLst>
               <a:ext uri="{FF2B5EF4-FFF2-40B4-BE49-F238E27FC236}">
-                <a16:creationId xmlns:a16="http://schemas.microsoft.com/office/drawing/2014/main" xmlns="" id="{11983990-85B2-7248-92D6-FBAFDC732370}"/>
+                <a16:creationId xmlns="" xmlns:a16="http://schemas.microsoft.com/office/drawing/2014/main" id="{11983990-85B2-7248-92D6-FBAFDC732370}"/>
               </a:ext>
             </a:extLst>
           </p:cNvPr>
@@ -10812,7 +10812,7 @@
           <p:cNvPr id="4" name="Title 3">
             <a:extLst>
               <a:ext uri="{FF2B5EF4-FFF2-40B4-BE49-F238E27FC236}">
-                <a16:creationId xmlns:a16="http://schemas.microsoft.com/office/drawing/2014/main" xmlns="" id="{43665574-774A-2B41-927D-F53A37DF509D}"/>
+                <a16:creationId xmlns="" xmlns:a16="http://schemas.microsoft.com/office/drawing/2014/main" id="{43665574-774A-2B41-927D-F53A37DF509D}"/>
               </a:ext>
             </a:extLst>
           </p:cNvPr>
@@ -10939,7 +10939,7 @@
           <p:cNvPr id="4" name="Title 3">
             <a:extLst>
               <a:ext uri="{FF2B5EF4-FFF2-40B4-BE49-F238E27FC236}">
-                <a16:creationId xmlns:a16="http://schemas.microsoft.com/office/drawing/2014/main" xmlns="" id="{43665574-774A-2B41-927D-F53A37DF509D}"/>
+                <a16:creationId xmlns="" xmlns:a16="http://schemas.microsoft.com/office/drawing/2014/main" id="{43665574-774A-2B41-927D-F53A37DF509D}"/>
               </a:ext>
             </a:extLst>
           </p:cNvPr>
@@ -11173,7 +11173,7 @@
           <p:cNvPr id="2" name="Title 1">
             <a:extLst>
               <a:ext uri="{FF2B5EF4-FFF2-40B4-BE49-F238E27FC236}">
-                <a16:creationId xmlns:a16="http://schemas.microsoft.com/office/drawing/2014/main" xmlns="" id="{11983990-85B2-7248-92D6-FBAFDC732370}"/>
+                <a16:creationId xmlns="" xmlns:a16="http://schemas.microsoft.com/office/drawing/2014/main" id="{11983990-85B2-7248-92D6-FBAFDC732370}"/>
               </a:ext>
             </a:extLst>
           </p:cNvPr>
@@ -11268,7 +11268,7 @@
           <p:cNvPr id="4" name="Title 3">
             <a:extLst>
               <a:ext uri="{FF2B5EF4-FFF2-40B4-BE49-F238E27FC236}">
-                <a16:creationId xmlns:a16="http://schemas.microsoft.com/office/drawing/2014/main" xmlns="" id="{43665574-774A-2B41-927D-F53A37DF509D}"/>
+                <a16:creationId xmlns="" xmlns:a16="http://schemas.microsoft.com/office/drawing/2014/main" id="{43665574-774A-2B41-927D-F53A37DF509D}"/>
               </a:ext>
             </a:extLst>
           </p:cNvPr>
@@ -11500,7 +11500,7 @@
           <p:cNvPr id="4" name="Title 3">
             <a:extLst>
               <a:ext uri="{FF2B5EF4-FFF2-40B4-BE49-F238E27FC236}">
-                <a16:creationId xmlns:a16="http://schemas.microsoft.com/office/drawing/2014/main" xmlns="" id="{43665574-774A-2B41-927D-F53A37DF509D}"/>
+                <a16:creationId xmlns="" xmlns:a16="http://schemas.microsoft.com/office/drawing/2014/main" id="{43665574-774A-2B41-927D-F53A37DF509D}"/>
               </a:ext>
             </a:extLst>
           </p:cNvPr>
@@ -11528,6 +11528,3633 @@
               <a:t>Random Forest</a:t>
             </a:r>
             <a:endParaRPr lang="en-US" dirty="0"/>
+          </a:p>
+        </p:txBody>
+      </p:sp>
+      <p:sp>
+        <p:nvSpPr>
+          <p:cNvPr id="3" name="모서리가 둥근 직사각형 84">
+            <a:extLst>
+              <a:ext uri="{FF2B5EF4-FFF2-40B4-BE49-F238E27FC236}">
+                <a16:creationId xmlns:a16="http://schemas.microsoft.com/office/drawing/2014/main" xmlns="" id="{A2E0A129-B1C3-4673-A057-40A6E760E534}"/>
+              </a:ext>
+            </a:extLst>
+          </p:cNvPr>
+          <p:cNvSpPr/>
+          <p:nvPr/>
+        </p:nvSpPr>
+        <p:spPr>
+          <a:xfrm>
+            <a:off x="5681806" y="1419470"/>
+            <a:ext cx="2525049" cy="3514743"/>
+          </a:xfrm>
+          <a:prstGeom prst="roundRect">
+            <a:avLst>
+              <a:gd name="adj" fmla="val 3472"/>
+            </a:avLst>
+          </a:prstGeom>
+          <a:solidFill>
+            <a:srgbClr val="EEECE1">
+              <a:lumMod val="90000"/>
+              <a:alpha val="30000"/>
+            </a:srgbClr>
+          </a:solidFill>
+          <a:ln w="12700" cap="flat" cmpd="sng" algn="ctr">
+            <a:noFill/>
+            <a:prstDash val="solid"/>
+          </a:ln>
+          <a:effectLst/>
+        </p:spPr>
+        <p:txBody>
+          <a:bodyPr rtlCol="0" anchor="ctr"/>
+          <a:lstStyle/>
+          <a:p>
+            <a:pPr marL="0" marR="0" lvl="0" indent="0" algn="ctr" defTabSz="914400" eaLnBrk="1" fontAlgn="auto" latinLnBrk="1" hangingPunct="1">
+              <a:lnSpc>
+                <a:spcPct val="100000"/>
+              </a:lnSpc>
+              <a:spcBef>
+                <a:spcPts val="0"/>
+              </a:spcBef>
+              <a:spcAft>
+                <a:spcPts val="0"/>
+              </a:spcAft>
+              <a:buClrTx/>
+              <a:buSzTx/>
+              <a:buFontTx/>
+              <a:buNone/>
+              <a:tabLst/>
+              <a:defRPr/>
+            </a:pPr>
+            <a:endParaRPr kumimoji="0" lang="ko-KR" altLang="en-US" sz="2800" b="1" i="0" u="none" strike="noStrike" kern="0" cap="none" spc="0" normalizeH="0" baseline="0" noProof="0" dirty="0" smtClean="0">
+              <a:ln>
+                <a:noFill/>
+              </a:ln>
+              <a:solidFill>
+                <a:srgbClr val="0F07A9"/>
+              </a:solidFill>
+              <a:effectLst/>
+              <a:uLnTx/>
+              <a:uFillTx/>
+              <a:latin typeface="나눔고딕" pitchFamily="50" charset="-127"/>
+              <a:ea typeface="나눔고딕" pitchFamily="50" charset="-127"/>
+              <a:cs typeface="+mn-cs"/>
+            </a:endParaRPr>
+          </a:p>
+        </p:txBody>
+      </p:sp>
+      <p:sp>
+        <p:nvSpPr>
+          <p:cNvPr id="5" name="모서리가 둥근 직사각형 84">
+            <a:extLst>
+              <a:ext uri="{FF2B5EF4-FFF2-40B4-BE49-F238E27FC236}">
+                <a16:creationId xmlns:a16="http://schemas.microsoft.com/office/drawing/2014/main" xmlns="" id="{D9A5BA0D-E571-4BFB-AF04-7ED101F95C98}"/>
+              </a:ext>
+            </a:extLst>
+          </p:cNvPr>
+          <p:cNvSpPr/>
+          <p:nvPr/>
+        </p:nvSpPr>
+        <p:spPr>
+          <a:xfrm>
+            <a:off x="2657470" y="3278030"/>
+            <a:ext cx="2525049" cy="1656184"/>
+          </a:xfrm>
+          <a:prstGeom prst="roundRect">
+            <a:avLst>
+              <a:gd name="adj" fmla="val 3472"/>
+            </a:avLst>
+          </a:prstGeom>
+          <a:solidFill>
+            <a:srgbClr val="EEECE1">
+              <a:lumMod val="90000"/>
+              <a:alpha val="30000"/>
+            </a:srgbClr>
+          </a:solidFill>
+          <a:ln w="12700" cap="flat" cmpd="sng" algn="ctr">
+            <a:noFill/>
+            <a:prstDash val="solid"/>
+          </a:ln>
+          <a:effectLst/>
+        </p:spPr>
+        <p:txBody>
+          <a:bodyPr rtlCol="0" anchor="ctr"/>
+          <a:lstStyle/>
+          <a:p>
+            <a:pPr marL="0" marR="0" lvl="0" indent="0" algn="ctr" defTabSz="914400" eaLnBrk="1" fontAlgn="auto" latinLnBrk="1" hangingPunct="1">
+              <a:lnSpc>
+                <a:spcPct val="100000"/>
+              </a:lnSpc>
+              <a:spcBef>
+                <a:spcPts val="0"/>
+              </a:spcBef>
+              <a:spcAft>
+                <a:spcPts val="0"/>
+              </a:spcAft>
+              <a:buClrTx/>
+              <a:buSzTx/>
+              <a:buFontTx/>
+              <a:buNone/>
+              <a:tabLst/>
+              <a:defRPr/>
+            </a:pPr>
+            <a:endParaRPr kumimoji="0" lang="ko-KR" altLang="en-US" sz="2800" b="1" i="0" u="none" strike="noStrike" kern="0" cap="none" spc="0" normalizeH="0" baseline="0" noProof="0" dirty="0" smtClean="0">
+              <a:ln>
+                <a:noFill/>
+              </a:ln>
+              <a:solidFill>
+                <a:srgbClr val="0F07A9"/>
+              </a:solidFill>
+              <a:effectLst/>
+              <a:uLnTx/>
+              <a:uFillTx/>
+              <a:latin typeface="나눔고딕" pitchFamily="50" charset="-127"/>
+              <a:ea typeface="나눔고딕" pitchFamily="50" charset="-127"/>
+              <a:cs typeface="+mn-cs"/>
+            </a:endParaRPr>
+          </a:p>
+        </p:txBody>
+      </p:sp>
+      <p:sp>
+        <p:nvSpPr>
+          <p:cNvPr id="6" name="TextBox 5">
+            <a:extLst>
+              <a:ext uri="{FF2B5EF4-FFF2-40B4-BE49-F238E27FC236}">
+                <a16:creationId xmlns:a16="http://schemas.microsoft.com/office/drawing/2014/main" xmlns="" id="{457659AF-5CB3-455F-84DC-04A19809B65F}"/>
+              </a:ext>
+            </a:extLst>
+          </p:cNvPr>
+          <p:cNvSpPr txBox="1"/>
+          <p:nvPr/>
+        </p:nvSpPr>
+        <p:spPr>
+          <a:xfrm>
+            <a:off x="1192578" y="2111111"/>
+            <a:ext cx="904414" cy="646331"/>
+          </a:xfrm>
+          <a:prstGeom prst="rect">
+            <a:avLst/>
+          </a:prstGeom>
+          <a:noFill/>
+        </p:spPr>
+        <p:txBody>
+          <a:bodyPr wrap="none" rtlCol="0">
+            <a:spAutoFit/>
+          </a:bodyPr>
+          <a:lstStyle/>
+          <a:p>
+            <a:pPr algn="ctr" defTabSz="914400" latinLnBrk="1"/>
+            <a:r>
+              <a:rPr lang="ko-KR" altLang="en-US" sz="1800" b="1" dirty="0">
+                <a:solidFill>
+                  <a:prstClr val="black"/>
+                </a:solidFill>
+                <a:latin typeface="나눔바른펜" pitchFamily="50" charset="-127"/>
+                <a:ea typeface="나눔바른펜" pitchFamily="50" charset="-127"/>
+              </a:rPr>
+              <a:t>고객이탈</a:t>
+            </a:r>
+            <a:endParaRPr lang="en-US" altLang="ko-KR" sz="1800" b="1" dirty="0">
+              <a:solidFill>
+                <a:prstClr val="black"/>
+              </a:solidFill>
+              <a:latin typeface="나눔바른펜" pitchFamily="50" charset="-127"/>
+              <a:ea typeface="나눔바른펜" pitchFamily="50" charset="-127"/>
+            </a:endParaRPr>
+          </a:p>
+          <a:p>
+            <a:pPr algn="ctr" defTabSz="914400" latinLnBrk="1"/>
+            <a:r>
+              <a:rPr lang="ko-KR" altLang="en-US" sz="1800" b="1" dirty="0">
+                <a:solidFill>
+                  <a:prstClr val="black"/>
+                </a:solidFill>
+                <a:latin typeface="나눔바른펜" pitchFamily="50" charset="-127"/>
+                <a:ea typeface="나눔바른펜" pitchFamily="50" charset="-127"/>
+              </a:rPr>
+              <a:t>데이터셋</a:t>
+            </a:r>
+            <a:endParaRPr lang="ko-KR" altLang="en-US" sz="1400" dirty="0">
+              <a:solidFill>
+                <a:prstClr val="black"/>
+              </a:solidFill>
+              <a:latin typeface="나눔바른펜" pitchFamily="50" charset="-127"/>
+              <a:ea typeface="나눔바른펜" pitchFamily="50" charset="-127"/>
+            </a:endParaRPr>
+          </a:p>
+        </p:txBody>
+      </p:sp>
+      <p:grpSp>
+        <p:nvGrpSpPr>
+          <p:cNvPr id="7" name="그룹 6">
+            <a:extLst>
+              <a:ext uri="{FF2B5EF4-FFF2-40B4-BE49-F238E27FC236}">
+                <a16:creationId xmlns:a16="http://schemas.microsoft.com/office/drawing/2014/main" xmlns="" id="{65952178-A365-406B-8880-90EC820461D1}"/>
+              </a:ext>
+            </a:extLst>
+          </p:cNvPr>
+          <p:cNvGrpSpPr/>
+          <p:nvPr/>
+        </p:nvGrpSpPr>
+        <p:grpSpPr>
+          <a:xfrm>
+            <a:off x="1150071" y="2761328"/>
+            <a:ext cx="909477" cy="853881"/>
+            <a:chOff x="4741320" y="1712933"/>
+            <a:chExt cx="1002274" cy="723762"/>
+          </a:xfrm>
+        </p:grpSpPr>
+        <p:sp>
+          <p:nvSpPr>
+            <p:cNvPr id="8" name="Rectangle 7">
+              <a:extLst>
+                <a:ext uri="{FF2B5EF4-FFF2-40B4-BE49-F238E27FC236}">
+                  <a16:creationId xmlns:a16="http://schemas.microsoft.com/office/drawing/2014/main" xmlns="" id="{AF20F828-F68F-440E-B6B7-4797DF327CC7}"/>
+                </a:ext>
+              </a:extLst>
+            </p:cNvPr>
+            <p:cNvSpPr>
+              <a:spLocks noChangeArrowheads="1"/>
+            </p:cNvSpPr>
+            <p:nvPr/>
+          </p:nvSpPr>
+          <p:spPr bwMode="auto">
+            <a:xfrm>
+              <a:off x="4741320" y="1712933"/>
+              <a:ext cx="223658" cy="82427"/>
+            </a:xfrm>
+            <a:prstGeom prst="rect">
+              <a:avLst/>
+            </a:prstGeom>
+            <a:solidFill>
+              <a:srgbClr val="00B050"/>
+            </a:solidFill>
+            <a:ln>
+              <a:noFill/>
+            </a:ln>
+            <a:extLst>
+              <a:ext uri="{91240B29-F687-4F45-9708-019B960494DF}">
+                <a14:hiddenLine xmlns:a14="http://schemas.microsoft.com/office/drawing/2010/main" w="9525">
+                  <a:solidFill>
+                    <a:srgbClr val="000000"/>
+                  </a:solidFill>
+                  <a:miter lim="800000"/>
+                  <a:headEnd/>
+                  <a:tailEnd/>
+                </a14:hiddenLine>
+              </a:ext>
+            </a:extLst>
+          </p:spPr>
+          <p:txBody>
+            <a:bodyPr vert="horz" wrap="square" lIns="91440" tIns="45721" rIns="91440" bIns="45721" numCol="1" anchor="t" anchorCtr="0" compatLnSpc="1">
+              <a:prstTxWarp prst="textNoShape">
+                <a:avLst/>
+              </a:prstTxWarp>
+            </a:bodyPr>
+            <a:lstStyle/>
+            <a:p>
+              <a:pPr marL="0" marR="0" lvl="0" indent="0" algn="ctr" defTabSz="914400" eaLnBrk="1" fontAlgn="auto" latinLnBrk="1" hangingPunct="1">
+                <a:lnSpc>
+                  <a:spcPct val="100000"/>
+                </a:lnSpc>
+                <a:spcBef>
+                  <a:spcPts val="0"/>
+                </a:spcBef>
+                <a:spcAft>
+                  <a:spcPts val="0"/>
+                </a:spcAft>
+                <a:buClrTx/>
+                <a:buSzTx/>
+                <a:buFontTx/>
+                <a:buNone/>
+                <a:tabLst/>
+                <a:defRPr/>
+              </a:pPr>
+              <a:endParaRPr kumimoji="0" lang="ko-KR" altLang="en-US" sz="1801" b="0" i="0" u="none" strike="noStrike" kern="0" cap="none" spc="0" normalizeH="0" baseline="0" noProof="0" smtClean="0">
+                <a:ln>
+                  <a:noFill/>
+                </a:ln>
+                <a:solidFill>
+                  <a:prstClr val="black"/>
+                </a:solidFill>
+                <a:effectLst/>
+                <a:uLnTx/>
+                <a:uFillTx/>
+              </a:endParaRPr>
+            </a:p>
+          </p:txBody>
+        </p:sp>
+        <p:sp>
+          <p:nvSpPr>
+            <p:cNvPr id="9" name="Rectangle 8">
+              <a:extLst>
+                <a:ext uri="{FF2B5EF4-FFF2-40B4-BE49-F238E27FC236}">
+                  <a16:creationId xmlns:a16="http://schemas.microsoft.com/office/drawing/2014/main" xmlns="" id="{BCCFB248-51E1-400F-821E-C290F02B44C9}"/>
+                </a:ext>
+              </a:extLst>
+            </p:cNvPr>
+            <p:cNvSpPr>
+              <a:spLocks noChangeArrowheads="1"/>
+            </p:cNvSpPr>
+            <p:nvPr/>
+          </p:nvSpPr>
+          <p:spPr bwMode="auto">
+            <a:xfrm>
+              <a:off x="5000797" y="1712933"/>
+              <a:ext cx="223658" cy="82427"/>
+            </a:xfrm>
+            <a:prstGeom prst="rect">
+              <a:avLst/>
+            </a:prstGeom>
+            <a:solidFill>
+              <a:srgbClr val="00B050"/>
+            </a:solidFill>
+            <a:ln>
+              <a:noFill/>
+            </a:ln>
+            <a:extLst>
+              <a:ext uri="{91240B29-F687-4F45-9708-019B960494DF}">
+                <a14:hiddenLine xmlns:a14="http://schemas.microsoft.com/office/drawing/2010/main" w="9525">
+                  <a:solidFill>
+                    <a:srgbClr val="000000"/>
+                  </a:solidFill>
+                  <a:miter lim="800000"/>
+                  <a:headEnd/>
+                  <a:tailEnd/>
+                </a14:hiddenLine>
+              </a:ext>
+            </a:extLst>
+          </p:spPr>
+          <p:txBody>
+            <a:bodyPr vert="horz" wrap="square" lIns="91440" tIns="45721" rIns="91440" bIns="45721" numCol="1" anchor="t" anchorCtr="0" compatLnSpc="1">
+              <a:prstTxWarp prst="textNoShape">
+                <a:avLst/>
+              </a:prstTxWarp>
+            </a:bodyPr>
+            <a:lstStyle/>
+            <a:p>
+              <a:pPr marL="0" marR="0" lvl="0" indent="0" algn="ctr" defTabSz="914400" eaLnBrk="1" fontAlgn="auto" latinLnBrk="1" hangingPunct="1">
+                <a:lnSpc>
+                  <a:spcPct val="100000"/>
+                </a:lnSpc>
+                <a:spcBef>
+                  <a:spcPts val="0"/>
+                </a:spcBef>
+                <a:spcAft>
+                  <a:spcPts val="0"/>
+                </a:spcAft>
+                <a:buClrTx/>
+                <a:buSzTx/>
+                <a:buFontTx/>
+                <a:buNone/>
+                <a:tabLst/>
+                <a:defRPr/>
+              </a:pPr>
+              <a:endParaRPr kumimoji="0" lang="ko-KR" altLang="en-US" sz="1801" b="0" i="0" u="none" strike="noStrike" kern="0" cap="none" spc="0" normalizeH="0" baseline="0" noProof="0" smtClean="0">
+                <a:ln>
+                  <a:noFill/>
+                </a:ln>
+                <a:solidFill>
+                  <a:prstClr val="black"/>
+                </a:solidFill>
+                <a:effectLst/>
+                <a:uLnTx/>
+                <a:uFillTx/>
+              </a:endParaRPr>
+            </a:p>
+          </p:txBody>
+        </p:sp>
+        <p:sp>
+          <p:nvSpPr>
+            <p:cNvPr id="10" name="Rectangle 7">
+              <a:extLst>
+                <a:ext uri="{FF2B5EF4-FFF2-40B4-BE49-F238E27FC236}">
+                  <a16:creationId xmlns:a16="http://schemas.microsoft.com/office/drawing/2014/main" xmlns="" id="{B6EF7619-A9AD-4C7A-B074-2622A6F523C6}"/>
+                </a:ext>
+              </a:extLst>
+            </p:cNvPr>
+            <p:cNvSpPr>
+              <a:spLocks noChangeArrowheads="1"/>
+            </p:cNvSpPr>
+            <p:nvPr/>
+          </p:nvSpPr>
+          <p:spPr bwMode="auto">
+            <a:xfrm>
+              <a:off x="4741320" y="1844248"/>
+              <a:ext cx="223658" cy="82427"/>
+            </a:xfrm>
+            <a:prstGeom prst="rect">
+              <a:avLst/>
+            </a:prstGeom>
+            <a:solidFill>
+              <a:srgbClr val="00B050">
+                <a:alpha val="50000"/>
+              </a:srgbClr>
+            </a:solidFill>
+            <a:ln>
+              <a:noFill/>
+            </a:ln>
+            <a:extLst>
+              <a:ext uri="{91240B29-F687-4F45-9708-019B960494DF}">
+                <a14:hiddenLine xmlns:a14="http://schemas.microsoft.com/office/drawing/2010/main" w="9525">
+                  <a:solidFill>
+                    <a:srgbClr val="000000"/>
+                  </a:solidFill>
+                  <a:miter lim="800000"/>
+                  <a:headEnd/>
+                  <a:tailEnd/>
+                </a14:hiddenLine>
+              </a:ext>
+            </a:extLst>
+          </p:spPr>
+          <p:txBody>
+            <a:bodyPr vert="horz" wrap="square" lIns="91440" tIns="45721" rIns="91440" bIns="45721" numCol="1" anchor="t" anchorCtr="0" compatLnSpc="1">
+              <a:prstTxWarp prst="textNoShape">
+                <a:avLst/>
+              </a:prstTxWarp>
+            </a:bodyPr>
+            <a:lstStyle/>
+            <a:p>
+              <a:pPr marL="0" marR="0" lvl="0" indent="0" algn="ctr" defTabSz="914400" eaLnBrk="1" fontAlgn="auto" latinLnBrk="1" hangingPunct="1">
+                <a:lnSpc>
+                  <a:spcPct val="100000"/>
+                </a:lnSpc>
+                <a:spcBef>
+                  <a:spcPts val="0"/>
+                </a:spcBef>
+                <a:spcAft>
+                  <a:spcPts val="0"/>
+                </a:spcAft>
+                <a:buClrTx/>
+                <a:buSzTx/>
+                <a:buFontTx/>
+                <a:buNone/>
+                <a:tabLst/>
+                <a:defRPr/>
+              </a:pPr>
+              <a:endParaRPr kumimoji="0" lang="ko-KR" altLang="en-US" sz="1801" b="0" i="0" u="none" strike="noStrike" kern="0" cap="none" spc="0" normalizeH="0" baseline="0" noProof="0" smtClean="0">
+                <a:ln>
+                  <a:noFill/>
+                </a:ln>
+                <a:solidFill>
+                  <a:prstClr val="black"/>
+                </a:solidFill>
+                <a:effectLst/>
+                <a:uLnTx/>
+                <a:uFillTx/>
+              </a:endParaRPr>
+            </a:p>
+          </p:txBody>
+        </p:sp>
+        <p:sp>
+          <p:nvSpPr>
+            <p:cNvPr id="11" name="Rectangle 8">
+              <a:extLst>
+                <a:ext uri="{FF2B5EF4-FFF2-40B4-BE49-F238E27FC236}">
+                  <a16:creationId xmlns:a16="http://schemas.microsoft.com/office/drawing/2014/main" xmlns="" id="{A8177DDA-E5C9-45EB-A579-B8F3EA676ABA}"/>
+                </a:ext>
+              </a:extLst>
+            </p:cNvPr>
+            <p:cNvSpPr>
+              <a:spLocks noChangeArrowheads="1"/>
+            </p:cNvSpPr>
+            <p:nvPr/>
+          </p:nvSpPr>
+          <p:spPr bwMode="auto">
+            <a:xfrm>
+              <a:off x="5000797" y="1844248"/>
+              <a:ext cx="223658" cy="82427"/>
+            </a:xfrm>
+            <a:prstGeom prst="rect">
+              <a:avLst/>
+            </a:prstGeom>
+            <a:solidFill>
+              <a:srgbClr val="00B050">
+                <a:alpha val="50000"/>
+              </a:srgbClr>
+            </a:solidFill>
+            <a:ln>
+              <a:noFill/>
+            </a:ln>
+            <a:extLst>
+              <a:ext uri="{91240B29-F687-4F45-9708-019B960494DF}">
+                <a14:hiddenLine xmlns:a14="http://schemas.microsoft.com/office/drawing/2010/main" w="9525">
+                  <a:solidFill>
+                    <a:srgbClr val="000000"/>
+                  </a:solidFill>
+                  <a:miter lim="800000"/>
+                  <a:headEnd/>
+                  <a:tailEnd/>
+                </a14:hiddenLine>
+              </a:ext>
+            </a:extLst>
+          </p:spPr>
+          <p:txBody>
+            <a:bodyPr vert="horz" wrap="square" lIns="91440" tIns="45721" rIns="91440" bIns="45721" numCol="1" anchor="t" anchorCtr="0" compatLnSpc="1">
+              <a:prstTxWarp prst="textNoShape">
+                <a:avLst/>
+              </a:prstTxWarp>
+            </a:bodyPr>
+            <a:lstStyle/>
+            <a:p>
+              <a:pPr marL="0" marR="0" lvl="0" indent="0" algn="ctr" defTabSz="914400" eaLnBrk="1" fontAlgn="auto" latinLnBrk="1" hangingPunct="1">
+                <a:lnSpc>
+                  <a:spcPct val="100000"/>
+                </a:lnSpc>
+                <a:spcBef>
+                  <a:spcPts val="0"/>
+                </a:spcBef>
+                <a:spcAft>
+                  <a:spcPts val="0"/>
+                </a:spcAft>
+                <a:buClrTx/>
+                <a:buSzTx/>
+                <a:buFontTx/>
+                <a:buNone/>
+                <a:tabLst/>
+                <a:defRPr/>
+              </a:pPr>
+              <a:endParaRPr kumimoji="0" lang="ko-KR" altLang="en-US" sz="1801" b="0" i="0" u="none" strike="noStrike" kern="0" cap="none" spc="0" normalizeH="0" baseline="0" noProof="0" smtClean="0">
+                <a:ln>
+                  <a:noFill/>
+                </a:ln>
+                <a:solidFill>
+                  <a:prstClr val="black"/>
+                </a:solidFill>
+                <a:effectLst/>
+                <a:uLnTx/>
+                <a:uFillTx/>
+              </a:endParaRPr>
+            </a:p>
+          </p:txBody>
+        </p:sp>
+        <p:sp>
+          <p:nvSpPr>
+            <p:cNvPr id="12" name="Rectangle 7">
+              <a:extLst>
+                <a:ext uri="{FF2B5EF4-FFF2-40B4-BE49-F238E27FC236}">
+                  <a16:creationId xmlns:a16="http://schemas.microsoft.com/office/drawing/2014/main" xmlns="" id="{C3CC9177-C526-4F70-973D-EB400EB6F857}"/>
+                </a:ext>
+              </a:extLst>
+            </p:cNvPr>
+            <p:cNvSpPr>
+              <a:spLocks noChangeArrowheads="1"/>
+            </p:cNvSpPr>
+            <p:nvPr/>
+          </p:nvSpPr>
+          <p:spPr bwMode="auto">
+            <a:xfrm>
+              <a:off x="4741320" y="1966677"/>
+              <a:ext cx="223658" cy="82427"/>
+            </a:xfrm>
+            <a:prstGeom prst="rect">
+              <a:avLst/>
+            </a:prstGeom>
+            <a:solidFill>
+              <a:srgbClr val="00B050">
+                <a:alpha val="50000"/>
+              </a:srgbClr>
+            </a:solidFill>
+            <a:ln>
+              <a:noFill/>
+            </a:ln>
+            <a:extLst>
+              <a:ext uri="{91240B29-F687-4F45-9708-019B960494DF}">
+                <a14:hiddenLine xmlns:a14="http://schemas.microsoft.com/office/drawing/2010/main" w="9525">
+                  <a:solidFill>
+                    <a:srgbClr val="000000"/>
+                  </a:solidFill>
+                  <a:miter lim="800000"/>
+                  <a:headEnd/>
+                  <a:tailEnd/>
+                </a14:hiddenLine>
+              </a:ext>
+            </a:extLst>
+          </p:spPr>
+          <p:txBody>
+            <a:bodyPr vert="horz" wrap="square" lIns="91440" tIns="45721" rIns="91440" bIns="45721" numCol="1" anchor="t" anchorCtr="0" compatLnSpc="1">
+              <a:prstTxWarp prst="textNoShape">
+                <a:avLst/>
+              </a:prstTxWarp>
+            </a:bodyPr>
+            <a:lstStyle/>
+            <a:p>
+              <a:pPr marL="0" marR="0" lvl="0" indent="0" algn="ctr" defTabSz="914400" eaLnBrk="1" fontAlgn="auto" latinLnBrk="1" hangingPunct="1">
+                <a:lnSpc>
+                  <a:spcPct val="100000"/>
+                </a:lnSpc>
+                <a:spcBef>
+                  <a:spcPts val="0"/>
+                </a:spcBef>
+                <a:spcAft>
+                  <a:spcPts val="0"/>
+                </a:spcAft>
+                <a:buClrTx/>
+                <a:buSzTx/>
+                <a:buFontTx/>
+                <a:buNone/>
+                <a:tabLst/>
+                <a:defRPr/>
+              </a:pPr>
+              <a:endParaRPr kumimoji="0" lang="ko-KR" altLang="en-US" sz="1801" b="0" i="0" u="none" strike="noStrike" kern="0" cap="none" spc="0" normalizeH="0" baseline="0" noProof="0" smtClean="0">
+                <a:ln>
+                  <a:noFill/>
+                </a:ln>
+                <a:solidFill>
+                  <a:prstClr val="black"/>
+                </a:solidFill>
+                <a:effectLst/>
+                <a:uLnTx/>
+                <a:uFillTx/>
+              </a:endParaRPr>
+            </a:p>
+          </p:txBody>
+        </p:sp>
+        <p:sp>
+          <p:nvSpPr>
+            <p:cNvPr id="13" name="Rectangle 8">
+              <a:extLst>
+                <a:ext uri="{FF2B5EF4-FFF2-40B4-BE49-F238E27FC236}">
+                  <a16:creationId xmlns:a16="http://schemas.microsoft.com/office/drawing/2014/main" xmlns="" id="{EBB52077-721D-4DAF-998C-A89C9217EE1D}"/>
+                </a:ext>
+              </a:extLst>
+            </p:cNvPr>
+            <p:cNvSpPr>
+              <a:spLocks noChangeArrowheads="1"/>
+            </p:cNvSpPr>
+            <p:nvPr/>
+          </p:nvSpPr>
+          <p:spPr bwMode="auto">
+            <a:xfrm>
+              <a:off x="5000797" y="1966677"/>
+              <a:ext cx="223658" cy="82427"/>
+            </a:xfrm>
+            <a:prstGeom prst="rect">
+              <a:avLst/>
+            </a:prstGeom>
+            <a:solidFill>
+              <a:srgbClr val="00B050">
+                <a:alpha val="50000"/>
+              </a:srgbClr>
+            </a:solidFill>
+            <a:ln>
+              <a:noFill/>
+            </a:ln>
+            <a:extLst>
+              <a:ext uri="{91240B29-F687-4F45-9708-019B960494DF}">
+                <a14:hiddenLine xmlns:a14="http://schemas.microsoft.com/office/drawing/2010/main" w="9525">
+                  <a:solidFill>
+                    <a:srgbClr val="000000"/>
+                  </a:solidFill>
+                  <a:miter lim="800000"/>
+                  <a:headEnd/>
+                  <a:tailEnd/>
+                </a14:hiddenLine>
+              </a:ext>
+            </a:extLst>
+          </p:spPr>
+          <p:txBody>
+            <a:bodyPr vert="horz" wrap="square" lIns="91440" tIns="45721" rIns="91440" bIns="45721" numCol="1" anchor="t" anchorCtr="0" compatLnSpc="1">
+              <a:prstTxWarp prst="textNoShape">
+                <a:avLst/>
+              </a:prstTxWarp>
+            </a:bodyPr>
+            <a:lstStyle/>
+            <a:p>
+              <a:pPr marL="0" marR="0" lvl="0" indent="0" algn="ctr" defTabSz="914400" eaLnBrk="1" fontAlgn="auto" latinLnBrk="1" hangingPunct="1">
+                <a:lnSpc>
+                  <a:spcPct val="100000"/>
+                </a:lnSpc>
+                <a:spcBef>
+                  <a:spcPts val="0"/>
+                </a:spcBef>
+                <a:spcAft>
+                  <a:spcPts val="0"/>
+                </a:spcAft>
+                <a:buClrTx/>
+                <a:buSzTx/>
+                <a:buFontTx/>
+                <a:buNone/>
+                <a:tabLst/>
+                <a:defRPr/>
+              </a:pPr>
+              <a:endParaRPr kumimoji="0" lang="ko-KR" altLang="en-US" sz="1801" b="0" i="0" u="none" strike="noStrike" kern="0" cap="none" spc="0" normalizeH="0" baseline="0" noProof="0" smtClean="0">
+                <a:ln>
+                  <a:noFill/>
+                </a:ln>
+                <a:solidFill>
+                  <a:prstClr val="black"/>
+                </a:solidFill>
+                <a:effectLst/>
+                <a:uLnTx/>
+                <a:uFillTx/>
+              </a:endParaRPr>
+            </a:p>
+          </p:txBody>
+        </p:sp>
+        <p:sp>
+          <p:nvSpPr>
+            <p:cNvPr id="14" name="Rectangle 7">
+              <a:extLst>
+                <a:ext uri="{FF2B5EF4-FFF2-40B4-BE49-F238E27FC236}">
+                  <a16:creationId xmlns:a16="http://schemas.microsoft.com/office/drawing/2014/main" xmlns="" id="{75E63A45-B2B9-450A-A669-1BE070A81E41}"/>
+                </a:ext>
+              </a:extLst>
+            </p:cNvPr>
+            <p:cNvSpPr>
+              <a:spLocks noChangeArrowheads="1"/>
+            </p:cNvSpPr>
+            <p:nvPr/>
+          </p:nvSpPr>
+          <p:spPr bwMode="auto">
+            <a:xfrm>
+              <a:off x="4741320" y="2089107"/>
+              <a:ext cx="223658" cy="82427"/>
+            </a:xfrm>
+            <a:prstGeom prst="rect">
+              <a:avLst/>
+            </a:prstGeom>
+            <a:solidFill>
+              <a:srgbClr val="00B050">
+                <a:alpha val="50000"/>
+              </a:srgbClr>
+            </a:solidFill>
+            <a:ln>
+              <a:noFill/>
+            </a:ln>
+            <a:extLst>
+              <a:ext uri="{91240B29-F687-4F45-9708-019B960494DF}">
+                <a14:hiddenLine xmlns:a14="http://schemas.microsoft.com/office/drawing/2010/main" w="9525">
+                  <a:solidFill>
+                    <a:srgbClr val="000000"/>
+                  </a:solidFill>
+                  <a:miter lim="800000"/>
+                  <a:headEnd/>
+                  <a:tailEnd/>
+                </a14:hiddenLine>
+              </a:ext>
+            </a:extLst>
+          </p:spPr>
+          <p:txBody>
+            <a:bodyPr vert="horz" wrap="square" lIns="91440" tIns="45721" rIns="91440" bIns="45721" numCol="1" anchor="t" anchorCtr="0" compatLnSpc="1">
+              <a:prstTxWarp prst="textNoShape">
+                <a:avLst/>
+              </a:prstTxWarp>
+            </a:bodyPr>
+            <a:lstStyle/>
+            <a:p>
+              <a:pPr marL="0" marR="0" lvl="0" indent="0" algn="ctr" defTabSz="914400" eaLnBrk="1" fontAlgn="auto" latinLnBrk="1" hangingPunct="1">
+                <a:lnSpc>
+                  <a:spcPct val="100000"/>
+                </a:lnSpc>
+                <a:spcBef>
+                  <a:spcPts val="0"/>
+                </a:spcBef>
+                <a:spcAft>
+                  <a:spcPts val="0"/>
+                </a:spcAft>
+                <a:buClrTx/>
+                <a:buSzTx/>
+                <a:buFontTx/>
+                <a:buNone/>
+                <a:tabLst/>
+                <a:defRPr/>
+              </a:pPr>
+              <a:endParaRPr kumimoji="0" lang="ko-KR" altLang="en-US" sz="1801" b="0" i="0" u="none" strike="noStrike" kern="0" cap="none" spc="0" normalizeH="0" baseline="0" noProof="0" smtClean="0">
+                <a:ln>
+                  <a:noFill/>
+                </a:ln>
+                <a:solidFill>
+                  <a:prstClr val="black"/>
+                </a:solidFill>
+                <a:effectLst/>
+                <a:uLnTx/>
+                <a:uFillTx/>
+              </a:endParaRPr>
+            </a:p>
+          </p:txBody>
+        </p:sp>
+        <p:sp>
+          <p:nvSpPr>
+            <p:cNvPr id="15" name="Rectangle 8">
+              <a:extLst>
+                <a:ext uri="{FF2B5EF4-FFF2-40B4-BE49-F238E27FC236}">
+                  <a16:creationId xmlns:a16="http://schemas.microsoft.com/office/drawing/2014/main" xmlns="" id="{39ECE5CF-342E-43A7-A571-F1C450504535}"/>
+                </a:ext>
+              </a:extLst>
+            </p:cNvPr>
+            <p:cNvSpPr>
+              <a:spLocks noChangeArrowheads="1"/>
+            </p:cNvSpPr>
+            <p:nvPr/>
+          </p:nvSpPr>
+          <p:spPr bwMode="auto">
+            <a:xfrm>
+              <a:off x="5000797" y="2089107"/>
+              <a:ext cx="223658" cy="82427"/>
+            </a:xfrm>
+            <a:prstGeom prst="rect">
+              <a:avLst/>
+            </a:prstGeom>
+            <a:solidFill>
+              <a:srgbClr val="00B050">
+                <a:alpha val="50000"/>
+              </a:srgbClr>
+            </a:solidFill>
+            <a:ln>
+              <a:noFill/>
+            </a:ln>
+            <a:extLst>
+              <a:ext uri="{91240B29-F687-4F45-9708-019B960494DF}">
+                <a14:hiddenLine xmlns:a14="http://schemas.microsoft.com/office/drawing/2010/main" w="9525">
+                  <a:solidFill>
+                    <a:srgbClr val="000000"/>
+                  </a:solidFill>
+                  <a:miter lim="800000"/>
+                  <a:headEnd/>
+                  <a:tailEnd/>
+                </a14:hiddenLine>
+              </a:ext>
+            </a:extLst>
+          </p:spPr>
+          <p:txBody>
+            <a:bodyPr vert="horz" wrap="square" lIns="91440" tIns="45721" rIns="91440" bIns="45721" numCol="1" anchor="t" anchorCtr="0" compatLnSpc="1">
+              <a:prstTxWarp prst="textNoShape">
+                <a:avLst/>
+              </a:prstTxWarp>
+            </a:bodyPr>
+            <a:lstStyle/>
+            <a:p>
+              <a:pPr marL="0" marR="0" lvl="0" indent="0" algn="ctr" defTabSz="914400" eaLnBrk="1" fontAlgn="auto" latinLnBrk="1" hangingPunct="1">
+                <a:lnSpc>
+                  <a:spcPct val="100000"/>
+                </a:lnSpc>
+                <a:spcBef>
+                  <a:spcPts val="0"/>
+                </a:spcBef>
+                <a:spcAft>
+                  <a:spcPts val="0"/>
+                </a:spcAft>
+                <a:buClrTx/>
+                <a:buSzTx/>
+                <a:buFontTx/>
+                <a:buNone/>
+                <a:tabLst/>
+                <a:defRPr/>
+              </a:pPr>
+              <a:endParaRPr kumimoji="0" lang="ko-KR" altLang="en-US" sz="1801" b="0" i="0" u="none" strike="noStrike" kern="0" cap="none" spc="0" normalizeH="0" baseline="0" noProof="0" smtClean="0">
+                <a:ln>
+                  <a:noFill/>
+                </a:ln>
+                <a:solidFill>
+                  <a:prstClr val="black"/>
+                </a:solidFill>
+                <a:effectLst/>
+                <a:uLnTx/>
+                <a:uFillTx/>
+              </a:endParaRPr>
+            </a:p>
+          </p:txBody>
+        </p:sp>
+        <p:sp>
+          <p:nvSpPr>
+            <p:cNvPr id="16" name="Rectangle 7">
+              <a:extLst>
+                <a:ext uri="{FF2B5EF4-FFF2-40B4-BE49-F238E27FC236}">
+                  <a16:creationId xmlns:a16="http://schemas.microsoft.com/office/drawing/2014/main" xmlns="" id="{23BB6DCD-D040-42DE-A66E-44713A06FCEB}"/>
+                </a:ext>
+              </a:extLst>
+            </p:cNvPr>
+            <p:cNvSpPr>
+              <a:spLocks noChangeArrowheads="1"/>
+            </p:cNvSpPr>
+            <p:nvPr/>
+          </p:nvSpPr>
+          <p:spPr bwMode="auto">
+            <a:xfrm>
+              <a:off x="4741320" y="2231838"/>
+              <a:ext cx="223658" cy="82427"/>
+            </a:xfrm>
+            <a:prstGeom prst="rect">
+              <a:avLst/>
+            </a:prstGeom>
+            <a:solidFill>
+              <a:srgbClr val="00B050">
+                <a:alpha val="50000"/>
+              </a:srgbClr>
+            </a:solidFill>
+            <a:ln>
+              <a:noFill/>
+            </a:ln>
+            <a:extLst>
+              <a:ext uri="{91240B29-F687-4F45-9708-019B960494DF}">
+                <a14:hiddenLine xmlns:a14="http://schemas.microsoft.com/office/drawing/2010/main" w="9525">
+                  <a:solidFill>
+                    <a:srgbClr val="000000"/>
+                  </a:solidFill>
+                  <a:miter lim="800000"/>
+                  <a:headEnd/>
+                  <a:tailEnd/>
+                </a14:hiddenLine>
+              </a:ext>
+            </a:extLst>
+          </p:spPr>
+          <p:txBody>
+            <a:bodyPr vert="horz" wrap="square" lIns="91440" tIns="45721" rIns="91440" bIns="45721" numCol="1" anchor="t" anchorCtr="0" compatLnSpc="1">
+              <a:prstTxWarp prst="textNoShape">
+                <a:avLst/>
+              </a:prstTxWarp>
+            </a:bodyPr>
+            <a:lstStyle/>
+            <a:p>
+              <a:pPr marL="0" marR="0" lvl="0" indent="0" algn="ctr" defTabSz="914400" eaLnBrk="1" fontAlgn="auto" latinLnBrk="1" hangingPunct="1">
+                <a:lnSpc>
+                  <a:spcPct val="100000"/>
+                </a:lnSpc>
+                <a:spcBef>
+                  <a:spcPts val="0"/>
+                </a:spcBef>
+                <a:spcAft>
+                  <a:spcPts val="0"/>
+                </a:spcAft>
+                <a:buClrTx/>
+                <a:buSzTx/>
+                <a:buFontTx/>
+                <a:buNone/>
+                <a:tabLst/>
+                <a:defRPr/>
+              </a:pPr>
+              <a:endParaRPr kumimoji="0" lang="ko-KR" altLang="en-US" sz="1801" b="0" i="0" u="none" strike="noStrike" kern="0" cap="none" spc="0" normalizeH="0" baseline="0" noProof="0" smtClean="0">
+                <a:ln>
+                  <a:noFill/>
+                </a:ln>
+                <a:solidFill>
+                  <a:prstClr val="black"/>
+                </a:solidFill>
+                <a:effectLst/>
+                <a:uLnTx/>
+                <a:uFillTx/>
+              </a:endParaRPr>
+            </a:p>
+          </p:txBody>
+        </p:sp>
+        <p:sp>
+          <p:nvSpPr>
+            <p:cNvPr id="17" name="Rectangle 8">
+              <a:extLst>
+                <a:ext uri="{FF2B5EF4-FFF2-40B4-BE49-F238E27FC236}">
+                  <a16:creationId xmlns:a16="http://schemas.microsoft.com/office/drawing/2014/main" xmlns="" id="{C818C870-BCF3-4722-B0AC-F9B21B375642}"/>
+                </a:ext>
+              </a:extLst>
+            </p:cNvPr>
+            <p:cNvSpPr>
+              <a:spLocks noChangeArrowheads="1"/>
+            </p:cNvSpPr>
+            <p:nvPr/>
+          </p:nvSpPr>
+          <p:spPr bwMode="auto">
+            <a:xfrm>
+              <a:off x="5000797" y="2231838"/>
+              <a:ext cx="223658" cy="82427"/>
+            </a:xfrm>
+            <a:prstGeom prst="rect">
+              <a:avLst/>
+            </a:prstGeom>
+            <a:solidFill>
+              <a:srgbClr val="00B050">
+                <a:alpha val="50000"/>
+              </a:srgbClr>
+            </a:solidFill>
+            <a:ln>
+              <a:noFill/>
+            </a:ln>
+            <a:extLst>
+              <a:ext uri="{91240B29-F687-4F45-9708-019B960494DF}">
+                <a14:hiddenLine xmlns:a14="http://schemas.microsoft.com/office/drawing/2010/main" w="9525">
+                  <a:solidFill>
+                    <a:srgbClr val="000000"/>
+                  </a:solidFill>
+                  <a:miter lim="800000"/>
+                  <a:headEnd/>
+                  <a:tailEnd/>
+                </a14:hiddenLine>
+              </a:ext>
+            </a:extLst>
+          </p:spPr>
+          <p:txBody>
+            <a:bodyPr vert="horz" wrap="square" lIns="91440" tIns="45721" rIns="91440" bIns="45721" numCol="1" anchor="t" anchorCtr="0" compatLnSpc="1">
+              <a:prstTxWarp prst="textNoShape">
+                <a:avLst/>
+              </a:prstTxWarp>
+            </a:bodyPr>
+            <a:lstStyle/>
+            <a:p>
+              <a:pPr marL="0" marR="0" lvl="0" indent="0" algn="ctr" defTabSz="914400" eaLnBrk="1" fontAlgn="auto" latinLnBrk="1" hangingPunct="1">
+                <a:lnSpc>
+                  <a:spcPct val="100000"/>
+                </a:lnSpc>
+                <a:spcBef>
+                  <a:spcPts val="0"/>
+                </a:spcBef>
+                <a:spcAft>
+                  <a:spcPts val="0"/>
+                </a:spcAft>
+                <a:buClrTx/>
+                <a:buSzTx/>
+                <a:buFontTx/>
+                <a:buNone/>
+                <a:tabLst/>
+                <a:defRPr/>
+              </a:pPr>
+              <a:endParaRPr kumimoji="0" lang="ko-KR" altLang="en-US" sz="1801" b="0" i="0" u="none" strike="noStrike" kern="0" cap="none" spc="0" normalizeH="0" baseline="0" noProof="0" smtClean="0">
+                <a:ln>
+                  <a:noFill/>
+                </a:ln>
+                <a:solidFill>
+                  <a:prstClr val="black"/>
+                </a:solidFill>
+                <a:effectLst/>
+                <a:uLnTx/>
+                <a:uFillTx/>
+              </a:endParaRPr>
+            </a:p>
+          </p:txBody>
+        </p:sp>
+        <p:sp>
+          <p:nvSpPr>
+            <p:cNvPr id="18" name="Rectangle 7">
+              <a:extLst>
+                <a:ext uri="{FF2B5EF4-FFF2-40B4-BE49-F238E27FC236}">
+                  <a16:creationId xmlns:a16="http://schemas.microsoft.com/office/drawing/2014/main" xmlns="" id="{974E233A-A84A-438F-8E9A-4CB741A3370A}"/>
+                </a:ext>
+              </a:extLst>
+            </p:cNvPr>
+            <p:cNvSpPr>
+              <a:spLocks noChangeArrowheads="1"/>
+            </p:cNvSpPr>
+            <p:nvPr/>
+          </p:nvSpPr>
+          <p:spPr bwMode="auto">
+            <a:xfrm>
+              <a:off x="4741320" y="2354268"/>
+              <a:ext cx="223658" cy="82427"/>
+            </a:xfrm>
+            <a:prstGeom prst="rect">
+              <a:avLst/>
+            </a:prstGeom>
+            <a:solidFill>
+              <a:srgbClr val="00B050">
+                <a:alpha val="50000"/>
+              </a:srgbClr>
+            </a:solidFill>
+            <a:ln>
+              <a:noFill/>
+            </a:ln>
+            <a:extLst>
+              <a:ext uri="{91240B29-F687-4F45-9708-019B960494DF}">
+                <a14:hiddenLine xmlns:a14="http://schemas.microsoft.com/office/drawing/2010/main" w="9525">
+                  <a:solidFill>
+                    <a:srgbClr val="000000"/>
+                  </a:solidFill>
+                  <a:miter lim="800000"/>
+                  <a:headEnd/>
+                  <a:tailEnd/>
+                </a14:hiddenLine>
+              </a:ext>
+            </a:extLst>
+          </p:spPr>
+          <p:txBody>
+            <a:bodyPr vert="horz" wrap="square" lIns="91440" tIns="45721" rIns="91440" bIns="45721" numCol="1" anchor="t" anchorCtr="0" compatLnSpc="1">
+              <a:prstTxWarp prst="textNoShape">
+                <a:avLst/>
+              </a:prstTxWarp>
+            </a:bodyPr>
+            <a:lstStyle/>
+            <a:p>
+              <a:pPr marL="0" marR="0" lvl="0" indent="0" algn="ctr" defTabSz="914400" eaLnBrk="1" fontAlgn="auto" latinLnBrk="1" hangingPunct="1">
+                <a:lnSpc>
+                  <a:spcPct val="100000"/>
+                </a:lnSpc>
+                <a:spcBef>
+                  <a:spcPts val="0"/>
+                </a:spcBef>
+                <a:spcAft>
+                  <a:spcPts val="0"/>
+                </a:spcAft>
+                <a:buClrTx/>
+                <a:buSzTx/>
+                <a:buFontTx/>
+                <a:buNone/>
+                <a:tabLst/>
+                <a:defRPr/>
+              </a:pPr>
+              <a:endParaRPr kumimoji="0" lang="ko-KR" altLang="en-US" sz="1801" b="0" i="0" u="none" strike="noStrike" kern="0" cap="none" spc="0" normalizeH="0" baseline="0" noProof="0" smtClean="0">
+                <a:ln>
+                  <a:noFill/>
+                </a:ln>
+                <a:solidFill>
+                  <a:prstClr val="black"/>
+                </a:solidFill>
+                <a:effectLst/>
+                <a:uLnTx/>
+                <a:uFillTx/>
+              </a:endParaRPr>
+            </a:p>
+          </p:txBody>
+        </p:sp>
+        <p:sp>
+          <p:nvSpPr>
+            <p:cNvPr id="19" name="Rectangle 8">
+              <a:extLst>
+                <a:ext uri="{FF2B5EF4-FFF2-40B4-BE49-F238E27FC236}">
+                  <a16:creationId xmlns:a16="http://schemas.microsoft.com/office/drawing/2014/main" xmlns="" id="{8F332337-574C-47DC-AA36-CE929B3E3012}"/>
+                </a:ext>
+              </a:extLst>
+            </p:cNvPr>
+            <p:cNvSpPr>
+              <a:spLocks noChangeArrowheads="1"/>
+            </p:cNvSpPr>
+            <p:nvPr/>
+          </p:nvSpPr>
+          <p:spPr bwMode="auto">
+            <a:xfrm>
+              <a:off x="5000797" y="2354268"/>
+              <a:ext cx="223658" cy="82427"/>
+            </a:xfrm>
+            <a:prstGeom prst="rect">
+              <a:avLst/>
+            </a:prstGeom>
+            <a:solidFill>
+              <a:srgbClr val="00B050">
+                <a:alpha val="50000"/>
+              </a:srgbClr>
+            </a:solidFill>
+            <a:ln>
+              <a:noFill/>
+            </a:ln>
+            <a:extLst>
+              <a:ext uri="{91240B29-F687-4F45-9708-019B960494DF}">
+                <a14:hiddenLine xmlns:a14="http://schemas.microsoft.com/office/drawing/2010/main" w="9525">
+                  <a:solidFill>
+                    <a:srgbClr val="000000"/>
+                  </a:solidFill>
+                  <a:miter lim="800000"/>
+                  <a:headEnd/>
+                  <a:tailEnd/>
+                </a14:hiddenLine>
+              </a:ext>
+            </a:extLst>
+          </p:spPr>
+          <p:txBody>
+            <a:bodyPr vert="horz" wrap="square" lIns="91440" tIns="45721" rIns="91440" bIns="45721" numCol="1" anchor="t" anchorCtr="0" compatLnSpc="1">
+              <a:prstTxWarp prst="textNoShape">
+                <a:avLst/>
+              </a:prstTxWarp>
+            </a:bodyPr>
+            <a:lstStyle/>
+            <a:p>
+              <a:pPr marL="0" marR="0" lvl="0" indent="0" algn="ctr" defTabSz="914400" eaLnBrk="1" fontAlgn="auto" latinLnBrk="1" hangingPunct="1">
+                <a:lnSpc>
+                  <a:spcPct val="100000"/>
+                </a:lnSpc>
+                <a:spcBef>
+                  <a:spcPts val="0"/>
+                </a:spcBef>
+                <a:spcAft>
+                  <a:spcPts val="0"/>
+                </a:spcAft>
+                <a:buClrTx/>
+                <a:buSzTx/>
+                <a:buFontTx/>
+                <a:buNone/>
+                <a:tabLst/>
+                <a:defRPr/>
+              </a:pPr>
+              <a:endParaRPr kumimoji="0" lang="ko-KR" altLang="en-US" sz="1801" b="0" i="0" u="none" strike="noStrike" kern="0" cap="none" spc="0" normalizeH="0" baseline="0" noProof="0" smtClean="0">
+                <a:ln>
+                  <a:noFill/>
+                </a:ln>
+                <a:solidFill>
+                  <a:prstClr val="black"/>
+                </a:solidFill>
+                <a:effectLst/>
+                <a:uLnTx/>
+                <a:uFillTx/>
+              </a:endParaRPr>
+            </a:p>
+          </p:txBody>
+        </p:sp>
+        <p:sp>
+          <p:nvSpPr>
+            <p:cNvPr id="20" name="Rectangle 7">
+              <a:extLst>
+                <a:ext uri="{FF2B5EF4-FFF2-40B4-BE49-F238E27FC236}">
+                  <a16:creationId xmlns:a16="http://schemas.microsoft.com/office/drawing/2014/main" xmlns="" id="{A876B270-C608-4FDD-A042-72C60068D53E}"/>
+                </a:ext>
+              </a:extLst>
+            </p:cNvPr>
+            <p:cNvSpPr>
+              <a:spLocks noChangeArrowheads="1"/>
+            </p:cNvSpPr>
+            <p:nvPr/>
+          </p:nvSpPr>
+          <p:spPr bwMode="auto">
+            <a:xfrm>
+              <a:off x="5260274" y="1712933"/>
+              <a:ext cx="223658" cy="82427"/>
+            </a:xfrm>
+            <a:prstGeom prst="rect">
+              <a:avLst/>
+            </a:prstGeom>
+            <a:solidFill>
+              <a:srgbClr val="00B050"/>
+            </a:solidFill>
+            <a:ln>
+              <a:noFill/>
+            </a:ln>
+            <a:extLst>
+              <a:ext uri="{91240B29-F687-4F45-9708-019B960494DF}">
+                <a14:hiddenLine xmlns:a14="http://schemas.microsoft.com/office/drawing/2010/main" w="9525">
+                  <a:solidFill>
+                    <a:srgbClr val="000000"/>
+                  </a:solidFill>
+                  <a:miter lim="800000"/>
+                  <a:headEnd/>
+                  <a:tailEnd/>
+                </a14:hiddenLine>
+              </a:ext>
+            </a:extLst>
+          </p:spPr>
+          <p:txBody>
+            <a:bodyPr vert="horz" wrap="square" lIns="91440" tIns="45721" rIns="91440" bIns="45721" numCol="1" anchor="t" anchorCtr="0" compatLnSpc="1">
+              <a:prstTxWarp prst="textNoShape">
+                <a:avLst/>
+              </a:prstTxWarp>
+            </a:bodyPr>
+            <a:lstStyle/>
+            <a:p>
+              <a:pPr marL="0" marR="0" lvl="0" indent="0" algn="ctr" defTabSz="914400" eaLnBrk="1" fontAlgn="auto" latinLnBrk="1" hangingPunct="1">
+                <a:lnSpc>
+                  <a:spcPct val="100000"/>
+                </a:lnSpc>
+                <a:spcBef>
+                  <a:spcPts val="0"/>
+                </a:spcBef>
+                <a:spcAft>
+                  <a:spcPts val="0"/>
+                </a:spcAft>
+                <a:buClrTx/>
+                <a:buSzTx/>
+                <a:buFontTx/>
+                <a:buNone/>
+                <a:tabLst/>
+                <a:defRPr/>
+              </a:pPr>
+              <a:endParaRPr kumimoji="0" lang="ko-KR" altLang="en-US" sz="1801" b="0" i="0" u="none" strike="noStrike" kern="0" cap="none" spc="0" normalizeH="0" baseline="0" noProof="0" smtClean="0">
+                <a:ln>
+                  <a:noFill/>
+                </a:ln>
+                <a:solidFill>
+                  <a:prstClr val="black"/>
+                </a:solidFill>
+                <a:effectLst/>
+                <a:uLnTx/>
+                <a:uFillTx/>
+              </a:endParaRPr>
+            </a:p>
+          </p:txBody>
+        </p:sp>
+        <p:sp>
+          <p:nvSpPr>
+            <p:cNvPr id="21" name="Rectangle 7">
+              <a:extLst>
+                <a:ext uri="{FF2B5EF4-FFF2-40B4-BE49-F238E27FC236}">
+                  <a16:creationId xmlns:a16="http://schemas.microsoft.com/office/drawing/2014/main" xmlns="" id="{0B166B4B-6C15-4235-A725-72642181D4A6}"/>
+                </a:ext>
+              </a:extLst>
+            </p:cNvPr>
+            <p:cNvSpPr>
+              <a:spLocks noChangeArrowheads="1"/>
+            </p:cNvSpPr>
+            <p:nvPr/>
+          </p:nvSpPr>
+          <p:spPr bwMode="auto">
+            <a:xfrm>
+              <a:off x="5260274" y="1844248"/>
+              <a:ext cx="223658" cy="82427"/>
+            </a:xfrm>
+            <a:prstGeom prst="rect">
+              <a:avLst/>
+            </a:prstGeom>
+            <a:solidFill>
+              <a:srgbClr val="00B050">
+                <a:alpha val="50000"/>
+              </a:srgbClr>
+            </a:solidFill>
+            <a:ln>
+              <a:noFill/>
+            </a:ln>
+            <a:extLst>
+              <a:ext uri="{91240B29-F687-4F45-9708-019B960494DF}">
+                <a14:hiddenLine xmlns:a14="http://schemas.microsoft.com/office/drawing/2010/main" w="9525">
+                  <a:solidFill>
+                    <a:srgbClr val="000000"/>
+                  </a:solidFill>
+                  <a:miter lim="800000"/>
+                  <a:headEnd/>
+                  <a:tailEnd/>
+                </a14:hiddenLine>
+              </a:ext>
+            </a:extLst>
+          </p:spPr>
+          <p:txBody>
+            <a:bodyPr vert="horz" wrap="square" lIns="91440" tIns="45721" rIns="91440" bIns="45721" numCol="1" anchor="t" anchorCtr="0" compatLnSpc="1">
+              <a:prstTxWarp prst="textNoShape">
+                <a:avLst/>
+              </a:prstTxWarp>
+            </a:bodyPr>
+            <a:lstStyle/>
+            <a:p>
+              <a:pPr marL="0" marR="0" lvl="0" indent="0" algn="ctr" defTabSz="914400" eaLnBrk="1" fontAlgn="auto" latinLnBrk="1" hangingPunct="1">
+                <a:lnSpc>
+                  <a:spcPct val="100000"/>
+                </a:lnSpc>
+                <a:spcBef>
+                  <a:spcPts val="0"/>
+                </a:spcBef>
+                <a:spcAft>
+                  <a:spcPts val="0"/>
+                </a:spcAft>
+                <a:buClrTx/>
+                <a:buSzTx/>
+                <a:buFontTx/>
+                <a:buNone/>
+                <a:tabLst/>
+                <a:defRPr/>
+              </a:pPr>
+              <a:endParaRPr kumimoji="0" lang="ko-KR" altLang="en-US" sz="1801" b="0" i="0" u="none" strike="noStrike" kern="0" cap="none" spc="0" normalizeH="0" baseline="0" noProof="0" smtClean="0">
+                <a:ln>
+                  <a:noFill/>
+                </a:ln>
+                <a:solidFill>
+                  <a:prstClr val="black"/>
+                </a:solidFill>
+                <a:effectLst/>
+                <a:uLnTx/>
+                <a:uFillTx/>
+              </a:endParaRPr>
+            </a:p>
+          </p:txBody>
+        </p:sp>
+        <p:sp>
+          <p:nvSpPr>
+            <p:cNvPr id="22" name="Rectangle 7">
+              <a:extLst>
+                <a:ext uri="{FF2B5EF4-FFF2-40B4-BE49-F238E27FC236}">
+                  <a16:creationId xmlns:a16="http://schemas.microsoft.com/office/drawing/2014/main" xmlns="" id="{AEC8F6E6-D3C1-43BF-B6B0-024EC0AAA728}"/>
+                </a:ext>
+              </a:extLst>
+            </p:cNvPr>
+            <p:cNvSpPr>
+              <a:spLocks noChangeArrowheads="1"/>
+            </p:cNvSpPr>
+            <p:nvPr/>
+          </p:nvSpPr>
+          <p:spPr bwMode="auto">
+            <a:xfrm>
+              <a:off x="5260274" y="1966677"/>
+              <a:ext cx="223658" cy="82427"/>
+            </a:xfrm>
+            <a:prstGeom prst="rect">
+              <a:avLst/>
+            </a:prstGeom>
+            <a:solidFill>
+              <a:srgbClr val="00B050">
+                <a:alpha val="50000"/>
+              </a:srgbClr>
+            </a:solidFill>
+            <a:ln>
+              <a:noFill/>
+            </a:ln>
+            <a:extLst>
+              <a:ext uri="{91240B29-F687-4F45-9708-019B960494DF}">
+                <a14:hiddenLine xmlns:a14="http://schemas.microsoft.com/office/drawing/2010/main" w="9525">
+                  <a:solidFill>
+                    <a:srgbClr val="000000"/>
+                  </a:solidFill>
+                  <a:miter lim="800000"/>
+                  <a:headEnd/>
+                  <a:tailEnd/>
+                </a14:hiddenLine>
+              </a:ext>
+            </a:extLst>
+          </p:spPr>
+          <p:txBody>
+            <a:bodyPr vert="horz" wrap="square" lIns="91440" tIns="45721" rIns="91440" bIns="45721" numCol="1" anchor="t" anchorCtr="0" compatLnSpc="1">
+              <a:prstTxWarp prst="textNoShape">
+                <a:avLst/>
+              </a:prstTxWarp>
+            </a:bodyPr>
+            <a:lstStyle/>
+            <a:p>
+              <a:pPr marL="0" marR="0" lvl="0" indent="0" algn="ctr" defTabSz="914400" eaLnBrk="1" fontAlgn="auto" latinLnBrk="1" hangingPunct="1">
+                <a:lnSpc>
+                  <a:spcPct val="100000"/>
+                </a:lnSpc>
+                <a:spcBef>
+                  <a:spcPts val="0"/>
+                </a:spcBef>
+                <a:spcAft>
+                  <a:spcPts val="0"/>
+                </a:spcAft>
+                <a:buClrTx/>
+                <a:buSzTx/>
+                <a:buFontTx/>
+                <a:buNone/>
+                <a:tabLst/>
+                <a:defRPr/>
+              </a:pPr>
+              <a:endParaRPr kumimoji="0" lang="ko-KR" altLang="en-US" sz="1801" b="0" i="0" u="none" strike="noStrike" kern="0" cap="none" spc="0" normalizeH="0" baseline="0" noProof="0" smtClean="0">
+                <a:ln>
+                  <a:noFill/>
+                </a:ln>
+                <a:solidFill>
+                  <a:prstClr val="black"/>
+                </a:solidFill>
+                <a:effectLst/>
+                <a:uLnTx/>
+                <a:uFillTx/>
+              </a:endParaRPr>
+            </a:p>
+          </p:txBody>
+        </p:sp>
+        <p:sp>
+          <p:nvSpPr>
+            <p:cNvPr id="23" name="Rectangle 7">
+              <a:extLst>
+                <a:ext uri="{FF2B5EF4-FFF2-40B4-BE49-F238E27FC236}">
+                  <a16:creationId xmlns:a16="http://schemas.microsoft.com/office/drawing/2014/main" xmlns="" id="{F705DA92-DB5C-4E78-A6F1-8A1FBD51022C}"/>
+                </a:ext>
+              </a:extLst>
+            </p:cNvPr>
+            <p:cNvSpPr>
+              <a:spLocks noChangeArrowheads="1"/>
+            </p:cNvSpPr>
+            <p:nvPr/>
+          </p:nvSpPr>
+          <p:spPr bwMode="auto">
+            <a:xfrm>
+              <a:off x="5260274" y="2089107"/>
+              <a:ext cx="223658" cy="82427"/>
+            </a:xfrm>
+            <a:prstGeom prst="rect">
+              <a:avLst/>
+            </a:prstGeom>
+            <a:solidFill>
+              <a:srgbClr val="00B050">
+                <a:alpha val="50000"/>
+              </a:srgbClr>
+            </a:solidFill>
+            <a:ln>
+              <a:noFill/>
+            </a:ln>
+            <a:extLst>
+              <a:ext uri="{91240B29-F687-4F45-9708-019B960494DF}">
+                <a14:hiddenLine xmlns:a14="http://schemas.microsoft.com/office/drawing/2010/main" w="9525">
+                  <a:solidFill>
+                    <a:srgbClr val="000000"/>
+                  </a:solidFill>
+                  <a:miter lim="800000"/>
+                  <a:headEnd/>
+                  <a:tailEnd/>
+                </a14:hiddenLine>
+              </a:ext>
+            </a:extLst>
+          </p:spPr>
+          <p:txBody>
+            <a:bodyPr vert="horz" wrap="square" lIns="91440" tIns="45721" rIns="91440" bIns="45721" numCol="1" anchor="t" anchorCtr="0" compatLnSpc="1">
+              <a:prstTxWarp prst="textNoShape">
+                <a:avLst/>
+              </a:prstTxWarp>
+            </a:bodyPr>
+            <a:lstStyle/>
+            <a:p>
+              <a:pPr marL="0" marR="0" lvl="0" indent="0" algn="ctr" defTabSz="914400" eaLnBrk="1" fontAlgn="auto" latinLnBrk="1" hangingPunct="1">
+                <a:lnSpc>
+                  <a:spcPct val="100000"/>
+                </a:lnSpc>
+                <a:spcBef>
+                  <a:spcPts val="0"/>
+                </a:spcBef>
+                <a:spcAft>
+                  <a:spcPts val="0"/>
+                </a:spcAft>
+                <a:buClrTx/>
+                <a:buSzTx/>
+                <a:buFontTx/>
+                <a:buNone/>
+                <a:tabLst/>
+                <a:defRPr/>
+              </a:pPr>
+              <a:endParaRPr kumimoji="0" lang="ko-KR" altLang="en-US" sz="1801" b="0" i="0" u="none" strike="noStrike" kern="0" cap="none" spc="0" normalizeH="0" baseline="0" noProof="0" smtClean="0">
+                <a:ln>
+                  <a:noFill/>
+                </a:ln>
+                <a:solidFill>
+                  <a:prstClr val="black"/>
+                </a:solidFill>
+                <a:effectLst/>
+                <a:uLnTx/>
+                <a:uFillTx/>
+              </a:endParaRPr>
+            </a:p>
+          </p:txBody>
+        </p:sp>
+        <p:sp>
+          <p:nvSpPr>
+            <p:cNvPr id="24" name="Rectangle 7">
+              <a:extLst>
+                <a:ext uri="{FF2B5EF4-FFF2-40B4-BE49-F238E27FC236}">
+                  <a16:creationId xmlns:a16="http://schemas.microsoft.com/office/drawing/2014/main" xmlns="" id="{E973BF06-AD2F-4CB4-B0C6-8716522B78BC}"/>
+                </a:ext>
+              </a:extLst>
+            </p:cNvPr>
+            <p:cNvSpPr>
+              <a:spLocks noChangeArrowheads="1"/>
+            </p:cNvSpPr>
+            <p:nvPr/>
+          </p:nvSpPr>
+          <p:spPr bwMode="auto">
+            <a:xfrm>
+              <a:off x="5260274" y="2231838"/>
+              <a:ext cx="223658" cy="82427"/>
+            </a:xfrm>
+            <a:prstGeom prst="rect">
+              <a:avLst/>
+            </a:prstGeom>
+            <a:solidFill>
+              <a:srgbClr val="00B050">
+                <a:alpha val="50000"/>
+              </a:srgbClr>
+            </a:solidFill>
+            <a:ln>
+              <a:noFill/>
+            </a:ln>
+            <a:extLst>
+              <a:ext uri="{91240B29-F687-4F45-9708-019B960494DF}">
+                <a14:hiddenLine xmlns:a14="http://schemas.microsoft.com/office/drawing/2010/main" w="9525">
+                  <a:solidFill>
+                    <a:srgbClr val="000000"/>
+                  </a:solidFill>
+                  <a:miter lim="800000"/>
+                  <a:headEnd/>
+                  <a:tailEnd/>
+                </a14:hiddenLine>
+              </a:ext>
+            </a:extLst>
+          </p:spPr>
+          <p:txBody>
+            <a:bodyPr vert="horz" wrap="square" lIns="91440" tIns="45721" rIns="91440" bIns="45721" numCol="1" anchor="t" anchorCtr="0" compatLnSpc="1">
+              <a:prstTxWarp prst="textNoShape">
+                <a:avLst/>
+              </a:prstTxWarp>
+            </a:bodyPr>
+            <a:lstStyle/>
+            <a:p>
+              <a:pPr marL="0" marR="0" lvl="0" indent="0" algn="ctr" defTabSz="914400" eaLnBrk="1" fontAlgn="auto" latinLnBrk="1" hangingPunct="1">
+                <a:lnSpc>
+                  <a:spcPct val="100000"/>
+                </a:lnSpc>
+                <a:spcBef>
+                  <a:spcPts val="0"/>
+                </a:spcBef>
+                <a:spcAft>
+                  <a:spcPts val="0"/>
+                </a:spcAft>
+                <a:buClrTx/>
+                <a:buSzTx/>
+                <a:buFontTx/>
+                <a:buNone/>
+                <a:tabLst/>
+                <a:defRPr/>
+              </a:pPr>
+              <a:endParaRPr kumimoji="0" lang="ko-KR" altLang="en-US" sz="1801" b="0" i="0" u="none" strike="noStrike" kern="0" cap="none" spc="0" normalizeH="0" baseline="0" noProof="0" smtClean="0">
+                <a:ln>
+                  <a:noFill/>
+                </a:ln>
+                <a:solidFill>
+                  <a:prstClr val="black"/>
+                </a:solidFill>
+                <a:effectLst/>
+                <a:uLnTx/>
+                <a:uFillTx/>
+              </a:endParaRPr>
+            </a:p>
+          </p:txBody>
+        </p:sp>
+        <p:sp>
+          <p:nvSpPr>
+            <p:cNvPr id="25" name="Rectangle 7">
+              <a:extLst>
+                <a:ext uri="{FF2B5EF4-FFF2-40B4-BE49-F238E27FC236}">
+                  <a16:creationId xmlns:a16="http://schemas.microsoft.com/office/drawing/2014/main" xmlns="" id="{99EB395D-E6A7-4A6A-91D1-656B5C719AF8}"/>
+                </a:ext>
+              </a:extLst>
+            </p:cNvPr>
+            <p:cNvSpPr>
+              <a:spLocks noChangeArrowheads="1"/>
+            </p:cNvSpPr>
+            <p:nvPr/>
+          </p:nvSpPr>
+          <p:spPr bwMode="auto">
+            <a:xfrm>
+              <a:off x="5260274" y="2354268"/>
+              <a:ext cx="223658" cy="82427"/>
+            </a:xfrm>
+            <a:prstGeom prst="rect">
+              <a:avLst/>
+            </a:prstGeom>
+            <a:solidFill>
+              <a:srgbClr val="00B050">
+                <a:alpha val="50000"/>
+              </a:srgbClr>
+            </a:solidFill>
+            <a:ln>
+              <a:noFill/>
+            </a:ln>
+            <a:extLst>
+              <a:ext uri="{91240B29-F687-4F45-9708-019B960494DF}">
+                <a14:hiddenLine xmlns:a14="http://schemas.microsoft.com/office/drawing/2010/main" w="9525">
+                  <a:solidFill>
+                    <a:srgbClr val="000000"/>
+                  </a:solidFill>
+                  <a:miter lim="800000"/>
+                  <a:headEnd/>
+                  <a:tailEnd/>
+                </a14:hiddenLine>
+              </a:ext>
+            </a:extLst>
+          </p:spPr>
+          <p:txBody>
+            <a:bodyPr vert="horz" wrap="square" lIns="91440" tIns="45721" rIns="91440" bIns="45721" numCol="1" anchor="t" anchorCtr="0" compatLnSpc="1">
+              <a:prstTxWarp prst="textNoShape">
+                <a:avLst/>
+              </a:prstTxWarp>
+            </a:bodyPr>
+            <a:lstStyle/>
+            <a:p>
+              <a:pPr marL="0" marR="0" lvl="0" indent="0" algn="ctr" defTabSz="914400" eaLnBrk="1" fontAlgn="auto" latinLnBrk="1" hangingPunct="1">
+                <a:lnSpc>
+                  <a:spcPct val="100000"/>
+                </a:lnSpc>
+                <a:spcBef>
+                  <a:spcPts val="0"/>
+                </a:spcBef>
+                <a:spcAft>
+                  <a:spcPts val="0"/>
+                </a:spcAft>
+                <a:buClrTx/>
+                <a:buSzTx/>
+                <a:buFontTx/>
+                <a:buNone/>
+                <a:tabLst/>
+                <a:defRPr/>
+              </a:pPr>
+              <a:endParaRPr kumimoji="0" lang="ko-KR" altLang="en-US" sz="1801" b="0" i="0" u="none" strike="noStrike" kern="0" cap="none" spc="0" normalizeH="0" baseline="0" noProof="0" smtClean="0">
+                <a:ln>
+                  <a:noFill/>
+                </a:ln>
+                <a:solidFill>
+                  <a:prstClr val="black"/>
+                </a:solidFill>
+                <a:effectLst/>
+                <a:uLnTx/>
+                <a:uFillTx/>
+              </a:endParaRPr>
+            </a:p>
+          </p:txBody>
+        </p:sp>
+        <p:sp>
+          <p:nvSpPr>
+            <p:cNvPr id="26" name="Rectangle 7">
+              <a:extLst>
+                <a:ext uri="{FF2B5EF4-FFF2-40B4-BE49-F238E27FC236}">
+                  <a16:creationId xmlns:a16="http://schemas.microsoft.com/office/drawing/2014/main" xmlns="" id="{47478A5A-CFDB-4A16-B369-7277CB8BFFE1}"/>
+                </a:ext>
+              </a:extLst>
+            </p:cNvPr>
+            <p:cNvSpPr>
+              <a:spLocks noChangeArrowheads="1"/>
+            </p:cNvSpPr>
+            <p:nvPr/>
+          </p:nvSpPr>
+          <p:spPr bwMode="auto">
+            <a:xfrm>
+              <a:off x="5519936" y="1712933"/>
+              <a:ext cx="223658" cy="82427"/>
+            </a:xfrm>
+            <a:prstGeom prst="rect">
+              <a:avLst/>
+            </a:prstGeom>
+            <a:solidFill>
+              <a:srgbClr val="C0504D"/>
+            </a:solidFill>
+            <a:ln>
+              <a:noFill/>
+            </a:ln>
+            <a:extLst/>
+          </p:spPr>
+          <p:txBody>
+            <a:bodyPr vert="horz" wrap="square" lIns="91440" tIns="45721" rIns="91440" bIns="45721" numCol="1" anchor="t" anchorCtr="0" compatLnSpc="1">
+              <a:prstTxWarp prst="textNoShape">
+                <a:avLst/>
+              </a:prstTxWarp>
+            </a:bodyPr>
+            <a:lstStyle/>
+            <a:p>
+              <a:pPr marL="0" marR="0" lvl="0" indent="0" algn="ctr" defTabSz="914400" eaLnBrk="1" fontAlgn="auto" latinLnBrk="1" hangingPunct="1">
+                <a:lnSpc>
+                  <a:spcPct val="100000"/>
+                </a:lnSpc>
+                <a:spcBef>
+                  <a:spcPts val="0"/>
+                </a:spcBef>
+                <a:spcAft>
+                  <a:spcPts val="0"/>
+                </a:spcAft>
+                <a:buClrTx/>
+                <a:buSzTx/>
+                <a:buFontTx/>
+                <a:buNone/>
+                <a:tabLst/>
+                <a:defRPr/>
+              </a:pPr>
+              <a:endParaRPr kumimoji="0" lang="ko-KR" altLang="en-US" sz="1801" b="0" i="0" u="none" strike="noStrike" kern="0" cap="none" spc="0" normalizeH="0" baseline="0" noProof="0" smtClean="0">
+                <a:ln>
+                  <a:noFill/>
+                </a:ln>
+                <a:solidFill>
+                  <a:prstClr val="black"/>
+                </a:solidFill>
+                <a:effectLst/>
+                <a:uLnTx/>
+                <a:uFillTx/>
+              </a:endParaRPr>
+            </a:p>
+          </p:txBody>
+        </p:sp>
+        <p:sp>
+          <p:nvSpPr>
+            <p:cNvPr id="27" name="Rectangle 7">
+              <a:extLst>
+                <a:ext uri="{FF2B5EF4-FFF2-40B4-BE49-F238E27FC236}">
+                  <a16:creationId xmlns:a16="http://schemas.microsoft.com/office/drawing/2014/main" xmlns="" id="{4DC054BB-6D32-45A9-9098-7BAF3734B9BB}"/>
+                </a:ext>
+              </a:extLst>
+            </p:cNvPr>
+            <p:cNvSpPr>
+              <a:spLocks noChangeArrowheads="1"/>
+            </p:cNvSpPr>
+            <p:nvPr/>
+          </p:nvSpPr>
+          <p:spPr bwMode="auto">
+            <a:xfrm>
+              <a:off x="5519936" y="1844248"/>
+              <a:ext cx="223658" cy="82427"/>
+            </a:xfrm>
+            <a:prstGeom prst="rect">
+              <a:avLst/>
+            </a:prstGeom>
+            <a:solidFill>
+              <a:srgbClr val="C0504D">
+                <a:lumMod val="60000"/>
+                <a:lumOff val="40000"/>
+                <a:alpha val="50000"/>
+              </a:srgbClr>
+            </a:solidFill>
+            <a:ln>
+              <a:noFill/>
+            </a:ln>
+            <a:extLst/>
+          </p:spPr>
+          <p:txBody>
+            <a:bodyPr vert="horz" wrap="square" lIns="91440" tIns="45721" rIns="91440" bIns="45721" numCol="1" anchor="t" anchorCtr="0" compatLnSpc="1">
+              <a:prstTxWarp prst="textNoShape">
+                <a:avLst/>
+              </a:prstTxWarp>
+            </a:bodyPr>
+            <a:lstStyle/>
+            <a:p>
+              <a:pPr marL="0" marR="0" lvl="0" indent="0" algn="ctr" defTabSz="914400" eaLnBrk="1" fontAlgn="auto" latinLnBrk="1" hangingPunct="1">
+                <a:lnSpc>
+                  <a:spcPct val="100000"/>
+                </a:lnSpc>
+                <a:spcBef>
+                  <a:spcPts val="0"/>
+                </a:spcBef>
+                <a:spcAft>
+                  <a:spcPts val="0"/>
+                </a:spcAft>
+                <a:buClrTx/>
+                <a:buSzTx/>
+                <a:buFontTx/>
+                <a:buNone/>
+                <a:tabLst/>
+                <a:defRPr/>
+              </a:pPr>
+              <a:endParaRPr kumimoji="0" lang="ko-KR" altLang="en-US" sz="1801" b="0" i="0" u="none" strike="noStrike" kern="0" cap="none" spc="0" normalizeH="0" baseline="0" noProof="0" smtClean="0">
+                <a:ln>
+                  <a:noFill/>
+                </a:ln>
+                <a:solidFill>
+                  <a:prstClr val="black"/>
+                </a:solidFill>
+                <a:effectLst/>
+                <a:uLnTx/>
+                <a:uFillTx/>
+              </a:endParaRPr>
+            </a:p>
+          </p:txBody>
+        </p:sp>
+        <p:sp>
+          <p:nvSpPr>
+            <p:cNvPr id="28" name="Rectangle 7">
+              <a:extLst>
+                <a:ext uri="{FF2B5EF4-FFF2-40B4-BE49-F238E27FC236}">
+                  <a16:creationId xmlns:a16="http://schemas.microsoft.com/office/drawing/2014/main" xmlns="" id="{61D65F72-EDDD-4E1A-AA50-1B927F2CBAB6}"/>
+                </a:ext>
+              </a:extLst>
+            </p:cNvPr>
+            <p:cNvSpPr>
+              <a:spLocks noChangeArrowheads="1"/>
+            </p:cNvSpPr>
+            <p:nvPr/>
+          </p:nvSpPr>
+          <p:spPr bwMode="auto">
+            <a:xfrm>
+              <a:off x="5519936" y="1966677"/>
+              <a:ext cx="223658" cy="82427"/>
+            </a:xfrm>
+            <a:prstGeom prst="rect">
+              <a:avLst/>
+            </a:prstGeom>
+            <a:solidFill>
+              <a:srgbClr val="C0504D">
+                <a:lumMod val="60000"/>
+                <a:lumOff val="40000"/>
+                <a:alpha val="50000"/>
+              </a:srgbClr>
+            </a:solidFill>
+            <a:ln>
+              <a:noFill/>
+            </a:ln>
+            <a:extLst/>
+          </p:spPr>
+          <p:txBody>
+            <a:bodyPr vert="horz" wrap="square" lIns="91440" tIns="45721" rIns="91440" bIns="45721" numCol="1" anchor="t" anchorCtr="0" compatLnSpc="1">
+              <a:prstTxWarp prst="textNoShape">
+                <a:avLst/>
+              </a:prstTxWarp>
+            </a:bodyPr>
+            <a:lstStyle/>
+            <a:p>
+              <a:pPr marL="0" marR="0" lvl="0" indent="0" algn="ctr" defTabSz="914400" eaLnBrk="1" fontAlgn="auto" latinLnBrk="1" hangingPunct="1">
+                <a:lnSpc>
+                  <a:spcPct val="100000"/>
+                </a:lnSpc>
+                <a:spcBef>
+                  <a:spcPts val="0"/>
+                </a:spcBef>
+                <a:spcAft>
+                  <a:spcPts val="0"/>
+                </a:spcAft>
+                <a:buClrTx/>
+                <a:buSzTx/>
+                <a:buFontTx/>
+                <a:buNone/>
+                <a:tabLst/>
+                <a:defRPr/>
+              </a:pPr>
+              <a:endParaRPr kumimoji="0" lang="ko-KR" altLang="en-US" sz="1801" b="0" i="0" u="none" strike="noStrike" kern="0" cap="none" spc="0" normalizeH="0" baseline="0" noProof="0" smtClean="0">
+                <a:ln>
+                  <a:noFill/>
+                </a:ln>
+                <a:solidFill>
+                  <a:prstClr val="black"/>
+                </a:solidFill>
+                <a:effectLst/>
+                <a:uLnTx/>
+                <a:uFillTx/>
+              </a:endParaRPr>
+            </a:p>
+          </p:txBody>
+        </p:sp>
+        <p:sp>
+          <p:nvSpPr>
+            <p:cNvPr id="29" name="Rectangle 7">
+              <a:extLst>
+                <a:ext uri="{FF2B5EF4-FFF2-40B4-BE49-F238E27FC236}">
+                  <a16:creationId xmlns:a16="http://schemas.microsoft.com/office/drawing/2014/main" xmlns="" id="{CC64AF67-1CA4-45F8-AC08-6F60E574EBDC}"/>
+                </a:ext>
+              </a:extLst>
+            </p:cNvPr>
+            <p:cNvSpPr>
+              <a:spLocks noChangeArrowheads="1"/>
+            </p:cNvSpPr>
+            <p:nvPr/>
+          </p:nvSpPr>
+          <p:spPr bwMode="auto">
+            <a:xfrm>
+              <a:off x="5519936" y="2089107"/>
+              <a:ext cx="223658" cy="82427"/>
+            </a:xfrm>
+            <a:prstGeom prst="rect">
+              <a:avLst/>
+            </a:prstGeom>
+            <a:solidFill>
+              <a:srgbClr val="C0504D">
+                <a:lumMod val="60000"/>
+                <a:lumOff val="40000"/>
+                <a:alpha val="50000"/>
+              </a:srgbClr>
+            </a:solidFill>
+            <a:ln>
+              <a:noFill/>
+            </a:ln>
+            <a:extLst/>
+          </p:spPr>
+          <p:txBody>
+            <a:bodyPr vert="horz" wrap="square" lIns="91440" tIns="45721" rIns="91440" bIns="45721" numCol="1" anchor="t" anchorCtr="0" compatLnSpc="1">
+              <a:prstTxWarp prst="textNoShape">
+                <a:avLst/>
+              </a:prstTxWarp>
+            </a:bodyPr>
+            <a:lstStyle/>
+            <a:p>
+              <a:pPr marL="0" marR="0" lvl="0" indent="0" algn="ctr" defTabSz="914400" eaLnBrk="1" fontAlgn="auto" latinLnBrk="1" hangingPunct="1">
+                <a:lnSpc>
+                  <a:spcPct val="100000"/>
+                </a:lnSpc>
+                <a:spcBef>
+                  <a:spcPts val="0"/>
+                </a:spcBef>
+                <a:spcAft>
+                  <a:spcPts val="0"/>
+                </a:spcAft>
+                <a:buClrTx/>
+                <a:buSzTx/>
+                <a:buFontTx/>
+                <a:buNone/>
+                <a:tabLst/>
+                <a:defRPr/>
+              </a:pPr>
+              <a:endParaRPr kumimoji="0" lang="ko-KR" altLang="en-US" sz="1801" b="0" i="0" u="none" strike="noStrike" kern="0" cap="none" spc="0" normalizeH="0" baseline="0" noProof="0" smtClean="0">
+                <a:ln>
+                  <a:noFill/>
+                </a:ln>
+                <a:solidFill>
+                  <a:prstClr val="black"/>
+                </a:solidFill>
+                <a:effectLst/>
+                <a:uLnTx/>
+                <a:uFillTx/>
+              </a:endParaRPr>
+            </a:p>
+          </p:txBody>
+        </p:sp>
+        <p:sp>
+          <p:nvSpPr>
+            <p:cNvPr id="30" name="Rectangle 7">
+              <a:extLst>
+                <a:ext uri="{FF2B5EF4-FFF2-40B4-BE49-F238E27FC236}">
+                  <a16:creationId xmlns:a16="http://schemas.microsoft.com/office/drawing/2014/main" xmlns="" id="{91D652E8-30D7-4261-B149-0FEBF02093ED}"/>
+                </a:ext>
+              </a:extLst>
+            </p:cNvPr>
+            <p:cNvSpPr>
+              <a:spLocks noChangeArrowheads="1"/>
+            </p:cNvSpPr>
+            <p:nvPr/>
+          </p:nvSpPr>
+          <p:spPr bwMode="auto">
+            <a:xfrm>
+              <a:off x="5519936" y="2231838"/>
+              <a:ext cx="223658" cy="82427"/>
+            </a:xfrm>
+            <a:prstGeom prst="rect">
+              <a:avLst/>
+            </a:prstGeom>
+            <a:solidFill>
+              <a:srgbClr val="C0504D">
+                <a:lumMod val="60000"/>
+                <a:lumOff val="40000"/>
+                <a:alpha val="50000"/>
+              </a:srgbClr>
+            </a:solidFill>
+            <a:ln>
+              <a:noFill/>
+            </a:ln>
+            <a:extLst/>
+          </p:spPr>
+          <p:txBody>
+            <a:bodyPr vert="horz" wrap="square" lIns="91440" tIns="45721" rIns="91440" bIns="45721" numCol="1" anchor="t" anchorCtr="0" compatLnSpc="1">
+              <a:prstTxWarp prst="textNoShape">
+                <a:avLst/>
+              </a:prstTxWarp>
+            </a:bodyPr>
+            <a:lstStyle/>
+            <a:p>
+              <a:pPr marL="0" marR="0" lvl="0" indent="0" algn="ctr" defTabSz="914400" eaLnBrk="1" fontAlgn="auto" latinLnBrk="1" hangingPunct="1">
+                <a:lnSpc>
+                  <a:spcPct val="100000"/>
+                </a:lnSpc>
+                <a:spcBef>
+                  <a:spcPts val="0"/>
+                </a:spcBef>
+                <a:spcAft>
+                  <a:spcPts val="0"/>
+                </a:spcAft>
+                <a:buClrTx/>
+                <a:buSzTx/>
+                <a:buFontTx/>
+                <a:buNone/>
+                <a:tabLst/>
+                <a:defRPr/>
+              </a:pPr>
+              <a:endParaRPr kumimoji="0" lang="ko-KR" altLang="en-US" sz="1801" b="0" i="0" u="none" strike="noStrike" kern="0" cap="none" spc="0" normalizeH="0" baseline="0" noProof="0" smtClean="0">
+                <a:ln>
+                  <a:noFill/>
+                </a:ln>
+                <a:solidFill>
+                  <a:prstClr val="black"/>
+                </a:solidFill>
+                <a:effectLst/>
+                <a:uLnTx/>
+                <a:uFillTx/>
+              </a:endParaRPr>
+            </a:p>
+          </p:txBody>
+        </p:sp>
+        <p:sp>
+          <p:nvSpPr>
+            <p:cNvPr id="31" name="Rectangle 7">
+              <a:extLst>
+                <a:ext uri="{FF2B5EF4-FFF2-40B4-BE49-F238E27FC236}">
+                  <a16:creationId xmlns:a16="http://schemas.microsoft.com/office/drawing/2014/main" xmlns="" id="{C4076A50-57A0-44B3-AAA3-B865ACDF0EAE}"/>
+                </a:ext>
+              </a:extLst>
+            </p:cNvPr>
+            <p:cNvSpPr>
+              <a:spLocks noChangeArrowheads="1"/>
+            </p:cNvSpPr>
+            <p:nvPr/>
+          </p:nvSpPr>
+          <p:spPr bwMode="auto">
+            <a:xfrm>
+              <a:off x="5519936" y="2354268"/>
+              <a:ext cx="223658" cy="82427"/>
+            </a:xfrm>
+            <a:prstGeom prst="rect">
+              <a:avLst/>
+            </a:prstGeom>
+            <a:solidFill>
+              <a:srgbClr val="C0504D">
+                <a:lumMod val="60000"/>
+                <a:lumOff val="40000"/>
+                <a:alpha val="50000"/>
+              </a:srgbClr>
+            </a:solidFill>
+            <a:ln>
+              <a:noFill/>
+            </a:ln>
+            <a:extLst/>
+          </p:spPr>
+          <p:txBody>
+            <a:bodyPr vert="horz" wrap="square" lIns="91440" tIns="45721" rIns="91440" bIns="45721" numCol="1" anchor="t" anchorCtr="0" compatLnSpc="1">
+              <a:prstTxWarp prst="textNoShape">
+                <a:avLst/>
+              </a:prstTxWarp>
+            </a:bodyPr>
+            <a:lstStyle/>
+            <a:p>
+              <a:pPr marL="0" marR="0" lvl="0" indent="0" algn="ctr" defTabSz="914400" eaLnBrk="1" fontAlgn="auto" latinLnBrk="1" hangingPunct="1">
+                <a:lnSpc>
+                  <a:spcPct val="100000"/>
+                </a:lnSpc>
+                <a:spcBef>
+                  <a:spcPts val="0"/>
+                </a:spcBef>
+                <a:spcAft>
+                  <a:spcPts val="0"/>
+                </a:spcAft>
+                <a:buClrTx/>
+                <a:buSzTx/>
+                <a:buFontTx/>
+                <a:buNone/>
+                <a:tabLst/>
+                <a:defRPr/>
+              </a:pPr>
+              <a:endParaRPr kumimoji="0" lang="ko-KR" altLang="en-US" sz="1801" b="0" i="0" u="none" strike="noStrike" kern="0" cap="none" spc="0" normalizeH="0" baseline="0" noProof="0" smtClean="0">
+                <a:ln>
+                  <a:noFill/>
+                </a:ln>
+                <a:solidFill>
+                  <a:prstClr val="black"/>
+                </a:solidFill>
+                <a:effectLst/>
+                <a:uLnTx/>
+                <a:uFillTx/>
+              </a:endParaRPr>
+            </a:p>
+          </p:txBody>
+        </p:sp>
+      </p:grpSp>
+      <p:pic>
+        <p:nvPicPr>
+          <p:cNvPr id="32" name="Picture 12" descr="arrow next by Anonymous">
+            <a:extLst>
+              <a:ext uri="{FF2B5EF4-FFF2-40B4-BE49-F238E27FC236}">
+                <a16:creationId xmlns:a16="http://schemas.microsoft.com/office/drawing/2014/main" xmlns="" id="{A8FFD3D9-F851-415B-90F1-40F7E2C4B762}"/>
+              </a:ext>
+            </a:extLst>
+          </p:cNvPr>
+          <p:cNvPicPr>
+            <a:picLocks noChangeAspect="1" noChangeArrowheads="1"/>
+          </p:cNvPicPr>
+          <p:nvPr/>
+        </p:nvPicPr>
+        <p:blipFill>
+          <a:blip r:embed="rId2" cstate="print"/>
+          <a:srcRect t="10246" r="22511" b="49437"/>
+          <a:stretch>
+            <a:fillRect/>
+          </a:stretch>
+        </p:blipFill>
+        <p:spPr bwMode="auto">
+          <a:xfrm>
+            <a:off x="2213061" y="3073034"/>
+            <a:ext cx="340651" cy="267840"/>
+          </a:xfrm>
+          <a:prstGeom prst="rect">
+            <a:avLst/>
+          </a:prstGeom>
+          <a:noFill/>
+        </p:spPr>
+      </p:pic>
+      <p:sp>
+        <p:nvSpPr>
+          <p:cNvPr id="33" name="TextBox 32">
+            <a:extLst>
+              <a:ext uri="{FF2B5EF4-FFF2-40B4-BE49-F238E27FC236}">
+                <a16:creationId xmlns:a16="http://schemas.microsoft.com/office/drawing/2014/main" xmlns="" id="{CD66F582-BC2D-419F-BDD5-A846E99C036E}"/>
+              </a:ext>
+            </a:extLst>
+          </p:cNvPr>
+          <p:cNvSpPr txBox="1"/>
+          <p:nvPr/>
+        </p:nvSpPr>
+        <p:spPr>
+          <a:xfrm>
+            <a:off x="3130603" y="3315722"/>
+            <a:ext cx="1547860" cy="323165"/>
+          </a:xfrm>
+          <a:prstGeom prst="rect">
+            <a:avLst/>
+          </a:prstGeom>
+          <a:noFill/>
+        </p:spPr>
+        <p:txBody>
+          <a:bodyPr wrap="none" rtlCol="0">
+            <a:spAutoFit/>
+          </a:bodyPr>
+          <a:lstStyle/>
+          <a:p>
+            <a:pPr algn="ctr" defTabSz="914400" latinLnBrk="1"/>
+            <a:r>
+              <a:rPr lang="en-US" altLang="ko-KR" sz="1500" b="1" dirty="0">
+                <a:solidFill>
+                  <a:prstClr val="black"/>
+                </a:solidFill>
+                <a:latin typeface="나눔바른펜" pitchFamily="50" charset="-127"/>
+                <a:ea typeface="나눔바른펜" pitchFamily="50" charset="-127"/>
+              </a:rPr>
+              <a:t>Information Value</a:t>
+            </a:r>
+            <a:endParaRPr lang="ko-KR" altLang="en-US" sz="1500" dirty="0">
+              <a:solidFill>
+                <a:prstClr val="black"/>
+              </a:solidFill>
+              <a:latin typeface="나눔바른펜" pitchFamily="50" charset="-127"/>
+              <a:ea typeface="나눔바른펜" pitchFamily="50" charset="-127"/>
+            </a:endParaRPr>
+          </a:p>
+        </p:txBody>
+      </p:sp>
+      <mc:AlternateContent xmlns:mc="http://schemas.openxmlformats.org/markup-compatibility/2006">
+        <mc:Choice xmlns:a14="http://schemas.microsoft.com/office/drawing/2010/main" Requires="a14">
+          <p:sp>
+            <p:nvSpPr>
+              <p:cNvPr id="34" name="TextBox 33">
+                <a:extLst>
+                  <a:ext uri="{FF2B5EF4-FFF2-40B4-BE49-F238E27FC236}">
+                    <a16:creationId xmlns:a16="http://schemas.microsoft.com/office/drawing/2014/main" xmlns="" id="{A1495941-5D2F-4903-9E49-5316E5826B36}"/>
+                  </a:ext>
+                </a:extLst>
+              </p:cNvPr>
+              <p:cNvSpPr txBox="1"/>
+              <p:nvPr/>
+            </p:nvSpPr>
+            <p:spPr>
+              <a:xfrm>
+                <a:off x="2599507" y="3756396"/>
+                <a:ext cx="2682849" cy="447238"/>
+              </a:xfrm>
+              <a:prstGeom prst="rect">
+                <a:avLst/>
+              </a:prstGeom>
+              <a:noFill/>
+            </p:spPr>
+            <p:txBody>
+              <a:bodyPr wrap="square" lIns="0" tIns="0" rIns="0" bIns="0" rtlCol="0">
+                <a:spAutoFit/>
+              </a:bodyPr>
+              <a:lstStyle/>
+              <a:p>
+                <a:pPr marL="0" marR="0" lvl="0" indent="0" defTabSz="914400" eaLnBrk="1" fontAlgn="auto" latinLnBrk="1" hangingPunct="1">
+                  <a:lnSpc>
+                    <a:spcPct val="100000"/>
+                  </a:lnSpc>
+                  <a:spcBef>
+                    <a:spcPts val="0"/>
+                  </a:spcBef>
+                  <a:spcAft>
+                    <a:spcPts val="0"/>
+                  </a:spcAft>
+                  <a:buClrTx/>
+                  <a:buSzTx/>
+                  <a:buFontTx/>
+                  <a:buNone/>
+                  <a:tabLst/>
+                  <a:defRPr/>
+                </a:pPr>
+                <a14:m>
+                  <m:oMathPara xmlns:m="http://schemas.openxmlformats.org/officeDocument/2006/math">
+                    <m:oMathParaPr>
+                      <m:jc m:val="centerGroup"/>
+                    </m:oMathParaPr>
+                    <m:oMath xmlns:m="http://schemas.openxmlformats.org/officeDocument/2006/math">
+                      <m:r>
+                        <m:rPr>
+                          <m:sty m:val="p"/>
+                        </m:rPr>
+                        <a:rPr kumimoji="0" lang="en-US" altLang="ko-KR" sz="1200" b="0" i="1" u="none" strike="noStrike" kern="0" cap="none" spc="0" normalizeH="0" baseline="0" noProof="0" smtClean="0">
+                          <a:ln>
+                            <a:noFill/>
+                          </a:ln>
+                          <a:solidFill>
+                            <a:prstClr val="black"/>
+                          </a:solidFill>
+                          <a:effectLst/>
+                          <a:uLnTx/>
+                          <a:uFillTx/>
+                          <a:latin typeface="Cambria Math" panose="02040503050406030204" pitchFamily="18" charset="0"/>
+                        </a:rPr>
+                        <m:t>I</m:t>
+                      </m:r>
+                      <m:r>
+                        <a:rPr kumimoji="0" lang="en-US" altLang="ko-KR" sz="1200" b="0" i="1" u="none" strike="noStrike" kern="0" cap="none" spc="0" normalizeH="0" baseline="0" noProof="0" smtClean="0">
+                          <a:ln>
+                            <a:noFill/>
+                          </a:ln>
+                          <a:solidFill>
+                            <a:prstClr val="black"/>
+                          </a:solidFill>
+                          <a:effectLst/>
+                          <a:uLnTx/>
+                          <a:uFillTx/>
+                          <a:latin typeface="Cambria Math" panose="02040503050406030204" pitchFamily="18" charset="0"/>
+                        </a:rPr>
+                        <m:t>𝑉</m:t>
+                      </m:r>
+                      <m:r>
+                        <a:rPr kumimoji="0" lang="en-US" altLang="ko-KR" sz="1200" b="0" i="1" u="none" strike="noStrike" kern="0" cap="none" spc="0" normalizeH="0" baseline="0" noProof="0" smtClean="0">
+                          <a:ln>
+                            <a:noFill/>
+                          </a:ln>
+                          <a:solidFill>
+                            <a:prstClr val="black"/>
+                          </a:solidFill>
+                          <a:effectLst/>
+                          <a:uLnTx/>
+                          <a:uFillTx/>
+                          <a:latin typeface="Cambria Math" panose="02040503050406030204" pitchFamily="18" charset="0"/>
+                        </a:rPr>
+                        <m:t>=</m:t>
+                      </m:r>
+                      <m:nary>
+                        <m:naryPr>
+                          <m:chr m:val="∑"/>
+                          <m:subHide m:val="on"/>
+                          <m:supHide m:val="on"/>
+                          <m:ctrlPr>
+                            <a:rPr kumimoji="0" lang="en-US" altLang="ko-KR" sz="1200" b="0" i="1" u="none" strike="noStrike" kern="0" cap="none" spc="0" normalizeH="0" baseline="0" noProof="0" smtClean="0">
+                              <a:ln>
+                                <a:noFill/>
+                              </a:ln>
+                              <a:solidFill>
+                                <a:prstClr val="black"/>
+                              </a:solidFill>
+                              <a:effectLst/>
+                              <a:uLnTx/>
+                              <a:uFillTx/>
+                              <a:latin typeface="Cambria Math"/>
+                            </a:rPr>
+                          </m:ctrlPr>
+                        </m:naryPr>
+                        <m:sub/>
+                        <m:sup/>
+                        <m:e>
+                          <m:r>
+                            <a:rPr kumimoji="0" lang="en-US" altLang="ko-KR" sz="1200" b="0" i="1" u="none" strike="noStrike" kern="0" cap="none" spc="0" normalizeH="0" baseline="0" noProof="0" smtClean="0">
+                              <a:ln>
+                                <a:noFill/>
+                              </a:ln>
+                              <a:solidFill>
+                                <a:prstClr val="black"/>
+                              </a:solidFill>
+                              <a:effectLst/>
+                              <a:uLnTx/>
+                              <a:uFillTx/>
+                              <a:latin typeface="Cambria Math" panose="02040503050406030204" pitchFamily="18" charset="0"/>
+                            </a:rPr>
+                            <m:t>(</m:t>
+                          </m:r>
+                          <m:sSub>
+                            <m:sSubPr>
+                              <m:ctrlPr>
+                                <a:rPr kumimoji="0" lang="en-US" altLang="ko-KR" sz="1200" b="0" i="1" u="none" strike="noStrike" kern="0" cap="none" spc="0" normalizeH="0" baseline="0" noProof="0" smtClean="0">
+                                  <a:ln>
+                                    <a:noFill/>
+                                  </a:ln>
+                                  <a:solidFill>
+                                    <a:prstClr val="black"/>
+                                  </a:solidFill>
+                                  <a:effectLst/>
+                                  <a:uLnTx/>
+                                  <a:uFillTx/>
+                                  <a:latin typeface="Cambria Math"/>
+                                </a:rPr>
+                              </m:ctrlPr>
+                            </m:sSubPr>
+                            <m:e>
+                              <m:r>
+                                <a:rPr kumimoji="0" lang="en-US" altLang="ko-KR" sz="1200" b="0" i="1" u="none" strike="noStrike" kern="0" cap="none" spc="0" normalizeH="0" baseline="0" noProof="0" smtClean="0">
+                                  <a:ln>
+                                    <a:noFill/>
+                                  </a:ln>
+                                  <a:solidFill>
+                                    <a:prstClr val="black"/>
+                                  </a:solidFill>
+                                  <a:effectLst/>
+                                  <a:uLnTx/>
+                                  <a:uFillTx/>
+                                  <a:latin typeface="Cambria Math" panose="02040503050406030204" pitchFamily="18" charset="0"/>
+                                </a:rPr>
+                                <m:t>𝐺𝑜𝑜𝑑</m:t>
+                              </m:r>
+                            </m:e>
+                            <m:sub>
+                              <m:r>
+                                <a:rPr kumimoji="0" lang="en-US" altLang="ko-KR" sz="1200" b="0" i="1" u="none" strike="noStrike" kern="0" cap="none" spc="0" normalizeH="0" baseline="0" noProof="0" smtClean="0">
+                                  <a:ln>
+                                    <a:noFill/>
+                                  </a:ln>
+                                  <a:solidFill>
+                                    <a:prstClr val="black"/>
+                                  </a:solidFill>
+                                  <a:effectLst/>
+                                  <a:uLnTx/>
+                                  <a:uFillTx/>
+                                  <a:latin typeface="Cambria Math" panose="02040503050406030204" pitchFamily="18" charset="0"/>
+                                </a:rPr>
+                                <m:t>𝑖</m:t>
+                              </m:r>
+                            </m:sub>
+                          </m:sSub>
+                          <m:r>
+                            <a:rPr kumimoji="0" lang="en-US" altLang="ko-KR" sz="1200" b="0" i="1" u="none" strike="noStrike" kern="0" cap="none" spc="0" normalizeH="0" baseline="0" noProof="0" smtClean="0">
+                              <a:ln>
+                                <a:noFill/>
+                              </a:ln>
+                              <a:solidFill>
+                                <a:prstClr val="black"/>
+                              </a:solidFill>
+                              <a:effectLst/>
+                              <a:uLnTx/>
+                              <a:uFillTx/>
+                              <a:latin typeface="Cambria Math" panose="02040503050406030204" pitchFamily="18" charset="0"/>
+                            </a:rPr>
+                            <m:t>−</m:t>
+                          </m:r>
+                          <m:sSub>
+                            <m:sSubPr>
+                              <m:ctrlPr>
+                                <a:rPr kumimoji="0" lang="en-US" altLang="ko-KR" sz="1200" b="0" i="1" u="none" strike="noStrike" kern="0" cap="none" spc="0" normalizeH="0" baseline="0" noProof="0" smtClean="0">
+                                  <a:ln>
+                                    <a:noFill/>
+                                  </a:ln>
+                                  <a:solidFill>
+                                    <a:prstClr val="black"/>
+                                  </a:solidFill>
+                                  <a:effectLst/>
+                                  <a:uLnTx/>
+                                  <a:uFillTx/>
+                                  <a:latin typeface="Cambria Math"/>
+                                </a:rPr>
+                              </m:ctrlPr>
+                            </m:sSubPr>
+                            <m:e>
+                              <m:r>
+                                <a:rPr kumimoji="0" lang="en-US" altLang="ko-KR" sz="1200" b="0" i="1" u="none" strike="noStrike" kern="0" cap="none" spc="0" normalizeH="0" baseline="0" noProof="0" smtClean="0">
+                                  <a:ln>
+                                    <a:noFill/>
+                                  </a:ln>
+                                  <a:solidFill>
+                                    <a:prstClr val="black"/>
+                                  </a:solidFill>
+                                  <a:effectLst/>
+                                  <a:uLnTx/>
+                                  <a:uFillTx/>
+                                  <a:latin typeface="Cambria Math" panose="02040503050406030204" pitchFamily="18" charset="0"/>
+                                </a:rPr>
+                                <m:t>𝐵𝑎𝑑</m:t>
+                              </m:r>
+                            </m:e>
+                            <m:sub>
+                              <m:r>
+                                <a:rPr kumimoji="0" lang="en-US" altLang="ko-KR" sz="1200" b="0" i="1" u="none" strike="noStrike" kern="0" cap="none" spc="0" normalizeH="0" baseline="0" noProof="0" smtClean="0">
+                                  <a:ln>
+                                    <a:noFill/>
+                                  </a:ln>
+                                  <a:solidFill>
+                                    <a:prstClr val="black"/>
+                                  </a:solidFill>
+                                  <a:effectLst/>
+                                  <a:uLnTx/>
+                                  <a:uFillTx/>
+                                  <a:latin typeface="Cambria Math" panose="02040503050406030204" pitchFamily="18" charset="0"/>
+                                </a:rPr>
+                                <m:t>𝑖</m:t>
+                              </m:r>
+                            </m:sub>
+                          </m:sSub>
+                          <m:r>
+                            <a:rPr kumimoji="0" lang="en-US" altLang="ko-KR" sz="1200" b="0" i="1" u="none" strike="noStrike" kern="0" cap="none" spc="0" normalizeH="0" baseline="0" noProof="0" smtClean="0">
+                              <a:ln>
+                                <a:noFill/>
+                              </a:ln>
+                              <a:solidFill>
+                                <a:prstClr val="black"/>
+                              </a:solidFill>
+                              <a:effectLst/>
+                              <a:uLnTx/>
+                              <a:uFillTx/>
+                              <a:latin typeface="Cambria Math" panose="02040503050406030204" pitchFamily="18" charset="0"/>
+                            </a:rPr>
+                            <m:t>)</m:t>
+                          </m:r>
+                          <m:r>
+                            <a:rPr kumimoji="0" lang="en-US" altLang="ko-KR" sz="1200" b="0" i="1" u="none" strike="noStrike" kern="0" cap="none" spc="0" normalizeH="0" baseline="0" noProof="0" smtClean="0">
+                              <a:ln>
+                                <a:noFill/>
+                              </a:ln>
+                              <a:solidFill>
+                                <a:prstClr val="black"/>
+                              </a:solidFill>
+                              <a:effectLst/>
+                              <a:uLnTx/>
+                              <a:uFillTx/>
+                              <a:latin typeface="Cambria Math" panose="02040503050406030204" pitchFamily="18" charset="0"/>
+                              <a:ea typeface="Cambria Math" panose="02040503050406030204" pitchFamily="18" charset="0"/>
+                            </a:rPr>
+                            <m:t>×</m:t>
+                          </m:r>
+                          <m:sSub>
+                            <m:sSubPr>
+                              <m:ctrlPr>
+                                <a:rPr kumimoji="0" lang="en-US" altLang="ko-KR" sz="1200" b="0" i="1" u="none" strike="noStrike" kern="0" cap="none" spc="0" normalizeH="0" baseline="0" noProof="0" smtClean="0">
+                                  <a:ln>
+                                    <a:noFill/>
+                                  </a:ln>
+                                  <a:solidFill>
+                                    <a:prstClr val="black"/>
+                                  </a:solidFill>
+                                  <a:effectLst/>
+                                  <a:uLnTx/>
+                                  <a:uFillTx/>
+                                  <a:latin typeface="Cambria Math"/>
+                                  <a:ea typeface="Cambria Math" panose="02040503050406030204" pitchFamily="18" charset="0"/>
+                                </a:rPr>
+                              </m:ctrlPr>
+                            </m:sSubPr>
+                            <m:e>
+                              <m:r>
+                                <a:rPr kumimoji="0" lang="en-US" altLang="ko-KR" sz="1200" b="0" i="1" u="none" strike="noStrike" kern="0" cap="none" spc="0" normalizeH="0" baseline="0" noProof="0" smtClean="0">
+                                  <a:ln>
+                                    <a:noFill/>
+                                  </a:ln>
+                                  <a:solidFill>
+                                    <a:prstClr val="black"/>
+                                  </a:solidFill>
+                                  <a:effectLst/>
+                                  <a:uLnTx/>
+                                  <a:uFillTx/>
+                                  <a:latin typeface="Cambria Math" panose="02040503050406030204" pitchFamily="18" charset="0"/>
+                                  <a:ea typeface="Cambria Math" panose="02040503050406030204" pitchFamily="18" charset="0"/>
+                                </a:rPr>
+                                <m:t>𝑊𝑂𝐸</m:t>
+                              </m:r>
+                            </m:e>
+                            <m:sub>
+                              <m:r>
+                                <a:rPr kumimoji="0" lang="en-US" altLang="ko-KR" sz="1200" b="0" i="1" u="none" strike="noStrike" kern="0" cap="none" spc="0" normalizeH="0" baseline="0" noProof="0" smtClean="0">
+                                  <a:ln>
+                                    <a:noFill/>
+                                  </a:ln>
+                                  <a:solidFill>
+                                    <a:prstClr val="black"/>
+                                  </a:solidFill>
+                                  <a:effectLst/>
+                                  <a:uLnTx/>
+                                  <a:uFillTx/>
+                                  <a:latin typeface="Cambria Math" panose="02040503050406030204" pitchFamily="18" charset="0"/>
+                                  <a:ea typeface="Cambria Math" panose="02040503050406030204" pitchFamily="18" charset="0"/>
+                                </a:rPr>
+                                <m:t>𝑖</m:t>
+                              </m:r>
+                            </m:sub>
+                          </m:sSub>
+                        </m:e>
+                      </m:nary>
+                    </m:oMath>
+                  </m:oMathPara>
+                </a14:m>
+                <a:endParaRPr kumimoji="0" lang="ko-KR" altLang="en-US" sz="1200" b="0" i="0" u="none" strike="noStrike" kern="0" cap="none" spc="0" normalizeH="0" baseline="0" noProof="0" dirty="0" smtClean="0">
+                  <a:ln>
+                    <a:noFill/>
+                  </a:ln>
+                  <a:solidFill>
+                    <a:prstClr val="black"/>
+                  </a:solidFill>
+                  <a:effectLst/>
+                  <a:uLnTx/>
+                  <a:uFillTx/>
+                </a:endParaRPr>
+              </a:p>
+            </p:txBody>
+          </p:sp>
+        </mc:Choice>
+        <mc:Fallback>
+          <p:sp>
+            <p:nvSpPr>
+              <p:cNvPr id="34" name="TextBox 33">
+                <a:extLst>
+                  <a:ext uri="{FF2B5EF4-FFF2-40B4-BE49-F238E27FC236}">
+                    <a16:creationId xmlns:a16="http://schemas.microsoft.com/office/drawing/2014/main" xmlns:a14="http://schemas.microsoft.com/office/drawing/2010/main" xmlns="" id="{A1495941-5D2F-4903-9E49-5316E5826B36}"/>
+                  </a:ext>
+                </a:extLst>
+              </p:cNvPr>
+              <p:cNvSpPr txBox="1">
+                <a:spLocks noRot="1" noChangeAspect="1" noMove="1" noResize="1" noEditPoints="1" noAdjustHandles="1" noChangeArrowheads="1" noChangeShapeType="1" noTextEdit="1"/>
+              </p:cNvSpPr>
+              <p:nvPr/>
+            </p:nvSpPr>
+            <p:spPr>
+              <a:xfrm>
+                <a:off x="2599507" y="3756396"/>
+                <a:ext cx="2682849" cy="447238"/>
+              </a:xfrm>
+              <a:prstGeom prst="rect">
+                <a:avLst/>
+              </a:prstGeom>
+              <a:blipFill rotWithShape="1">
+                <a:blip r:embed="rId3"/>
+                <a:stretch>
+                  <a:fillRect t="-148649" b="-206757"/>
+                </a:stretch>
+              </a:blipFill>
+            </p:spPr>
+            <p:txBody>
+              <a:bodyPr/>
+              <a:lstStyle/>
+              <a:p>
+                <a:r>
+                  <a:rPr lang="ko-KR" altLang="en-US">
+                    <a:noFill/>
+                  </a:rPr>
+                  <a:t> </a:t>
+                </a:r>
+              </a:p>
+            </p:txBody>
+          </p:sp>
+        </mc:Fallback>
+      </mc:AlternateContent>
+      <mc:AlternateContent xmlns:mc="http://schemas.openxmlformats.org/markup-compatibility/2006">
+        <mc:Choice xmlns:a14="http://schemas.microsoft.com/office/drawing/2010/main" Requires="a14">
+          <p:sp>
+            <p:nvSpPr>
+              <p:cNvPr id="35" name="TextBox 34">
+                <a:extLst>
+                  <a:ext uri="{FF2B5EF4-FFF2-40B4-BE49-F238E27FC236}">
+                    <a16:creationId xmlns:a16="http://schemas.microsoft.com/office/drawing/2014/main" xmlns="" id="{21E81333-1CAC-4F11-B7E7-201FEA854106}"/>
+                  </a:ext>
+                </a:extLst>
+              </p:cNvPr>
+              <p:cNvSpPr txBox="1"/>
+              <p:nvPr/>
+            </p:nvSpPr>
+            <p:spPr>
+              <a:xfrm>
+                <a:off x="2599507" y="4298649"/>
+                <a:ext cx="2682849" cy="381771"/>
+              </a:xfrm>
+              <a:prstGeom prst="rect">
+                <a:avLst/>
+              </a:prstGeom>
+              <a:noFill/>
+            </p:spPr>
+            <p:txBody>
+              <a:bodyPr wrap="square" lIns="0" tIns="0" rIns="0" bIns="0" rtlCol="0">
+                <a:spAutoFit/>
+              </a:bodyPr>
+              <a:lstStyle/>
+              <a:p>
+                <a:pPr marL="0" marR="0" lvl="0" indent="0" defTabSz="914400" eaLnBrk="1" fontAlgn="auto" latinLnBrk="1" hangingPunct="1">
+                  <a:lnSpc>
+                    <a:spcPct val="100000"/>
+                  </a:lnSpc>
+                  <a:spcBef>
+                    <a:spcPts val="0"/>
+                  </a:spcBef>
+                  <a:spcAft>
+                    <a:spcPts val="0"/>
+                  </a:spcAft>
+                  <a:buClrTx/>
+                  <a:buSzTx/>
+                  <a:buFontTx/>
+                  <a:buNone/>
+                  <a:tabLst/>
+                  <a:defRPr/>
+                </a:pPr>
+                <a14:m>
+                  <m:oMathPara xmlns:m="http://schemas.openxmlformats.org/officeDocument/2006/math">
+                    <m:oMathParaPr>
+                      <m:jc m:val="center"/>
+                    </m:oMathParaPr>
+                    <m:oMath xmlns:m="http://schemas.openxmlformats.org/officeDocument/2006/math">
+                      <m:sSub>
+                        <m:sSubPr>
+                          <m:ctrlPr>
+                            <a:rPr kumimoji="0" lang="en-US" altLang="ko-KR" sz="1200" b="0" i="1" u="none" strike="noStrike" kern="0" cap="none" spc="0" normalizeH="0" baseline="0" noProof="0" smtClean="0">
+                              <a:ln>
+                                <a:noFill/>
+                              </a:ln>
+                              <a:solidFill>
+                                <a:prstClr val="black"/>
+                              </a:solidFill>
+                              <a:effectLst/>
+                              <a:uLnTx/>
+                              <a:uFillTx/>
+                              <a:latin typeface="Cambria Math"/>
+                              <a:ea typeface="Cambria Math" panose="02040503050406030204" pitchFamily="18" charset="0"/>
+                            </a:rPr>
+                          </m:ctrlPr>
+                        </m:sSubPr>
+                        <m:e>
+                          <m:r>
+                            <a:rPr kumimoji="0" lang="en-US" altLang="ko-KR" sz="1200" b="0" i="1" u="none" strike="noStrike" kern="0" cap="none" spc="0" normalizeH="0" baseline="0" noProof="0" smtClean="0">
+                              <a:ln>
+                                <a:noFill/>
+                              </a:ln>
+                              <a:solidFill>
+                                <a:prstClr val="black"/>
+                              </a:solidFill>
+                              <a:effectLst/>
+                              <a:uLnTx/>
+                              <a:uFillTx/>
+                              <a:latin typeface="Cambria Math" panose="02040503050406030204" pitchFamily="18" charset="0"/>
+                              <a:ea typeface="Cambria Math" panose="02040503050406030204" pitchFamily="18" charset="0"/>
+                            </a:rPr>
+                            <m:t>𝑊𝑂𝐸</m:t>
+                          </m:r>
+                        </m:e>
+                        <m:sub>
+                          <m:r>
+                            <a:rPr kumimoji="0" lang="en-US" altLang="ko-KR" sz="1200" b="0" i="1" u="none" strike="noStrike" kern="0" cap="none" spc="0" normalizeH="0" baseline="0" noProof="0" smtClean="0">
+                              <a:ln>
+                                <a:noFill/>
+                              </a:ln>
+                              <a:solidFill>
+                                <a:prstClr val="black"/>
+                              </a:solidFill>
+                              <a:effectLst/>
+                              <a:uLnTx/>
+                              <a:uFillTx/>
+                              <a:latin typeface="Cambria Math" panose="02040503050406030204" pitchFamily="18" charset="0"/>
+                              <a:ea typeface="Cambria Math" panose="02040503050406030204" pitchFamily="18" charset="0"/>
+                            </a:rPr>
+                            <m:t>𝑖</m:t>
+                          </m:r>
+                        </m:sub>
+                      </m:sSub>
+                      <m:r>
+                        <a:rPr kumimoji="0" lang="en-US" altLang="ko-KR" sz="1200" b="0" i="1" u="none" strike="noStrike" kern="0" cap="none" spc="0" normalizeH="0" baseline="0" noProof="0" smtClean="0">
+                          <a:ln>
+                            <a:noFill/>
+                          </a:ln>
+                          <a:solidFill>
+                            <a:prstClr val="black"/>
+                          </a:solidFill>
+                          <a:effectLst/>
+                          <a:uLnTx/>
+                          <a:uFillTx/>
+                          <a:latin typeface="Cambria Math" panose="02040503050406030204" pitchFamily="18" charset="0"/>
+                        </a:rPr>
+                        <m:t>=</m:t>
+                      </m:r>
+                      <m:r>
+                        <m:rPr>
+                          <m:sty m:val="p"/>
+                        </m:rPr>
+                        <a:rPr kumimoji="0" lang="en-US" altLang="ko-KR" sz="1200" b="0" i="0" u="none" strike="noStrike" kern="0" cap="none" spc="0" normalizeH="0" baseline="0" noProof="0" smtClean="0">
+                          <a:ln>
+                            <a:noFill/>
+                          </a:ln>
+                          <a:solidFill>
+                            <a:prstClr val="black"/>
+                          </a:solidFill>
+                          <a:effectLst/>
+                          <a:uLnTx/>
+                          <a:uFillTx/>
+                          <a:latin typeface="Cambria Math" panose="02040503050406030204" pitchFamily="18" charset="0"/>
+                        </a:rPr>
+                        <m:t>ln</m:t>
+                      </m:r>
+                      <m:r>
+                        <a:rPr kumimoji="0" lang="en-US" altLang="ko-KR" sz="1200" b="0" i="1" u="none" strike="noStrike" kern="0" cap="none" spc="0" normalizeH="0" baseline="0" noProof="0" smtClean="0">
+                          <a:ln>
+                            <a:noFill/>
+                          </a:ln>
+                          <a:solidFill>
+                            <a:prstClr val="black"/>
+                          </a:solidFill>
+                          <a:effectLst/>
+                          <a:uLnTx/>
+                          <a:uFillTx/>
+                          <a:latin typeface="Cambria Math" panose="02040503050406030204" pitchFamily="18" charset="0"/>
+                        </a:rPr>
+                        <m:t>⁡(</m:t>
+                      </m:r>
+                      <m:f>
+                        <m:fPr>
+                          <m:ctrlPr>
+                            <a:rPr kumimoji="0" lang="en-US" altLang="ko-KR" sz="1200" b="0" i="1" u="none" strike="noStrike" kern="0" cap="none" spc="0" normalizeH="0" baseline="0" noProof="0" smtClean="0">
+                              <a:ln>
+                                <a:noFill/>
+                              </a:ln>
+                              <a:solidFill>
+                                <a:prstClr val="black"/>
+                              </a:solidFill>
+                              <a:effectLst/>
+                              <a:uLnTx/>
+                              <a:uFillTx/>
+                              <a:latin typeface="Cambria Math"/>
+                            </a:rPr>
+                          </m:ctrlPr>
+                        </m:fPr>
+                        <m:num>
+                          <m:sSub>
+                            <m:sSubPr>
+                              <m:ctrlPr>
+                                <a:rPr kumimoji="0" lang="en-US" altLang="ko-KR" sz="1200" b="0" i="1" u="none" strike="noStrike" kern="0" cap="none" spc="0" normalizeH="0" baseline="0" noProof="0" smtClean="0">
+                                  <a:ln>
+                                    <a:noFill/>
+                                  </a:ln>
+                                  <a:solidFill>
+                                    <a:prstClr val="black"/>
+                                  </a:solidFill>
+                                  <a:effectLst/>
+                                  <a:uLnTx/>
+                                  <a:uFillTx/>
+                                  <a:latin typeface="Cambria Math"/>
+                                </a:rPr>
+                              </m:ctrlPr>
+                            </m:sSubPr>
+                            <m:e>
+                              <m:r>
+                                <a:rPr kumimoji="0" lang="en-US" altLang="ko-KR" sz="1200" b="0" i="1" u="none" strike="noStrike" kern="0" cap="none" spc="0" normalizeH="0" baseline="0" noProof="0" smtClean="0">
+                                  <a:ln>
+                                    <a:noFill/>
+                                  </a:ln>
+                                  <a:solidFill>
+                                    <a:prstClr val="black"/>
+                                  </a:solidFill>
+                                  <a:effectLst/>
+                                  <a:uLnTx/>
+                                  <a:uFillTx/>
+                                  <a:latin typeface="Cambria Math" panose="02040503050406030204" pitchFamily="18" charset="0"/>
+                                </a:rPr>
+                                <m:t>𝐺𝑜𝑜𝑑</m:t>
+                              </m:r>
+                            </m:e>
+                            <m:sub>
+                              <m:r>
+                                <a:rPr kumimoji="0" lang="en-US" altLang="ko-KR" sz="1200" b="0" i="1" u="none" strike="noStrike" kern="0" cap="none" spc="0" normalizeH="0" baseline="0" noProof="0" smtClean="0">
+                                  <a:ln>
+                                    <a:noFill/>
+                                  </a:ln>
+                                  <a:solidFill>
+                                    <a:prstClr val="black"/>
+                                  </a:solidFill>
+                                  <a:effectLst/>
+                                  <a:uLnTx/>
+                                  <a:uFillTx/>
+                                  <a:latin typeface="Cambria Math" panose="02040503050406030204" pitchFamily="18" charset="0"/>
+                                </a:rPr>
+                                <m:t>𝑖</m:t>
+                              </m:r>
+                            </m:sub>
+                          </m:sSub>
+                        </m:num>
+                        <m:den>
+                          <m:sSub>
+                            <m:sSubPr>
+                              <m:ctrlPr>
+                                <a:rPr kumimoji="0" lang="en-US" altLang="ko-KR" sz="1200" b="0" i="1" u="none" strike="noStrike" kern="0" cap="none" spc="0" normalizeH="0" baseline="0" noProof="0" smtClean="0">
+                                  <a:ln>
+                                    <a:noFill/>
+                                  </a:ln>
+                                  <a:solidFill>
+                                    <a:prstClr val="black"/>
+                                  </a:solidFill>
+                                  <a:effectLst/>
+                                  <a:uLnTx/>
+                                  <a:uFillTx/>
+                                  <a:latin typeface="Cambria Math"/>
+                                </a:rPr>
+                              </m:ctrlPr>
+                            </m:sSubPr>
+                            <m:e>
+                              <m:r>
+                                <a:rPr kumimoji="0" lang="en-US" altLang="ko-KR" sz="1200" b="0" i="1" u="none" strike="noStrike" kern="0" cap="none" spc="0" normalizeH="0" baseline="0" noProof="0" smtClean="0">
+                                  <a:ln>
+                                    <a:noFill/>
+                                  </a:ln>
+                                  <a:solidFill>
+                                    <a:prstClr val="black"/>
+                                  </a:solidFill>
+                                  <a:effectLst/>
+                                  <a:uLnTx/>
+                                  <a:uFillTx/>
+                                  <a:latin typeface="Cambria Math" panose="02040503050406030204" pitchFamily="18" charset="0"/>
+                                </a:rPr>
+                                <m:t>𝐵𝑎𝑑</m:t>
+                              </m:r>
+                            </m:e>
+                            <m:sub>
+                              <m:r>
+                                <a:rPr kumimoji="0" lang="en-US" altLang="ko-KR" sz="1200" b="0" i="1" u="none" strike="noStrike" kern="0" cap="none" spc="0" normalizeH="0" baseline="0" noProof="0" smtClean="0">
+                                  <a:ln>
+                                    <a:noFill/>
+                                  </a:ln>
+                                  <a:solidFill>
+                                    <a:prstClr val="black"/>
+                                  </a:solidFill>
+                                  <a:effectLst/>
+                                  <a:uLnTx/>
+                                  <a:uFillTx/>
+                                  <a:latin typeface="Cambria Math" panose="02040503050406030204" pitchFamily="18" charset="0"/>
+                                </a:rPr>
+                                <m:t>𝑖</m:t>
+                              </m:r>
+                            </m:sub>
+                          </m:sSub>
+                        </m:den>
+                      </m:f>
+                      <m:r>
+                        <a:rPr kumimoji="0" lang="en-US" altLang="ko-KR" sz="1200" b="0" i="1" u="none" strike="noStrike" kern="0" cap="none" spc="0" normalizeH="0" baseline="0" noProof="0" smtClean="0">
+                          <a:ln>
+                            <a:noFill/>
+                          </a:ln>
+                          <a:solidFill>
+                            <a:prstClr val="black"/>
+                          </a:solidFill>
+                          <a:effectLst/>
+                          <a:uLnTx/>
+                          <a:uFillTx/>
+                          <a:latin typeface="Cambria Math" panose="02040503050406030204" pitchFamily="18" charset="0"/>
+                        </a:rPr>
+                        <m:t>)</m:t>
+                      </m:r>
+                    </m:oMath>
+                  </m:oMathPara>
+                </a14:m>
+                <a:endParaRPr kumimoji="0" lang="ko-KR" altLang="en-US" sz="1200" b="0" i="0" u="none" strike="noStrike" kern="0" cap="none" spc="0" normalizeH="0" baseline="0" noProof="0" dirty="0" smtClean="0">
+                  <a:ln>
+                    <a:noFill/>
+                  </a:ln>
+                  <a:solidFill>
+                    <a:prstClr val="black"/>
+                  </a:solidFill>
+                  <a:effectLst/>
+                  <a:uLnTx/>
+                  <a:uFillTx/>
+                </a:endParaRPr>
+              </a:p>
+            </p:txBody>
+          </p:sp>
+        </mc:Choice>
+        <mc:Fallback>
+          <p:sp>
+            <p:nvSpPr>
+              <p:cNvPr id="35" name="TextBox 34">
+                <a:extLst>
+                  <a:ext uri="{FF2B5EF4-FFF2-40B4-BE49-F238E27FC236}">
+                    <a16:creationId xmlns:a16="http://schemas.microsoft.com/office/drawing/2014/main" xmlns:a14="http://schemas.microsoft.com/office/drawing/2010/main" xmlns="" id="{21E81333-1CAC-4F11-B7E7-201FEA854106}"/>
+                  </a:ext>
+                </a:extLst>
+              </p:cNvPr>
+              <p:cNvSpPr txBox="1">
+                <a:spLocks noRot="1" noChangeAspect="1" noMove="1" noResize="1" noEditPoints="1" noAdjustHandles="1" noChangeArrowheads="1" noChangeShapeType="1" noTextEdit="1"/>
+              </p:cNvSpPr>
+              <p:nvPr/>
+            </p:nvSpPr>
+            <p:spPr>
+              <a:xfrm>
+                <a:off x="2599507" y="4298649"/>
+                <a:ext cx="2682849" cy="381771"/>
+              </a:xfrm>
+              <a:prstGeom prst="rect">
+                <a:avLst/>
+              </a:prstGeom>
+              <a:blipFill rotWithShape="1">
+                <a:blip r:embed="rId4"/>
+                <a:stretch>
+                  <a:fillRect t="-1587" b="-9524"/>
+                </a:stretch>
+              </a:blipFill>
+            </p:spPr>
+            <p:txBody>
+              <a:bodyPr/>
+              <a:lstStyle/>
+              <a:p>
+                <a:r>
+                  <a:rPr lang="ko-KR" altLang="en-US">
+                    <a:noFill/>
+                  </a:rPr>
+                  <a:t> </a:t>
+                </a:r>
+              </a:p>
+            </p:txBody>
+          </p:sp>
+        </mc:Fallback>
+      </mc:AlternateContent>
+      <p:sp>
+        <p:nvSpPr>
+          <p:cNvPr id="36" name="모서리가 둥근 직사각형 84">
+            <a:extLst>
+              <a:ext uri="{FF2B5EF4-FFF2-40B4-BE49-F238E27FC236}">
+                <a16:creationId xmlns:a16="http://schemas.microsoft.com/office/drawing/2014/main" xmlns="" id="{EBFD0AA9-A624-48D5-A720-C4B7911B6982}"/>
+              </a:ext>
+            </a:extLst>
+          </p:cNvPr>
+          <p:cNvSpPr/>
+          <p:nvPr/>
+        </p:nvSpPr>
+        <p:spPr>
+          <a:xfrm>
+            <a:off x="2657470" y="1419470"/>
+            <a:ext cx="2525049" cy="1765885"/>
+          </a:xfrm>
+          <a:prstGeom prst="roundRect">
+            <a:avLst>
+              <a:gd name="adj" fmla="val 3472"/>
+            </a:avLst>
+          </a:prstGeom>
+          <a:solidFill>
+            <a:srgbClr val="EEECE1">
+              <a:lumMod val="90000"/>
+              <a:alpha val="30000"/>
+            </a:srgbClr>
+          </a:solidFill>
+          <a:ln w="12700" cap="flat" cmpd="sng" algn="ctr">
+            <a:noFill/>
+            <a:prstDash val="solid"/>
+          </a:ln>
+          <a:effectLst/>
+        </p:spPr>
+        <p:txBody>
+          <a:bodyPr rtlCol="0" anchor="ctr"/>
+          <a:lstStyle/>
+          <a:p>
+            <a:pPr marL="0" marR="0" lvl="0" indent="0" algn="ctr" defTabSz="914400" eaLnBrk="1" fontAlgn="auto" latinLnBrk="1" hangingPunct="1">
+              <a:lnSpc>
+                <a:spcPct val="100000"/>
+              </a:lnSpc>
+              <a:spcBef>
+                <a:spcPts val="0"/>
+              </a:spcBef>
+              <a:spcAft>
+                <a:spcPts val="0"/>
+              </a:spcAft>
+              <a:buClrTx/>
+              <a:buSzTx/>
+              <a:buFontTx/>
+              <a:buNone/>
+              <a:tabLst/>
+              <a:defRPr/>
+            </a:pPr>
+            <a:endParaRPr kumimoji="0" lang="ko-KR" altLang="en-US" sz="2800" b="1" i="0" u="none" strike="noStrike" kern="0" cap="none" spc="0" normalizeH="0" baseline="0" noProof="0" dirty="0" smtClean="0">
+              <a:ln>
+                <a:noFill/>
+              </a:ln>
+              <a:solidFill>
+                <a:srgbClr val="0F07A9"/>
+              </a:solidFill>
+              <a:effectLst/>
+              <a:uLnTx/>
+              <a:uFillTx/>
+              <a:latin typeface="나눔고딕" pitchFamily="50" charset="-127"/>
+              <a:ea typeface="나눔고딕" pitchFamily="50" charset="-127"/>
+              <a:cs typeface="+mn-cs"/>
+            </a:endParaRPr>
+          </a:p>
+        </p:txBody>
+      </p:sp>
+      <p:sp>
+        <p:nvSpPr>
+          <p:cNvPr id="37" name="TextBox 36">
+            <a:extLst>
+              <a:ext uri="{FF2B5EF4-FFF2-40B4-BE49-F238E27FC236}">
+                <a16:creationId xmlns:a16="http://schemas.microsoft.com/office/drawing/2014/main" xmlns="" id="{D25BF24A-F232-473E-B98C-A6007D963366}"/>
+              </a:ext>
+            </a:extLst>
+          </p:cNvPr>
+          <p:cNvSpPr txBox="1"/>
+          <p:nvPr/>
+        </p:nvSpPr>
+        <p:spPr>
+          <a:xfrm>
+            <a:off x="3063891" y="1457163"/>
+            <a:ext cx="1681294" cy="323165"/>
+          </a:xfrm>
+          <a:prstGeom prst="rect">
+            <a:avLst/>
+          </a:prstGeom>
+          <a:noFill/>
+        </p:spPr>
+        <p:txBody>
+          <a:bodyPr wrap="none" rtlCol="0">
+            <a:spAutoFit/>
+          </a:bodyPr>
+          <a:lstStyle/>
+          <a:p>
+            <a:pPr algn="ctr" defTabSz="914400" latinLnBrk="1"/>
+            <a:r>
+              <a:rPr lang="en-US" altLang="ko-KR" sz="1200" dirty="0">
+                <a:solidFill>
+                  <a:prstClr val="black"/>
+                </a:solidFill>
+                <a:latin typeface="나눔바른펜" pitchFamily="50" charset="-127"/>
+                <a:ea typeface="나눔바른펜" pitchFamily="50" charset="-127"/>
+              </a:rPr>
+              <a:t>Random</a:t>
+            </a:r>
+            <a:r>
+              <a:rPr lang="ko-KR" altLang="en-US" sz="1200" dirty="0">
+                <a:solidFill>
+                  <a:prstClr val="black"/>
+                </a:solidFill>
+                <a:latin typeface="나눔바른펜" pitchFamily="50" charset="-127"/>
+                <a:ea typeface="나눔바른펜" pitchFamily="50" charset="-127"/>
+              </a:rPr>
+              <a:t> </a:t>
+            </a:r>
+            <a:r>
+              <a:rPr lang="en-US" altLang="ko-KR" sz="1200" dirty="0">
+                <a:solidFill>
+                  <a:prstClr val="black"/>
+                </a:solidFill>
+                <a:latin typeface="나눔바른펜" pitchFamily="50" charset="-127"/>
+                <a:ea typeface="나눔바른펜" pitchFamily="50" charset="-127"/>
+              </a:rPr>
+              <a:t>Forest</a:t>
+            </a:r>
+            <a:r>
+              <a:rPr lang="ko-KR" altLang="en-US" sz="1200" dirty="0">
+                <a:solidFill>
+                  <a:prstClr val="black"/>
+                </a:solidFill>
+                <a:latin typeface="나눔바른펜" pitchFamily="50" charset="-127"/>
+                <a:ea typeface="나눔바른펜" pitchFamily="50" charset="-127"/>
+              </a:rPr>
+              <a:t> </a:t>
+            </a:r>
+            <a:r>
+              <a:rPr lang="en-US" altLang="ko-KR" sz="1500" b="1" dirty="0">
+                <a:solidFill>
+                  <a:prstClr val="black"/>
+                </a:solidFill>
+                <a:latin typeface="나눔바른펜" pitchFamily="50" charset="-127"/>
+                <a:ea typeface="나눔바른펜" pitchFamily="50" charset="-127"/>
+              </a:rPr>
+              <a:t>Dry-Run</a:t>
+            </a:r>
+            <a:endParaRPr lang="ko-KR" altLang="en-US" sz="1500" dirty="0">
+              <a:solidFill>
+                <a:prstClr val="black"/>
+              </a:solidFill>
+              <a:latin typeface="나눔바른펜" pitchFamily="50" charset="-127"/>
+              <a:ea typeface="나눔바른펜" pitchFamily="50" charset="-127"/>
+            </a:endParaRPr>
+          </a:p>
+        </p:txBody>
+      </p:sp>
+      <p:pic>
+        <p:nvPicPr>
+          <p:cNvPr id="38" name="Picture 8" descr="random forest iconì ëí ì´ë¯¸ì§ ê²ìê²°ê³¼">
+            <a:extLst>
+              <a:ext uri="{FF2B5EF4-FFF2-40B4-BE49-F238E27FC236}">
+                <a16:creationId xmlns:a16="http://schemas.microsoft.com/office/drawing/2014/main" xmlns="" id="{7878487D-0293-4E85-B86C-E43BC8CC9B52}"/>
+              </a:ext>
+            </a:extLst>
+          </p:cNvPr>
+          <p:cNvPicPr>
+            <a:picLocks noChangeAspect="1" noChangeArrowheads="1"/>
+          </p:cNvPicPr>
+          <p:nvPr/>
+        </p:nvPicPr>
+        <p:blipFill>
+          <a:blip r:embed="rId5">
+            <a:extLst>
+              <a:ext uri="{28A0092B-C50C-407E-A947-70E740481C1C}">
+                <a14:useLocalDpi xmlns:a14="http://schemas.microsoft.com/office/drawing/2010/main" val="0"/>
+              </a:ext>
+            </a:extLst>
+          </a:blip>
+          <a:srcRect/>
+          <a:stretch>
+            <a:fillRect/>
+          </a:stretch>
+        </p:blipFill>
+        <p:spPr bwMode="auto">
+          <a:xfrm>
+            <a:off x="3148252" y="1733438"/>
+            <a:ext cx="1439093" cy="1439093"/>
+          </a:xfrm>
+          <a:prstGeom prst="rect">
+            <a:avLst/>
+          </a:prstGeom>
+          <a:noFill/>
+          <a:extLst>
+            <a:ext uri="{909E8E84-426E-40DD-AFC4-6F175D3DCCD1}">
+              <a14:hiddenFill xmlns:a14="http://schemas.microsoft.com/office/drawing/2010/main">
+                <a:solidFill>
+                  <a:srgbClr val="FFFFFF"/>
+                </a:solidFill>
+              </a14:hiddenFill>
+            </a:ext>
+          </a:extLst>
+        </p:spPr>
+      </p:pic>
+      <p:pic>
+        <p:nvPicPr>
+          <p:cNvPr id="39" name="그림 38">
+            <a:extLst>
+              <a:ext uri="{FF2B5EF4-FFF2-40B4-BE49-F238E27FC236}">
+                <a16:creationId xmlns:a16="http://schemas.microsoft.com/office/drawing/2014/main" xmlns="" id="{E184F804-6674-4AE4-A632-AB940E414C4A}"/>
+              </a:ext>
+            </a:extLst>
+          </p:cNvPr>
+          <p:cNvPicPr>
+            <a:picLocks noChangeAspect="1"/>
+          </p:cNvPicPr>
+          <p:nvPr/>
+        </p:nvPicPr>
+        <p:blipFill>
+          <a:blip r:embed="rId6">
+            <a:clrChange>
+              <a:clrFrom>
+                <a:srgbClr val="FFFFFF"/>
+              </a:clrFrom>
+              <a:clrTo>
+                <a:srgbClr val="FFFFFF">
+                  <a:alpha val="0"/>
+                </a:srgbClr>
+              </a:clrTo>
+            </a:clrChange>
+          </a:blip>
+          <a:stretch>
+            <a:fillRect/>
+          </a:stretch>
+        </p:blipFill>
+        <p:spPr>
+          <a:xfrm>
+            <a:off x="5863426" y="1916227"/>
+            <a:ext cx="2185249" cy="1560892"/>
+          </a:xfrm>
+          <a:prstGeom prst="rect">
+            <a:avLst/>
+          </a:prstGeom>
+        </p:spPr>
+      </p:pic>
+      <p:pic>
+        <p:nvPicPr>
+          <p:cNvPr id="40" name="그림 39">
+            <a:extLst>
+              <a:ext uri="{FF2B5EF4-FFF2-40B4-BE49-F238E27FC236}">
+                <a16:creationId xmlns:a16="http://schemas.microsoft.com/office/drawing/2014/main" xmlns="" id="{607ECF7B-7AE7-4C22-9B2A-6D8014718301}"/>
+              </a:ext>
+            </a:extLst>
+          </p:cNvPr>
+          <p:cNvPicPr>
+            <a:picLocks noChangeAspect="1"/>
+          </p:cNvPicPr>
+          <p:nvPr/>
+        </p:nvPicPr>
+        <p:blipFill>
+          <a:blip r:embed="rId7">
+            <a:clrChange>
+              <a:clrFrom>
+                <a:srgbClr val="FFFFFF"/>
+              </a:clrFrom>
+              <a:clrTo>
+                <a:srgbClr val="FFFFFF">
+                  <a:alpha val="0"/>
+                </a:srgbClr>
+              </a:clrTo>
+            </a:clrChange>
+          </a:blip>
+          <a:stretch>
+            <a:fillRect/>
+          </a:stretch>
+        </p:blipFill>
+        <p:spPr>
+          <a:xfrm>
+            <a:off x="5859606" y="3697456"/>
+            <a:ext cx="2185248" cy="1092624"/>
+          </a:xfrm>
+          <a:prstGeom prst="rect">
+            <a:avLst/>
+          </a:prstGeom>
+        </p:spPr>
+      </p:pic>
+      <p:sp>
+        <p:nvSpPr>
+          <p:cNvPr id="41" name="TextBox 40">
+            <a:extLst>
+              <a:ext uri="{FF2B5EF4-FFF2-40B4-BE49-F238E27FC236}">
+                <a16:creationId xmlns:a16="http://schemas.microsoft.com/office/drawing/2014/main" xmlns="" id="{2554F52E-3346-4522-8035-9FF9A20EB498}"/>
+              </a:ext>
+            </a:extLst>
+          </p:cNvPr>
+          <p:cNvSpPr txBox="1"/>
+          <p:nvPr/>
+        </p:nvSpPr>
+        <p:spPr>
+          <a:xfrm>
+            <a:off x="6273269" y="1458779"/>
+            <a:ext cx="1329211" cy="323165"/>
+          </a:xfrm>
+          <a:prstGeom prst="rect">
+            <a:avLst/>
+          </a:prstGeom>
+          <a:noFill/>
+        </p:spPr>
+        <p:txBody>
+          <a:bodyPr wrap="none" rtlCol="0">
+            <a:spAutoFit/>
+          </a:bodyPr>
+          <a:lstStyle/>
+          <a:p>
+            <a:pPr algn="ctr" defTabSz="914400" latinLnBrk="1"/>
+            <a:r>
+              <a:rPr lang="ko-KR" altLang="en-US" sz="1500" b="1" dirty="0">
+                <a:solidFill>
+                  <a:prstClr val="black"/>
+                </a:solidFill>
+                <a:latin typeface="나눔바른펜" pitchFamily="50" charset="-127"/>
+                <a:ea typeface="나눔바른펜" pitchFamily="50" charset="-127"/>
+              </a:rPr>
+              <a:t>탐색적 변수 분석</a:t>
+            </a:r>
+            <a:endParaRPr lang="ko-KR" altLang="en-US" sz="1500" dirty="0">
+              <a:solidFill>
+                <a:prstClr val="black"/>
+              </a:solidFill>
+              <a:latin typeface="나눔바른펜" pitchFamily="50" charset="-127"/>
+              <a:ea typeface="나눔바른펜" pitchFamily="50" charset="-127"/>
+            </a:endParaRPr>
+          </a:p>
+        </p:txBody>
+      </p:sp>
+      <p:pic>
+        <p:nvPicPr>
+          <p:cNvPr id="42" name="Picture 12" descr="arrow next by Anonymous">
+            <a:extLst>
+              <a:ext uri="{FF2B5EF4-FFF2-40B4-BE49-F238E27FC236}">
+                <a16:creationId xmlns:a16="http://schemas.microsoft.com/office/drawing/2014/main" xmlns="" id="{BC30918D-6877-4972-BB67-ED573DC6E6BE}"/>
+              </a:ext>
+            </a:extLst>
+          </p:cNvPr>
+          <p:cNvPicPr>
+            <a:picLocks noChangeAspect="1" noChangeArrowheads="1"/>
+          </p:cNvPicPr>
+          <p:nvPr/>
+        </p:nvPicPr>
+        <p:blipFill>
+          <a:blip r:embed="rId2" cstate="print"/>
+          <a:srcRect t="10246" r="22511" b="49437"/>
+          <a:stretch>
+            <a:fillRect/>
+          </a:stretch>
+        </p:blipFill>
+        <p:spPr bwMode="auto">
+          <a:xfrm>
+            <a:off x="5261252" y="3073034"/>
+            <a:ext cx="340651" cy="267840"/>
+          </a:xfrm>
+          <a:prstGeom prst="rect">
+            <a:avLst/>
+          </a:prstGeom>
+          <a:noFill/>
+        </p:spPr>
+      </p:pic>
+      <p:pic>
+        <p:nvPicPr>
+          <p:cNvPr id="43" name="Picture 14" descr="dt">
+            <a:extLst>
+              <a:ext uri="{FF2B5EF4-FFF2-40B4-BE49-F238E27FC236}">
+                <a16:creationId xmlns:a16="http://schemas.microsoft.com/office/drawing/2014/main" xmlns="" id="{D2D0F6DE-080F-4615-A9CF-B85345F0A42B}"/>
+              </a:ext>
+            </a:extLst>
+          </p:cNvPr>
+          <p:cNvPicPr>
+            <a:picLocks noChangeAspect="1" noChangeArrowheads="1"/>
+          </p:cNvPicPr>
+          <p:nvPr/>
+        </p:nvPicPr>
+        <p:blipFill>
+          <a:blip r:embed="rId8" cstate="print">
+            <a:extLst>
+              <a:ext uri="{28A0092B-C50C-407E-A947-70E740481C1C}">
+                <a14:useLocalDpi xmlns:a14="http://schemas.microsoft.com/office/drawing/2010/main" val="0"/>
+              </a:ext>
+            </a:extLst>
+          </a:blip>
+          <a:srcRect/>
+          <a:stretch>
+            <a:fillRect/>
+          </a:stretch>
+        </p:blipFill>
+        <p:spPr bwMode="auto">
+          <a:xfrm>
+            <a:off x="8765813" y="2223202"/>
+            <a:ext cx="2123787" cy="1674976"/>
+          </a:xfrm>
+          <a:prstGeom prst="rect">
+            <a:avLst/>
+          </a:prstGeom>
+          <a:noFill/>
+          <a:extLst>
+            <a:ext uri="{909E8E84-426E-40DD-AFC4-6F175D3DCCD1}">
+              <a14:hiddenFill xmlns:a14="http://schemas.microsoft.com/office/drawing/2010/main">
+                <a:solidFill>
+                  <a:srgbClr val="FFFFFF"/>
+                </a:solidFill>
+              </a14:hiddenFill>
+            </a:ext>
+          </a:extLst>
+        </p:spPr>
+      </p:pic>
+      <p:sp>
+        <p:nvSpPr>
+          <p:cNvPr id="44" name="TextBox 43">
+            <a:extLst>
+              <a:ext uri="{FF2B5EF4-FFF2-40B4-BE49-F238E27FC236}">
+                <a16:creationId xmlns:a16="http://schemas.microsoft.com/office/drawing/2014/main" xmlns="" id="{03BAF2F1-E499-4C3B-A569-2867B9211984}"/>
+              </a:ext>
+            </a:extLst>
+          </p:cNvPr>
+          <p:cNvSpPr txBox="1"/>
+          <p:nvPr/>
+        </p:nvSpPr>
+        <p:spPr>
+          <a:xfrm>
+            <a:off x="9311174" y="1458779"/>
+            <a:ext cx="1285609" cy="323165"/>
+          </a:xfrm>
+          <a:prstGeom prst="rect">
+            <a:avLst/>
+          </a:prstGeom>
+          <a:noFill/>
+        </p:spPr>
+        <p:txBody>
+          <a:bodyPr wrap="none" rtlCol="0">
+            <a:spAutoFit/>
+          </a:bodyPr>
+          <a:lstStyle/>
+          <a:p>
+            <a:pPr algn="ctr" defTabSz="914400" latinLnBrk="1"/>
+            <a:r>
+              <a:rPr lang="en-US" altLang="ko-KR" sz="1500" b="1" dirty="0">
+                <a:solidFill>
+                  <a:prstClr val="black"/>
+                </a:solidFill>
+                <a:latin typeface="나눔바른펜" pitchFamily="50" charset="-127"/>
+                <a:ea typeface="나눔바른펜" pitchFamily="50" charset="-127"/>
+              </a:rPr>
+              <a:t>Random</a:t>
+            </a:r>
+            <a:r>
+              <a:rPr lang="ko-KR" altLang="en-US" sz="1500" b="1" dirty="0">
+                <a:solidFill>
+                  <a:prstClr val="black"/>
+                </a:solidFill>
+                <a:latin typeface="나눔바른펜" pitchFamily="50" charset="-127"/>
+                <a:ea typeface="나눔바른펜" pitchFamily="50" charset="-127"/>
+              </a:rPr>
+              <a:t> </a:t>
+            </a:r>
+            <a:r>
+              <a:rPr lang="en-US" altLang="ko-KR" sz="1500" b="1" dirty="0">
+                <a:solidFill>
+                  <a:prstClr val="black"/>
+                </a:solidFill>
+                <a:latin typeface="나눔바른펜" pitchFamily="50" charset="-127"/>
+                <a:ea typeface="나눔바른펜" pitchFamily="50" charset="-127"/>
+              </a:rPr>
+              <a:t>Forest</a:t>
+            </a:r>
+            <a:endParaRPr lang="ko-KR" altLang="en-US" sz="1500" dirty="0">
+              <a:solidFill>
+                <a:prstClr val="black"/>
+              </a:solidFill>
+              <a:latin typeface="나눔바른펜" pitchFamily="50" charset="-127"/>
+              <a:ea typeface="나눔바른펜" pitchFamily="50" charset="-127"/>
+            </a:endParaRPr>
+          </a:p>
+        </p:txBody>
+      </p:sp>
+      <p:sp>
+        <p:nvSpPr>
+          <p:cNvPr id="45" name="TextBox 44">
+            <a:extLst>
+              <a:ext uri="{FF2B5EF4-FFF2-40B4-BE49-F238E27FC236}">
+                <a16:creationId xmlns:a16="http://schemas.microsoft.com/office/drawing/2014/main" xmlns="" id="{51EDCD47-C25E-4A20-BA54-9F14F8B2028D}"/>
+              </a:ext>
+            </a:extLst>
+          </p:cNvPr>
+          <p:cNvSpPr txBox="1"/>
+          <p:nvPr/>
+        </p:nvSpPr>
+        <p:spPr>
+          <a:xfrm>
+            <a:off x="9228462" y="4042051"/>
+            <a:ext cx="1451038" cy="323165"/>
+          </a:xfrm>
+          <a:prstGeom prst="rect">
+            <a:avLst/>
+          </a:prstGeom>
+          <a:noFill/>
+        </p:spPr>
+        <p:txBody>
+          <a:bodyPr wrap="none" rtlCol="0">
+            <a:spAutoFit/>
+          </a:bodyPr>
+          <a:lstStyle/>
+          <a:p>
+            <a:pPr algn="ctr" defTabSz="914400" latinLnBrk="1"/>
+            <a:r>
+              <a:rPr lang="en-US" altLang="ko-KR" sz="1500" b="1" dirty="0">
+                <a:solidFill>
+                  <a:prstClr val="black"/>
+                </a:solidFill>
+                <a:latin typeface="나눔바른펜" pitchFamily="50" charset="-127"/>
+                <a:ea typeface="나눔바른펜" pitchFamily="50" charset="-127"/>
+              </a:rPr>
+              <a:t>Hyper Parameter</a:t>
+            </a:r>
+            <a:endParaRPr lang="ko-KR" altLang="en-US" sz="1500" dirty="0">
+              <a:solidFill>
+                <a:prstClr val="black"/>
+              </a:solidFill>
+              <a:latin typeface="나눔바른펜" pitchFamily="50" charset="-127"/>
+              <a:ea typeface="나눔바른펜" pitchFamily="50" charset="-127"/>
+            </a:endParaRPr>
+          </a:p>
+        </p:txBody>
+      </p:sp>
+      <p:pic>
+        <p:nvPicPr>
+          <p:cNvPr id="46" name="Picture 12" descr="arrow next by Anonymous">
+            <a:extLst>
+              <a:ext uri="{FF2B5EF4-FFF2-40B4-BE49-F238E27FC236}">
+                <a16:creationId xmlns:a16="http://schemas.microsoft.com/office/drawing/2014/main" xmlns="" id="{ACB51EED-3B95-4F61-B4F5-352F5AF3B425}"/>
+              </a:ext>
+            </a:extLst>
+          </p:cNvPr>
+          <p:cNvPicPr>
+            <a:picLocks noChangeAspect="1" noChangeArrowheads="1"/>
+          </p:cNvPicPr>
+          <p:nvPr/>
+        </p:nvPicPr>
+        <p:blipFill>
+          <a:blip r:embed="rId2" cstate="print"/>
+          <a:srcRect t="10246" r="22511" b="49437"/>
+          <a:stretch>
+            <a:fillRect/>
+          </a:stretch>
+        </p:blipFill>
+        <p:spPr bwMode="auto">
+          <a:xfrm>
+            <a:off x="8255719" y="3073034"/>
+            <a:ext cx="340651" cy="267840"/>
+          </a:xfrm>
+          <a:prstGeom prst="rect">
+            <a:avLst/>
+          </a:prstGeom>
+          <a:noFill/>
+        </p:spPr>
+      </p:pic>
+      <p:sp>
+        <p:nvSpPr>
+          <p:cNvPr id="47" name="직사각형 46">
+            <a:hlinkClick r:id="rId9"/>
+          </p:cNvPr>
+          <p:cNvSpPr/>
+          <p:nvPr/>
+        </p:nvSpPr>
+        <p:spPr>
+          <a:xfrm>
+            <a:off x="717748" y="5798959"/>
+            <a:ext cx="6827852" cy="300082"/>
+          </a:xfrm>
+          <a:prstGeom prst="rect">
+            <a:avLst/>
+          </a:prstGeom>
+        </p:spPr>
+        <p:txBody>
+          <a:bodyPr wrap="square">
+            <a:spAutoFit/>
+          </a:bodyPr>
+          <a:lstStyle/>
+          <a:p>
+            <a:r>
+              <a:rPr lang="ko-KR" altLang="en-US" dirty="0" smtClean="0"/>
+              <a:t>출처</a:t>
+            </a:r>
+            <a:r>
+              <a:rPr lang="en-US" altLang="ko-KR" dirty="0" smtClean="0"/>
+              <a:t>: </a:t>
+            </a:r>
+            <a:r>
+              <a:rPr lang="en-US" altLang="ko-KR" dirty="0" err="1" smtClean="0"/>
+              <a:t>xwMOOC</a:t>
+            </a:r>
+            <a:r>
+              <a:rPr lang="en-US" altLang="ko-KR" dirty="0" smtClean="0"/>
+              <a:t> </a:t>
+            </a:r>
+            <a:r>
+              <a:rPr lang="ko-KR" altLang="en-US" dirty="0" smtClean="0"/>
+              <a:t>모형</a:t>
+            </a:r>
+            <a:r>
+              <a:rPr lang="en-US" altLang="ko-KR" dirty="0" smtClean="0"/>
+              <a:t>: </a:t>
+            </a:r>
+            <a:r>
+              <a:rPr lang="en-US" altLang="ko-KR" i="1" dirty="0" smtClean="0"/>
+              <a:t>Cloudera – </a:t>
+            </a:r>
+            <a:r>
+              <a:rPr lang="ko-KR" altLang="en-US" i="1" dirty="0" smtClean="0"/>
+              <a:t>고객이탈</a:t>
+            </a:r>
+            <a:r>
+              <a:rPr lang="en-US" altLang="ko-KR" i="1" dirty="0" smtClean="0"/>
+              <a:t>,</a:t>
+            </a:r>
+            <a:r>
+              <a:rPr lang="ko-KR" altLang="en-US" i="1" dirty="0" smtClean="0"/>
+              <a:t> </a:t>
+            </a:r>
+            <a:r>
+              <a:rPr lang="en-US" altLang="ko-KR" i="1" dirty="0"/>
+              <a:t>Random Forest</a:t>
+            </a:r>
+            <a:endParaRPr lang="ko-KR" altLang="en-US" dirty="0"/>
           </a:p>
         </p:txBody>
       </p:sp>
@@ -11585,7 +15212,7 @@
           <p:cNvPr id="4" name="Title 3">
             <a:extLst>
               <a:ext uri="{FF2B5EF4-FFF2-40B4-BE49-F238E27FC236}">
-                <a16:creationId xmlns:a16="http://schemas.microsoft.com/office/drawing/2014/main" xmlns="" id="{43665574-774A-2B41-927D-F53A37DF509D}"/>
+                <a16:creationId xmlns="" xmlns:a16="http://schemas.microsoft.com/office/drawing/2014/main" id="{43665574-774A-2B41-927D-F53A37DF509D}"/>
               </a:ext>
             </a:extLst>
           </p:cNvPr>
@@ -11617,6 +15244,185 @@
               <a:t>, lime…</a:t>
             </a:r>
             <a:endParaRPr lang="en-US" dirty="0"/>
+          </a:p>
+        </p:txBody>
+      </p:sp>
+      <p:pic>
+        <p:nvPicPr>
+          <p:cNvPr id="1026" name="Picture 2"/>
+          <p:cNvPicPr>
+            <a:picLocks noChangeAspect="1" noChangeArrowheads="1"/>
+          </p:cNvPicPr>
+          <p:nvPr/>
+        </p:nvPicPr>
+        <p:blipFill>
+          <a:blip r:embed="rId2">
+            <a:extLst>
+              <a:ext uri="{28A0092B-C50C-407E-A947-70E740481C1C}">
+                <a14:useLocalDpi xmlns:a14="http://schemas.microsoft.com/office/drawing/2010/main" val="0"/>
+              </a:ext>
+            </a:extLst>
+          </a:blip>
+          <a:srcRect/>
+          <a:stretch>
+            <a:fillRect/>
+          </a:stretch>
+        </p:blipFill>
+        <p:spPr bwMode="auto">
+          <a:xfrm>
+            <a:off x="448875" y="1472322"/>
+            <a:ext cx="6617214" cy="3157278"/>
+          </a:xfrm>
+          <a:prstGeom prst="rect">
+            <a:avLst/>
+          </a:prstGeom>
+          <a:noFill/>
+          <a:ln>
+            <a:noFill/>
+          </a:ln>
+          <a:extLst>
+            <a:ext uri="{909E8E84-426E-40DD-AFC4-6F175D3DCCD1}">
+              <a14:hiddenFill xmlns:a14="http://schemas.microsoft.com/office/drawing/2010/main">
+                <a:solidFill>
+                  <a:schemeClr val="accent1"/>
+                </a:solidFill>
+              </a14:hiddenFill>
+            </a:ext>
+            <a:ext uri="{91240B29-F687-4F45-9708-019B960494DF}">
+              <a14:hiddenLine xmlns:a14="http://schemas.microsoft.com/office/drawing/2010/main" w="9525">
+                <a:solidFill>
+                  <a:schemeClr val="tx1"/>
+                </a:solidFill>
+                <a:miter lim="800000"/>
+                <a:headEnd/>
+                <a:tailEnd/>
+              </a14:hiddenLine>
+            </a:ext>
+          </a:extLst>
+        </p:spPr>
+      </p:pic>
+      <p:pic>
+        <p:nvPicPr>
+          <p:cNvPr id="1027" name="Picture 3"/>
+          <p:cNvPicPr>
+            <a:picLocks noChangeAspect="1" noChangeArrowheads="1"/>
+          </p:cNvPicPr>
+          <p:nvPr/>
+        </p:nvPicPr>
+        <p:blipFill>
+          <a:blip r:embed="rId3">
+            <a:extLst>
+              <a:ext uri="{28A0092B-C50C-407E-A947-70E740481C1C}">
+                <a14:useLocalDpi xmlns:a14="http://schemas.microsoft.com/office/drawing/2010/main" val="0"/>
+              </a:ext>
+            </a:extLst>
+          </a:blip>
+          <a:srcRect/>
+          <a:stretch>
+            <a:fillRect/>
+          </a:stretch>
+        </p:blipFill>
+        <p:spPr bwMode="auto">
+          <a:xfrm>
+            <a:off x="7086391" y="1472322"/>
+            <a:ext cx="4757609" cy="3398292"/>
+          </a:xfrm>
+          <a:prstGeom prst="rect">
+            <a:avLst/>
+          </a:prstGeom>
+          <a:noFill/>
+          <a:ln>
+            <a:noFill/>
+          </a:ln>
+          <a:extLst>
+            <a:ext uri="{909E8E84-426E-40DD-AFC4-6F175D3DCCD1}">
+              <a14:hiddenFill xmlns:a14="http://schemas.microsoft.com/office/drawing/2010/main">
+                <a:solidFill>
+                  <a:schemeClr val="accent1"/>
+                </a:solidFill>
+              </a14:hiddenFill>
+            </a:ext>
+            <a:ext uri="{91240B29-F687-4F45-9708-019B960494DF}">
+              <a14:hiddenLine xmlns:a14="http://schemas.microsoft.com/office/drawing/2010/main" w="9525">
+                <a:solidFill>
+                  <a:schemeClr val="tx1"/>
+                </a:solidFill>
+                <a:miter lim="800000"/>
+                <a:headEnd/>
+                <a:tailEnd/>
+              </a14:hiddenLine>
+            </a:ext>
+          </a:extLst>
+        </p:spPr>
+      </p:pic>
+      <p:sp>
+        <p:nvSpPr>
+          <p:cNvPr id="5" name="직사각형 4">
+            <a:hlinkClick r:id="rId4"/>
+          </p:cNvPr>
+          <p:cNvSpPr/>
+          <p:nvPr/>
+        </p:nvSpPr>
+        <p:spPr>
+          <a:xfrm>
+            <a:off x="717748" y="5798959"/>
+            <a:ext cx="6827852" cy="300082"/>
+          </a:xfrm>
+          <a:prstGeom prst="rect">
+            <a:avLst/>
+          </a:prstGeom>
+        </p:spPr>
+        <p:txBody>
+          <a:bodyPr wrap="square">
+            <a:spAutoFit/>
+          </a:bodyPr>
+          <a:lstStyle/>
+          <a:p>
+            <a:r>
+              <a:rPr lang="ko-KR" altLang="en-US" dirty="0" smtClean="0"/>
+              <a:t>출처</a:t>
+            </a:r>
+            <a:r>
+              <a:rPr lang="en-US" altLang="ko-KR" dirty="0" smtClean="0"/>
+              <a:t>: </a:t>
+            </a:r>
+            <a:r>
+              <a:rPr lang="en-US" altLang="ko-KR" dirty="0" err="1" smtClean="0"/>
+              <a:t>xwMOOC</a:t>
+            </a:r>
+            <a:r>
+              <a:rPr lang="en-US" altLang="ko-KR" dirty="0" smtClean="0"/>
+              <a:t> </a:t>
+            </a:r>
+            <a:r>
+              <a:rPr lang="ko-KR" altLang="en-US" dirty="0" smtClean="0"/>
+              <a:t>모형</a:t>
+            </a:r>
+            <a:r>
+              <a:rPr lang="en-US" altLang="ko-KR" dirty="0" smtClean="0"/>
+              <a:t>: </a:t>
+            </a:r>
+            <a:r>
+              <a:rPr lang="en-US" altLang="ko-KR" i="1" dirty="0" smtClean="0"/>
+              <a:t>Cloudera – </a:t>
+            </a:r>
+            <a:r>
+              <a:rPr lang="ko-KR" altLang="en-US" i="1" dirty="0" smtClean="0"/>
+              <a:t>고객이탈</a:t>
+            </a:r>
+            <a:r>
+              <a:rPr lang="en-US" altLang="ko-KR" i="1" dirty="0" smtClean="0"/>
+              <a:t>,</a:t>
+            </a:r>
+            <a:r>
+              <a:rPr lang="ko-KR" altLang="en-US" i="1" dirty="0" smtClean="0"/>
+              <a:t> </a:t>
+            </a:r>
+            <a:r>
+              <a:rPr lang="en-US" altLang="ko-KR" i="1" dirty="0"/>
+              <a:t>DALEX + LIME</a:t>
+            </a:r>
+            <a:endParaRPr lang="ko-KR" altLang="en-US" dirty="0"/>
           </a:p>
         </p:txBody>
       </p:sp>
@@ -11723,7 +15529,7 @@
           <p:cNvPr id="4" name="Title 3">
             <a:extLst>
               <a:ext uri="{FF2B5EF4-FFF2-40B4-BE49-F238E27FC236}">
-                <a16:creationId xmlns:a16="http://schemas.microsoft.com/office/drawing/2014/main" xmlns="" id="{43665574-774A-2B41-927D-F53A37DF509D}"/>
+                <a16:creationId xmlns="" xmlns:a16="http://schemas.microsoft.com/office/drawing/2014/main" id="{43665574-774A-2B41-927D-F53A37DF509D}"/>
               </a:ext>
             </a:extLst>
           </p:cNvPr>
@@ -12586,7 +16392,7 @@
           <p:cNvPr id="4" name="Title 3">
             <a:extLst>
               <a:ext uri="{FF2B5EF4-FFF2-40B4-BE49-F238E27FC236}">
-                <a16:creationId xmlns:a16="http://schemas.microsoft.com/office/drawing/2014/main" xmlns="" id="{43665574-774A-2B41-927D-F53A37DF509D}"/>
+                <a16:creationId xmlns="" xmlns:a16="http://schemas.microsoft.com/office/drawing/2014/main" id="{43665574-774A-2B41-927D-F53A37DF509D}"/>
               </a:ext>
             </a:extLst>
           </p:cNvPr>
@@ -12805,7 +16611,7 @@
           <p:cNvPr id="4" name="Title 3">
             <a:extLst>
               <a:ext uri="{FF2B5EF4-FFF2-40B4-BE49-F238E27FC236}">
-                <a16:creationId xmlns:a16="http://schemas.microsoft.com/office/drawing/2014/main" xmlns="" id="{43665574-774A-2B41-927D-F53A37DF509D}"/>
+                <a16:creationId xmlns="" xmlns:a16="http://schemas.microsoft.com/office/drawing/2014/main" id="{43665574-774A-2B41-927D-F53A37DF509D}"/>
               </a:ext>
             </a:extLst>
           </p:cNvPr>
@@ -12901,7 +16707,7 @@
           <p:cNvPr id="7" name="Picture 2" descr="arrow icon에 대한 이미지 검색결과">
             <a:extLst>
               <a:ext uri="{FF2B5EF4-FFF2-40B4-BE49-F238E27FC236}">
-                <a16:creationId xmlns:a16="http://schemas.microsoft.com/office/drawing/2014/main" xmlns="" id="{C97423BB-111E-4308-9651-438D724D161E}"/>
+                <a16:creationId xmlns="" xmlns:a16="http://schemas.microsoft.com/office/drawing/2014/main" id="{C97423BB-111E-4308-9651-438D724D161E}"/>
               </a:ext>
             </a:extLst>
           </p:cNvPr>
@@ -13007,7 +16813,7 @@
           <p:cNvPr id="4" name="Title 3">
             <a:extLst>
               <a:ext uri="{FF2B5EF4-FFF2-40B4-BE49-F238E27FC236}">
-                <a16:creationId xmlns:a16="http://schemas.microsoft.com/office/drawing/2014/main" xmlns="" id="{43665574-774A-2B41-927D-F53A37DF509D}"/>
+                <a16:creationId xmlns="" xmlns:a16="http://schemas.microsoft.com/office/drawing/2014/main" id="{43665574-774A-2B41-927D-F53A37DF509D}"/>
               </a:ext>
             </a:extLst>
           </p:cNvPr>
@@ -13130,7 +16936,7 @@
           <p:cNvPr id="4" name="Title 3">
             <a:extLst>
               <a:ext uri="{FF2B5EF4-FFF2-40B4-BE49-F238E27FC236}">
-                <a16:creationId xmlns:a16="http://schemas.microsoft.com/office/drawing/2014/main" xmlns="" id="{43665574-774A-2B41-927D-F53A37DF509D}"/>
+                <a16:creationId xmlns="" xmlns:a16="http://schemas.microsoft.com/office/drawing/2014/main" id="{43665574-774A-2B41-927D-F53A37DF509D}"/>
               </a:ext>
             </a:extLst>
           </p:cNvPr>
@@ -14235,7 +18041,7 @@
           <p:cNvPr id="2" name="Title 1">
             <a:extLst>
               <a:ext uri="{FF2B5EF4-FFF2-40B4-BE49-F238E27FC236}">
-                <a16:creationId xmlns:a16="http://schemas.microsoft.com/office/drawing/2014/main" xmlns="" id="{11983990-85B2-7248-92D6-FBAFDC732370}"/>
+                <a16:creationId xmlns="" xmlns:a16="http://schemas.microsoft.com/office/drawing/2014/main" id="{11983990-85B2-7248-92D6-FBAFDC732370}"/>
               </a:ext>
             </a:extLst>
           </p:cNvPr>
@@ -14326,7 +18132,7 @@
           <p:cNvPr id="4" name="Title 3">
             <a:extLst>
               <a:ext uri="{FF2B5EF4-FFF2-40B4-BE49-F238E27FC236}">
-                <a16:creationId xmlns:a16="http://schemas.microsoft.com/office/drawing/2014/main" xmlns="" id="{43665574-774A-2B41-927D-F53A37DF509D}"/>
+                <a16:creationId xmlns="" xmlns:a16="http://schemas.microsoft.com/office/drawing/2014/main" id="{43665574-774A-2B41-927D-F53A37DF509D}"/>
               </a:ext>
             </a:extLst>
           </p:cNvPr>
@@ -15512,7 +19318,7 @@
   <a:extraClrSchemeLst/>
   <a:extLst>
     <a:ext uri="{05A4C25C-085E-4340-85A3-A5531E510DB2}">
-      <thm15:themeFamily xmlns:thm15="http://schemas.microsoft.com/office/thememl/2012/main" xmlns="" name="Cloudera_Toolkit_Dark_2018_030618_EV.pptx" id="{F3697C09-4429-4B89-8864-66A64E985461}" vid="{EF544AEE-E67E-4985-B590-F3BB6F01BF6B}"/>
+      <thm15:themeFamily xmlns="" xmlns:thm15="http://schemas.microsoft.com/office/thememl/2012/main" name="Cloudera_Toolkit_Dark_2018_030618_EV.pptx" id="{F3697C09-4429-4B89-8864-66A64E985461}" vid="{EF544AEE-E67E-4985-B590-F3BB6F01BF6B}"/>
     </a:ext>
   </a:extLst>
 </a:theme>
@@ -15807,7 +19613,7 @@
   <a:extraClrSchemeLst/>
   <a:extLst>
     <a:ext uri="{05A4C25C-085E-4340-85A3-A5531E510DB2}">
-      <thm15:themeFamily xmlns:thm15="http://schemas.microsoft.com/office/thememl/2012/main" xmlns="" name="Office Theme" id="{62F939B6-93AF-4DB8-9C6B-D6C7DFDC589F}" vid="{4A3C46E8-61CC-4603-A589-7422A47A8E4A}"/>
+      <thm15:themeFamily xmlns="" xmlns:thm15="http://schemas.microsoft.com/office/thememl/2012/main" name="Office Theme" id="{62F939B6-93AF-4DB8-9C6B-D6C7DFDC589F}" vid="{4A3C46E8-61CC-4603-A589-7422A47A8E4A}"/>
     </a:ext>
   </a:extLst>
 </a:theme>
@@ -16102,7 +19908,7 @@
   <a:extraClrSchemeLst/>
   <a:extLst>
     <a:ext uri="{05A4C25C-085E-4340-85A3-A5531E510DB2}">
-      <thm15:themeFamily xmlns:thm15="http://schemas.microsoft.com/office/thememl/2012/main" xmlns="" name="Office Theme" id="{62F939B6-93AF-4DB8-9C6B-D6C7DFDC589F}" vid="{4A3C46E8-61CC-4603-A589-7422A47A8E4A}"/>
+      <thm15:themeFamily xmlns="" xmlns:thm15="http://schemas.microsoft.com/office/thememl/2012/main" name="Office Theme" id="{62F939B6-93AF-4DB8-9C6B-D6C7DFDC589F}" vid="{4A3C46E8-61CC-4603-A589-7422A47A8E4A}"/>
     </a:ext>
   </a:extLst>
 </a:theme>

</xml_diff>